<commit_message>
unit_interval and sub_interval pictures
</commit_message>
<xml_diff>
--- a/images/2024-03-15-mm1_queue/mm1_queue.pptx
+++ b/images/2024-03-15-mm1_queue/mm1_queue.pptx
@@ -8,6 +8,7 @@
     <p:sldId id="257" r:id="rId2"/>
     <p:sldId id="258" r:id="rId3"/>
     <p:sldId id="259" r:id="rId4"/>
+    <p:sldId id="260" r:id="rId5"/>
   </p:sldIdLst>
   <p:sldSz cx="12192000" cy="6858000"/>
   <p:notesSz cx="6858000" cy="9144000"/>
@@ -263,7 +264,7 @@
           <a:p>
             <a:fld id="{7BDE00DA-9DD8-4387-B899-8440DAABBF8A}" type="datetimeFigureOut">
               <a:rPr lang="ko-KR" altLang="en-US" smtClean="0"/>
-              <a:t>2024-03-23</a:t>
+              <a:t>2024-03-24</a:t>
             </a:fld>
             <a:endParaRPr lang="ko-KR" altLang="en-US"/>
           </a:p>
@@ -463,7 +464,7 @@
           <a:p>
             <a:fld id="{7BDE00DA-9DD8-4387-B899-8440DAABBF8A}" type="datetimeFigureOut">
               <a:rPr lang="ko-KR" altLang="en-US" smtClean="0"/>
-              <a:t>2024-03-23</a:t>
+              <a:t>2024-03-24</a:t>
             </a:fld>
             <a:endParaRPr lang="ko-KR" altLang="en-US"/>
           </a:p>
@@ -673,7 +674,7 @@
           <a:p>
             <a:fld id="{7BDE00DA-9DD8-4387-B899-8440DAABBF8A}" type="datetimeFigureOut">
               <a:rPr lang="ko-KR" altLang="en-US" smtClean="0"/>
-              <a:t>2024-03-23</a:t>
+              <a:t>2024-03-24</a:t>
             </a:fld>
             <a:endParaRPr lang="ko-KR" altLang="en-US"/>
           </a:p>
@@ -873,7 +874,7 @@
           <a:p>
             <a:fld id="{7BDE00DA-9DD8-4387-B899-8440DAABBF8A}" type="datetimeFigureOut">
               <a:rPr lang="ko-KR" altLang="en-US" smtClean="0"/>
-              <a:t>2024-03-23</a:t>
+              <a:t>2024-03-24</a:t>
             </a:fld>
             <a:endParaRPr lang="ko-KR" altLang="en-US"/>
           </a:p>
@@ -1149,7 +1150,7 @@
           <a:p>
             <a:fld id="{7BDE00DA-9DD8-4387-B899-8440DAABBF8A}" type="datetimeFigureOut">
               <a:rPr lang="ko-KR" altLang="en-US" smtClean="0"/>
-              <a:t>2024-03-23</a:t>
+              <a:t>2024-03-24</a:t>
             </a:fld>
             <a:endParaRPr lang="ko-KR" altLang="en-US"/>
           </a:p>
@@ -1417,7 +1418,7 @@
           <a:p>
             <a:fld id="{7BDE00DA-9DD8-4387-B899-8440DAABBF8A}" type="datetimeFigureOut">
               <a:rPr lang="ko-KR" altLang="en-US" smtClean="0"/>
-              <a:t>2024-03-23</a:t>
+              <a:t>2024-03-24</a:t>
             </a:fld>
             <a:endParaRPr lang="ko-KR" altLang="en-US"/>
           </a:p>
@@ -1832,7 +1833,7 @@
           <a:p>
             <a:fld id="{7BDE00DA-9DD8-4387-B899-8440DAABBF8A}" type="datetimeFigureOut">
               <a:rPr lang="ko-KR" altLang="en-US" smtClean="0"/>
-              <a:t>2024-03-23</a:t>
+              <a:t>2024-03-24</a:t>
             </a:fld>
             <a:endParaRPr lang="ko-KR" altLang="en-US"/>
           </a:p>
@@ -1974,7 +1975,7 @@
           <a:p>
             <a:fld id="{7BDE00DA-9DD8-4387-B899-8440DAABBF8A}" type="datetimeFigureOut">
               <a:rPr lang="ko-KR" altLang="en-US" smtClean="0"/>
-              <a:t>2024-03-23</a:t>
+              <a:t>2024-03-24</a:t>
             </a:fld>
             <a:endParaRPr lang="ko-KR" altLang="en-US"/>
           </a:p>
@@ -2087,7 +2088,7 @@
           <a:p>
             <a:fld id="{7BDE00DA-9DD8-4387-B899-8440DAABBF8A}" type="datetimeFigureOut">
               <a:rPr lang="ko-KR" altLang="en-US" smtClean="0"/>
-              <a:t>2024-03-23</a:t>
+              <a:t>2024-03-24</a:t>
             </a:fld>
             <a:endParaRPr lang="ko-KR" altLang="en-US"/>
           </a:p>
@@ -2400,7 +2401,7 @@
           <a:p>
             <a:fld id="{7BDE00DA-9DD8-4387-B899-8440DAABBF8A}" type="datetimeFigureOut">
               <a:rPr lang="ko-KR" altLang="en-US" smtClean="0"/>
-              <a:t>2024-03-23</a:t>
+              <a:t>2024-03-24</a:t>
             </a:fld>
             <a:endParaRPr lang="ko-KR" altLang="en-US"/>
           </a:p>
@@ -2689,7 +2690,7 @@
           <a:p>
             <a:fld id="{7BDE00DA-9DD8-4387-B899-8440DAABBF8A}" type="datetimeFigureOut">
               <a:rPr lang="ko-KR" altLang="en-US" smtClean="0"/>
-              <a:t>2024-03-23</a:t>
+              <a:t>2024-03-24</a:t>
             </a:fld>
             <a:endParaRPr lang="ko-KR" altLang="en-US"/>
           </a:p>
@@ -2932,7 +2933,7 @@
           <a:p>
             <a:fld id="{7BDE00DA-9DD8-4387-B899-8440DAABBF8A}" type="datetimeFigureOut">
               <a:rPr lang="ko-KR" altLang="en-US" smtClean="0"/>
-              <a:t>2024-03-23</a:t>
+              <a:t>2024-03-24</a:t>
             </a:fld>
             <a:endParaRPr lang="ko-KR" altLang="en-US"/>
           </a:p>
@@ -3431,8 +3432,8 @@
           </a:p>
         </p:txBody>
       </p:sp>
-      <mc:AlternateContent xmlns:mc="http://schemas.openxmlformats.org/markup-compatibility/2006">
-        <mc:Choice xmlns:a14="http://schemas.microsoft.com/office/drawing/2010/main" Requires="a14">
+      <mc:AlternateContent xmlns:mc="http://schemas.openxmlformats.org/markup-compatibility/2006" xmlns:a14="http://schemas.microsoft.com/office/drawing/2010/main">
+        <mc:Choice Requires="a14">
           <p:sp>
             <p:nvSpPr>
               <p:cNvPr id="7" name="TextBox 6">
@@ -3514,7 +3515,7 @@
             </p:txBody>
           </p:sp>
         </mc:Choice>
-        <mc:Fallback>
+        <mc:Fallback xmlns="">
           <p:sp>
             <p:nvSpPr>
               <p:cNvPr id="7" name="TextBox 6">
@@ -3700,8 +3701,8 @@
           </a:p>
         </p:txBody>
       </p:sp>
-      <mc:AlternateContent xmlns:mc="http://schemas.openxmlformats.org/markup-compatibility/2006">
-        <mc:Choice xmlns:a14="http://schemas.microsoft.com/office/drawing/2010/main" Requires="a14">
+      <mc:AlternateContent xmlns:mc="http://schemas.openxmlformats.org/markup-compatibility/2006" xmlns:a14="http://schemas.microsoft.com/office/drawing/2010/main">
+        <mc:Choice Requires="a14">
           <p:sp>
             <p:nvSpPr>
               <p:cNvPr id="22" name="TextBox 21">
@@ -3783,7 +3784,7 @@
             </p:txBody>
           </p:sp>
         </mc:Choice>
-        <mc:Fallback>
+        <mc:Fallback xmlns="">
           <p:sp>
             <p:nvSpPr>
               <p:cNvPr id="22" name="TextBox 21">
@@ -3965,8 +3966,8 @@
           </a:p>
         </p:txBody>
       </p:sp>
-      <mc:AlternateContent xmlns:mc="http://schemas.openxmlformats.org/markup-compatibility/2006">
-        <mc:Choice xmlns:a14="http://schemas.microsoft.com/office/drawing/2010/main" Requires="a14">
+      <mc:AlternateContent xmlns:mc="http://schemas.openxmlformats.org/markup-compatibility/2006" xmlns:a14="http://schemas.microsoft.com/office/drawing/2010/main">
+        <mc:Choice Requires="a14">
           <p:sp>
             <p:nvSpPr>
               <p:cNvPr id="27" name="TextBox 26">
@@ -4048,7 +4049,7 @@
             </p:txBody>
           </p:sp>
         </mc:Choice>
-        <mc:Fallback>
+        <mc:Fallback xmlns="">
           <p:sp>
             <p:nvSpPr>
               <p:cNvPr id="27" name="TextBox 26">
@@ -7086,8 +7087,8 @@
           </a:p>
         </p:txBody>
       </p:sp>
-      <mc:AlternateContent xmlns:mc="http://schemas.openxmlformats.org/markup-compatibility/2006">
-        <mc:Choice xmlns:a14="http://schemas.microsoft.com/office/drawing/2010/main" Requires="a14">
+      <mc:AlternateContent xmlns:mc="http://schemas.openxmlformats.org/markup-compatibility/2006" xmlns:a14="http://schemas.microsoft.com/office/drawing/2010/main">
+        <mc:Choice Requires="a14">
           <p:sp>
             <p:nvSpPr>
               <p:cNvPr id="69" name="TextBox 68">
@@ -7178,7 +7179,7 @@
             </p:txBody>
           </p:sp>
         </mc:Choice>
-        <mc:Fallback>
+        <mc:Fallback xmlns="">
           <p:sp>
             <p:nvSpPr>
               <p:cNvPr id="69" name="TextBox 68">
@@ -7223,8 +7224,8 @@
           </p:sp>
         </mc:Fallback>
       </mc:AlternateContent>
-      <mc:AlternateContent xmlns:mc="http://schemas.openxmlformats.org/markup-compatibility/2006">
-        <mc:Choice xmlns:a14="http://schemas.microsoft.com/office/drawing/2010/main" Requires="a14">
+      <mc:AlternateContent xmlns:mc="http://schemas.openxmlformats.org/markup-compatibility/2006" xmlns:a14="http://schemas.microsoft.com/office/drawing/2010/main">
+        <mc:Choice Requires="a14">
           <p:sp>
             <p:nvSpPr>
               <p:cNvPr id="71" name="TextBox 70">
@@ -7315,7 +7316,7 @@
             </p:txBody>
           </p:sp>
         </mc:Choice>
-        <mc:Fallback>
+        <mc:Fallback xmlns="">
           <p:sp>
             <p:nvSpPr>
               <p:cNvPr id="71" name="TextBox 70">
@@ -7360,8 +7361,8 @@
           </p:sp>
         </mc:Fallback>
       </mc:AlternateContent>
-      <mc:AlternateContent xmlns:mc="http://schemas.openxmlformats.org/markup-compatibility/2006">
-        <mc:Choice xmlns:a14="http://schemas.microsoft.com/office/drawing/2010/main" Requires="a14">
+      <mc:AlternateContent xmlns:mc="http://schemas.openxmlformats.org/markup-compatibility/2006" xmlns:a14="http://schemas.microsoft.com/office/drawing/2010/main">
+        <mc:Choice Requires="a14">
           <p:sp>
             <p:nvSpPr>
               <p:cNvPr id="72" name="TextBox 71">
@@ -7452,7 +7453,7 @@
             </p:txBody>
           </p:sp>
         </mc:Choice>
-        <mc:Fallback>
+        <mc:Fallback xmlns="">
           <p:sp>
             <p:nvSpPr>
               <p:cNvPr id="72" name="TextBox 71">
@@ -7497,8 +7498,8 @@
           </p:sp>
         </mc:Fallback>
       </mc:AlternateContent>
-      <mc:AlternateContent xmlns:mc="http://schemas.openxmlformats.org/markup-compatibility/2006">
-        <mc:Choice xmlns:a14="http://schemas.microsoft.com/office/drawing/2010/main" Requires="a14">
+      <mc:AlternateContent xmlns:mc="http://schemas.openxmlformats.org/markup-compatibility/2006" xmlns:a14="http://schemas.microsoft.com/office/drawing/2010/main">
+        <mc:Choice Requires="a14">
           <p:sp>
             <p:nvSpPr>
               <p:cNvPr id="73" name="TextBox 72">
@@ -7589,7 +7590,7 @@
             </p:txBody>
           </p:sp>
         </mc:Choice>
-        <mc:Fallback>
+        <mc:Fallback xmlns="">
           <p:sp>
             <p:nvSpPr>
               <p:cNvPr id="73" name="TextBox 72">
@@ -7634,8 +7635,8 @@
           </p:sp>
         </mc:Fallback>
       </mc:AlternateContent>
-      <mc:AlternateContent xmlns:mc="http://schemas.openxmlformats.org/markup-compatibility/2006">
-        <mc:Choice xmlns:a14="http://schemas.microsoft.com/office/drawing/2010/main" Requires="a14">
+      <mc:AlternateContent xmlns:mc="http://schemas.openxmlformats.org/markup-compatibility/2006" xmlns:a14="http://schemas.microsoft.com/office/drawing/2010/main">
+        <mc:Choice Requires="a14">
           <p:sp>
             <p:nvSpPr>
               <p:cNvPr id="74" name="TextBox 73">
@@ -7726,7 +7727,7 @@
             </p:txBody>
           </p:sp>
         </mc:Choice>
-        <mc:Fallback>
+        <mc:Fallback xmlns="">
           <p:sp>
             <p:nvSpPr>
               <p:cNvPr id="74" name="TextBox 73">
@@ -7771,8 +7772,8 @@
           </p:sp>
         </mc:Fallback>
       </mc:AlternateContent>
-      <mc:AlternateContent xmlns:mc="http://schemas.openxmlformats.org/markup-compatibility/2006">
-        <mc:Choice xmlns:a14="http://schemas.microsoft.com/office/drawing/2010/main" Requires="a14">
+      <mc:AlternateContent xmlns:mc="http://schemas.openxmlformats.org/markup-compatibility/2006" xmlns:a14="http://schemas.microsoft.com/office/drawing/2010/main">
+        <mc:Choice Requires="a14">
           <p:sp>
             <p:nvSpPr>
               <p:cNvPr id="75" name="TextBox 74">
@@ -7863,7 +7864,7 @@
             </p:txBody>
           </p:sp>
         </mc:Choice>
-        <mc:Fallback>
+        <mc:Fallback xmlns="">
           <p:sp>
             <p:nvSpPr>
               <p:cNvPr id="75" name="TextBox 74">
@@ -7908,8 +7909,8 @@
           </p:sp>
         </mc:Fallback>
       </mc:AlternateContent>
-      <mc:AlternateContent xmlns:mc="http://schemas.openxmlformats.org/markup-compatibility/2006">
-        <mc:Choice xmlns:a14="http://schemas.microsoft.com/office/drawing/2010/main" Requires="a14">
+      <mc:AlternateContent xmlns:mc="http://schemas.openxmlformats.org/markup-compatibility/2006" xmlns:a14="http://schemas.microsoft.com/office/drawing/2010/main">
+        <mc:Choice Requires="a14">
           <p:sp>
             <p:nvSpPr>
               <p:cNvPr id="76" name="TextBox 75">
@@ -8000,7 +8001,7 @@
             </p:txBody>
           </p:sp>
         </mc:Choice>
-        <mc:Fallback>
+        <mc:Fallback xmlns="">
           <p:sp>
             <p:nvSpPr>
               <p:cNvPr id="76" name="TextBox 75">
@@ -8045,8 +8046,8 @@
           </p:sp>
         </mc:Fallback>
       </mc:AlternateContent>
-      <mc:AlternateContent xmlns:mc="http://schemas.openxmlformats.org/markup-compatibility/2006">
-        <mc:Choice xmlns:a14="http://schemas.microsoft.com/office/drawing/2010/main" Requires="a14">
+      <mc:AlternateContent xmlns:mc="http://schemas.openxmlformats.org/markup-compatibility/2006" xmlns:a14="http://schemas.microsoft.com/office/drawing/2010/main">
+        <mc:Choice Requires="a14">
           <p:sp>
             <p:nvSpPr>
               <p:cNvPr id="77" name="TextBox 76">
@@ -8137,7 +8138,7 @@
             </p:txBody>
           </p:sp>
         </mc:Choice>
-        <mc:Fallback>
+        <mc:Fallback xmlns="">
           <p:sp>
             <p:nvSpPr>
               <p:cNvPr id="77" name="TextBox 76">
@@ -8603,10 +8604,148 @@
       </p:grpSpPr>
       <p:cxnSp>
         <p:nvCxnSpPr>
-          <p:cNvPr id="8" name="Straight Connector 7">
-            <a:extLst>
-              <a:ext uri="{FF2B5EF4-FFF2-40B4-BE49-F238E27FC236}">
-                <a16:creationId xmlns:a16="http://schemas.microsoft.com/office/drawing/2014/main" id="{13654546-7D09-FF60-1FD6-2D05378B64FF}"/>
+          <p:cNvPr id="2" name="Straight Arrow Connector 1">
+            <a:extLst>
+              <a:ext uri="{FF2B5EF4-FFF2-40B4-BE49-F238E27FC236}">
+                <a16:creationId xmlns:a16="http://schemas.microsoft.com/office/drawing/2014/main" id="{29F768BA-839B-130E-2A75-38032861D416}"/>
+              </a:ext>
+            </a:extLst>
+          </p:cNvPr>
+          <p:cNvCxnSpPr/>
+          <p:nvPr/>
+        </p:nvCxnSpPr>
+        <p:spPr>
+          <a:xfrm>
+            <a:off x="1283855" y="1203779"/>
+            <a:ext cx="7370618" cy="0"/>
+          </a:xfrm>
+          <a:prstGeom prst="straightConnector1">
+            <a:avLst/>
+          </a:prstGeom>
+          <a:ln>
+            <a:solidFill>
+              <a:schemeClr val="tx1"/>
+            </a:solidFill>
+            <a:tailEnd type="triangle"/>
+          </a:ln>
+        </p:spPr>
+        <p:style>
+          <a:lnRef idx="1">
+            <a:schemeClr val="accent1"/>
+          </a:lnRef>
+          <a:fillRef idx="0">
+            <a:schemeClr val="accent1"/>
+          </a:fillRef>
+          <a:effectRef idx="0">
+            <a:schemeClr val="accent1"/>
+          </a:effectRef>
+          <a:fontRef idx="minor">
+            <a:schemeClr val="tx1"/>
+          </a:fontRef>
+        </p:style>
+      </p:cxnSp>
+      <mc:AlternateContent xmlns:mc="http://schemas.openxmlformats.org/markup-compatibility/2006">
+        <mc:Choice xmlns:a14="http://schemas.microsoft.com/office/drawing/2010/main" Requires="a14">
+          <p:sp>
+            <p:nvSpPr>
+              <p:cNvPr id="3" name="TextBox 2">
+                <a:extLst>
+                  <a:ext uri="{FF2B5EF4-FFF2-40B4-BE49-F238E27FC236}">
+                    <a16:creationId xmlns:a16="http://schemas.microsoft.com/office/drawing/2014/main" id="{EF9BED43-725E-532E-5170-7474B1C9C478}"/>
+                  </a:ext>
+                </a:extLst>
+              </p:cNvPr>
+              <p:cNvSpPr txBox="1"/>
+              <p:nvPr/>
+            </p:nvSpPr>
+            <p:spPr>
+              <a:xfrm>
+                <a:off x="8523789" y="1235284"/>
+                <a:ext cx="178767" cy="276999"/>
+              </a:xfrm>
+              <a:prstGeom prst="rect">
+                <a:avLst/>
+              </a:prstGeom>
+              <a:noFill/>
+            </p:spPr>
+            <p:txBody>
+              <a:bodyPr wrap="none" lIns="0" tIns="0" rIns="0" bIns="0" rtlCol="0">
+                <a:spAutoFit/>
+              </a:bodyPr>
+              <a:lstStyle/>
+              <a:p>
+                <a:pPr/>
+                <a14:m>
+                  <m:oMathPara xmlns:m="http://schemas.openxmlformats.org/officeDocument/2006/math">
+                    <m:oMathParaPr>
+                      <m:jc m:val="centerGroup"/>
+                    </m:oMathParaPr>
+                    <m:oMath xmlns:m="http://schemas.openxmlformats.org/officeDocument/2006/math">
+                      <m:r>
+                        <a:rPr lang="en-US" altLang="ko-KR" b="0" i="1" smtClean="0">
+                          <a:latin typeface="Cambria Math" panose="02040503050406030204" pitchFamily="18" charset="0"/>
+                        </a:rPr>
+                        <m:t>𝑡</m:t>
+                      </m:r>
+                    </m:oMath>
+                  </m:oMathPara>
+                </a14:m>
+                <a:endParaRPr lang="ko-KR" altLang="en-US" dirty="0"/>
+              </a:p>
+            </p:txBody>
+          </p:sp>
+        </mc:Choice>
+        <mc:Fallback>
+          <p:sp>
+            <p:nvSpPr>
+              <p:cNvPr id="3" name="TextBox 2">
+                <a:extLst>
+                  <a:ext uri="{FF2B5EF4-FFF2-40B4-BE49-F238E27FC236}">
+                    <a16:creationId xmlns:a16="http://schemas.microsoft.com/office/drawing/2014/main" id="{EF9BED43-725E-532E-5170-7474B1C9C478}"/>
+                  </a:ext>
+                </a:extLst>
+              </p:cNvPr>
+              <p:cNvSpPr txBox="1">
+                <a:spLocks noRot="1" noChangeAspect="1" noMove="1" noResize="1" noEditPoints="1" noAdjustHandles="1" noChangeArrowheads="1" noChangeShapeType="1" noTextEdit="1"/>
+              </p:cNvSpPr>
+              <p:nvPr/>
+            </p:nvSpPr>
+            <p:spPr>
+              <a:xfrm>
+                <a:off x="8523789" y="1235284"/>
+                <a:ext cx="178767" cy="276999"/>
+              </a:xfrm>
+              <a:prstGeom prst="rect">
+                <a:avLst/>
+              </a:prstGeom>
+              <a:blipFill>
+                <a:blip r:embed="rId2"/>
+                <a:stretch>
+                  <a:fillRect l="-16667" r="-16667" b="-8889"/>
+                </a:stretch>
+              </a:blipFill>
+            </p:spPr>
+            <p:txBody>
+              <a:bodyPr/>
+              <a:lstStyle/>
+              <a:p>
+                <a:r>
+                  <a:rPr lang="ko-KR" altLang="en-US">
+                    <a:noFill/>
+                  </a:rPr>
+                  <a:t> </a:t>
+                </a:r>
+              </a:p>
+            </p:txBody>
+          </p:sp>
+        </mc:Fallback>
+      </mc:AlternateContent>
+      <p:cxnSp>
+        <p:nvCxnSpPr>
+          <p:cNvPr id="4" name="Straight Connector 3">
+            <a:extLst>
+              <a:ext uri="{FF2B5EF4-FFF2-40B4-BE49-F238E27FC236}">
+                <a16:creationId xmlns:a16="http://schemas.microsoft.com/office/drawing/2014/main" id="{843E79AB-E01F-0A8A-FB70-314FBC1264F1}"/>
               </a:ext>
             </a:extLst>
           </p:cNvPr>
@@ -8644,10 +8783,10 @@
       </p:cxnSp>
       <p:cxnSp>
         <p:nvCxnSpPr>
-          <p:cNvPr id="12" name="Straight Connector 11">
-            <a:extLst>
-              <a:ext uri="{FF2B5EF4-FFF2-40B4-BE49-F238E27FC236}">
-                <a16:creationId xmlns:a16="http://schemas.microsoft.com/office/drawing/2014/main" id="{3D751185-DED9-EAD7-DC9F-241FB01080D5}"/>
+          <p:cNvPr id="5" name="Straight Connector 4">
+            <a:extLst>
+              <a:ext uri="{FF2B5EF4-FFF2-40B4-BE49-F238E27FC236}">
+                <a16:creationId xmlns:a16="http://schemas.microsoft.com/office/drawing/2014/main" id="{EFF3A819-2F48-A5CE-2C8E-CE085A08F024}"/>
               </a:ext>
             </a:extLst>
           </p:cNvPr>
@@ -8656,7 +8795,7 @@
         </p:nvCxnSpPr>
         <p:spPr>
           <a:xfrm>
-            <a:off x="2107985" y="1124531"/>
+            <a:off x="1279945" y="1124531"/>
             <a:ext cx="0" cy="147646"/>
           </a:xfrm>
           <a:prstGeom prst="line">
@@ -8685,596 +8824,10 @@
       </p:cxnSp>
       <p:cxnSp>
         <p:nvCxnSpPr>
-          <p:cNvPr id="15" name="Straight Connector 14">
-            <a:extLst>
-              <a:ext uri="{FF2B5EF4-FFF2-40B4-BE49-F238E27FC236}">
-                <a16:creationId xmlns:a16="http://schemas.microsoft.com/office/drawing/2014/main" id="{5ABC3223-F802-8EFD-8F59-248F9BEEFC92}"/>
-              </a:ext>
-            </a:extLst>
-          </p:cNvPr>
-          <p:cNvCxnSpPr>
-            <a:cxnSpLocks/>
-          </p:cNvCxnSpPr>
-          <p:nvPr/>
-        </p:nvCxnSpPr>
-        <p:spPr>
-          <a:xfrm>
-            <a:off x="1279945" y="1272177"/>
-            <a:ext cx="828040" cy="0"/>
-          </a:xfrm>
-          <a:prstGeom prst="line">
-            <a:avLst/>
-          </a:prstGeom>
-        </p:spPr>
-        <p:style>
-          <a:lnRef idx="1">
-            <a:schemeClr val="accent1"/>
-          </a:lnRef>
-          <a:fillRef idx="0">
-            <a:schemeClr val="accent1"/>
-          </a:fillRef>
-          <a:effectRef idx="0">
-            <a:schemeClr val="accent1"/>
-          </a:effectRef>
-          <a:fontRef idx="minor">
-            <a:schemeClr val="tx1"/>
-          </a:fontRef>
-        </p:style>
-      </p:cxnSp>
-      <p:cxnSp>
-        <p:nvCxnSpPr>
-          <p:cNvPr id="18" name="Straight Connector 17">
-            <a:extLst>
-              <a:ext uri="{FF2B5EF4-FFF2-40B4-BE49-F238E27FC236}">
-                <a16:creationId xmlns:a16="http://schemas.microsoft.com/office/drawing/2014/main" id="{9E63081E-16BA-46EB-70C5-4BFB660040D7}"/>
-              </a:ext>
-            </a:extLst>
-          </p:cNvPr>
-          <p:cNvCxnSpPr/>
-          <p:nvPr/>
-        </p:nvCxnSpPr>
-        <p:spPr>
-          <a:xfrm>
-            <a:off x="1279945" y="1124531"/>
-            <a:ext cx="4125175" cy="0"/>
-          </a:xfrm>
-          <a:prstGeom prst="line">
-            <a:avLst/>
-          </a:prstGeom>
-        </p:spPr>
-        <p:style>
-          <a:lnRef idx="1">
-            <a:schemeClr val="accent1"/>
-          </a:lnRef>
-          <a:fillRef idx="0">
-            <a:schemeClr val="accent1"/>
-          </a:fillRef>
-          <a:effectRef idx="0">
-            <a:schemeClr val="accent1"/>
-          </a:effectRef>
-          <a:fontRef idx="minor">
-            <a:schemeClr val="tx1"/>
-          </a:fontRef>
-        </p:style>
-      </p:cxnSp>
-      <p:cxnSp>
-        <p:nvCxnSpPr>
-          <p:cNvPr id="33" name="Straight Connector 32">
-            <a:extLst>
-              <a:ext uri="{FF2B5EF4-FFF2-40B4-BE49-F238E27FC236}">
-                <a16:creationId xmlns:a16="http://schemas.microsoft.com/office/drawing/2014/main" id="{B676F819-174C-3746-3125-55FC5BB33E23}"/>
-              </a:ext>
-            </a:extLst>
-          </p:cNvPr>
-          <p:cNvCxnSpPr/>
-          <p:nvPr/>
-        </p:nvCxnSpPr>
-        <p:spPr>
-          <a:xfrm>
-            <a:off x="2936025" y="1124531"/>
-            <a:ext cx="0" cy="147646"/>
-          </a:xfrm>
-          <a:prstGeom prst="line">
-            <a:avLst/>
-          </a:prstGeom>
-          <a:ln w="9525">
-            <a:solidFill>
-              <a:schemeClr val="tx1"/>
-            </a:solidFill>
-          </a:ln>
-        </p:spPr>
-        <p:style>
-          <a:lnRef idx="1">
-            <a:schemeClr val="dk1"/>
-          </a:lnRef>
-          <a:fillRef idx="0">
-            <a:schemeClr val="dk1"/>
-          </a:fillRef>
-          <a:effectRef idx="0">
-            <a:schemeClr val="dk1"/>
-          </a:effectRef>
-          <a:fontRef idx="minor">
-            <a:schemeClr val="tx1"/>
-          </a:fontRef>
-        </p:style>
-      </p:cxnSp>
-      <p:cxnSp>
-        <p:nvCxnSpPr>
-          <p:cNvPr id="36" name="Straight Connector 35">
-            <a:extLst>
-              <a:ext uri="{FF2B5EF4-FFF2-40B4-BE49-F238E27FC236}">
-                <a16:creationId xmlns:a16="http://schemas.microsoft.com/office/drawing/2014/main" id="{C8EE5BC3-9ADD-52A3-ACFF-984DCD8F8F8C}"/>
-              </a:ext>
-            </a:extLst>
-          </p:cNvPr>
-          <p:cNvCxnSpPr>
-            <a:cxnSpLocks/>
-          </p:cNvCxnSpPr>
-          <p:nvPr/>
-        </p:nvCxnSpPr>
-        <p:spPr>
-          <a:xfrm>
-            <a:off x="2107985" y="1272177"/>
-            <a:ext cx="828040" cy="0"/>
-          </a:xfrm>
-          <a:prstGeom prst="line">
-            <a:avLst/>
-          </a:prstGeom>
-        </p:spPr>
-        <p:style>
-          <a:lnRef idx="1">
-            <a:schemeClr val="accent1"/>
-          </a:lnRef>
-          <a:fillRef idx="0">
-            <a:schemeClr val="accent1"/>
-          </a:fillRef>
-          <a:effectRef idx="0">
-            <a:schemeClr val="accent1"/>
-          </a:effectRef>
-          <a:fontRef idx="minor">
-            <a:schemeClr val="tx1"/>
-          </a:fontRef>
-        </p:style>
-      </p:cxnSp>
-      <p:cxnSp>
-        <p:nvCxnSpPr>
-          <p:cNvPr id="37" name="Straight Connector 36">
-            <a:extLst>
-              <a:ext uri="{FF2B5EF4-FFF2-40B4-BE49-F238E27FC236}">
-                <a16:creationId xmlns:a16="http://schemas.microsoft.com/office/drawing/2014/main" id="{2637333F-0316-6CB9-EEC8-A38CCAC2DD98}"/>
-              </a:ext>
-            </a:extLst>
-          </p:cNvPr>
-          <p:cNvCxnSpPr>
-            <a:cxnSpLocks/>
-          </p:cNvCxnSpPr>
-          <p:nvPr/>
-        </p:nvCxnSpPr>
-        <p:spPr>
-          <a:xfrm>
-            <a:off x="2936025" y="1272177"/>
-            <a:ext cx="828040" cy="0"/>
-          </a:xfrm>
-          <a:prstGeom prst="line">
-            <a:avLst/>
-          </a:prstGeom>
-        </p:spPr>
-        <p:style>
-          <a:lnRef idx="1">
-            <a:schemeClr val="accent1"/>
-          </a:lnRef>
-          <a:fillRef idx="0">
-            <a:schemeClr val="accent1"/>
-          </a:fillRef>
-          <a:effectRef idx="0">
-            <a:schemeClr val="accent1"/>
-          </a:effectRef>
-          <a:fontRef idx="minor">
-            <a:schemeClr val="tx1"/>
-          </a:fontRef>
-        </p:style>
-      </p:cxnSp>
-      <p:cxnSp>
-        <p:nvCxnSpPr>
-          <p:cNvPr id="41" name="Straight Connector 40">
-            <a:extLst>
-              <a:ext uri="{FF2B5EF4-FFF2-40B4-BE49-F238E27FC236}">
-                <a16:creationId xmlns:a16="http://schemas.microsoft.com/office/drawing/2014/main" id="{236384C4-9B55-254E-4360-07A1A3CCD75C}"/>
-              </a:ext>
-            </a:extLst>
-          </p:cNvPr>
-          <p:cNvCxnSpPr/>
-          <p:nvPr/>
-        </p:nvCxnSpPr>
-        <p:spPr>
-          <a:xfrm>
-            <a:off x="3758770" y="1124531"/>
-            <a:ext cx="0" cy="147646"/>
-          </a:xfrm>
-          <a:prstGeom prst="line">
-            <a:avLst/>
-          </a:prstGeom>
-          <a:ln w="9525">
-            <a:solidFill>
-              <a:schemeClr val="tx1"/>
-            </a:solidFill>
-          </a:ln>
-        </p:spPr>
-        <p:style>
-          <a:lnRef idx="1">
-            <a:schemeClr val="dk1"/>
-          </a:lnRef>
-          <a:fillRef idx="0">
-            <a:schemeClr val="dk1"/>
-          </a:fillRef>
-          <a:effectRef idx="0">
-            <a:schemeClr val="dk1"/>
-          </a:effectRef>
-          <a:fontRef idx="minor">
-            <a:schemeClr val="tx1"/>
-          </a:fontRef>
-        </p:style>
-      </p:cxnSp>
-      <p:cxnSp>
-        <p:nvCxnSpPr>
-          <p:cNvPr id="46" name="Straight Connector 45">
-            <a:extLst>
-              <a:ext uri="{FF2B5EF4-FFF2-40B4-BE49-F238E27FC236}">
-                <a16:creationId xmlns:a16="http://schemas.microsoft.com/office/drawing/2014/main" id="{24DE4550-DB70-FFDF-C36A-E8286E9B0CDD}"/>
-              </a:ext>
-            </a:extLst>
-          </p:cNvPr>
-          <p:cNvCxnSpPr>
-            <a:cxnSpLocks/>
-          </p:cNvCxnSpPr>
-          <p:nvPr/>
-        </p:nvCxnSpPr>
-        <p:spPr>
-          <a:xfrm>
-            <a:off x="3758770" y="1272177"/>
-            <a:ext cx="828040" cy="0"/>
-          </a:xfrm>
-          <a:prstGeom prst="line">
-            <a:avLst/>
-          </a:prstGeom>
-        </p:spPr>
-        <p:style>
-          <a:lnRef idx="1">
-            <a:schemeClr val="accent1"/>
-          </a:lnRef>
-          <a:fillRef idx="0">
-            <a:schemeClr val="accent1"/>
-          </a:fillRef>
-          <a:effectRef idx="0">
-            <a:schemeClr val="accent1"/>
-          </a:effectRef>
-          <a:fontRef idx="minor">
-            <a:schemeClr val="tx1"/>
-          </a:fontRef>
-        </p:style>
-      </p:cxnSp>
-      <p:cxnSp>
-        <p:nvCxnSpPr>
-          <p:cNvPr id="53" name="Straight Connector 52">
-            <a:extLst>
-              <a:ext uri="{FF2B5EF4-FFF2-40B4-BE49-F238E27FC236}">
-                <a16:creationId xmlns:a16="http://schemas.microsoft.com/office/drawing/2014/main" id="{29147129-6E28-9C0F-73C5-DBFA132F6C5D}"/>
-              </a:ext>
-            </a:extLst>
-          </p:cNvPr>
-          <p:cNvCxnSpPr/>
-          <p:nvPr/>
-        </p:nvCxnSpPr>
-        <p:spPr>
-          <a:xfrm>
-            <a:off x="4586810" y="1124531"/>
-            <a:ext cx="0" cy="147646"/>
-          </a:xfrm>
-          <a:prstGeom prst="line">
-            <a:avLst/>
-          </a:prstGeom>
-          <a:ln w="9525">
-            <a:solidFill>
-              <a:schemeClr val="tx1"/>
-            </a:solidFill>
-          </a:ln>
-        </p:spPr>
-        <p:style>
-          <a:lnRef idx="1">
-            <a:schemeClr val="dk1"/>
-          </a:lnRef>
-          <a:fillRef idx="0">
-            <a:schemeClr val="dk1"/>
-          </a:fillRef>
-          <a:effectRef idx="0">
-            <a:schemeClr val="dk1"/>
-          </a:effectRef>
-          <a:fontRef idx="minor">
-            <a:schemeClr val="tx1"/>
-          </a:fontRef>
-        </p:style>
-      </p:cxnSp>
-      <p:cxnSp>
-        <p:nvCxnSpPr>
-          <p:cNvPr id="56" name="Straight Connector 55">
-            <a:extLst>
-              <a:ext uri="{FF2B5EF4-FFF2-40B4-BE49-F238E27FC236}">
-                <a16:creationId xmlns:a16="http://schemas.microsoft.com/office/drawing/2014/main" id="{2FC0BCA4-9E36-9356-9890-D0EDB82B8F6E}"/>
-              </a:ext>
-            </a:extLst>
-          </p:cNvPr>
-          <p:cNvCxnSpPr>
-            <a:cxnSpLocks/>
-          </p:cNvCxnSpPr>
-          <p:nvPr/>
-        </p:nvCxnSpPr>
-        <p:spPr>
-          <a:xfrm>
-            <a:off x="4586810" y="1272177"/>
-            <a:ext cx="828040" cy="0"/>
-          </a:xfrm>
-          <a:prstGeom prst="line">
-            <a:avLst/>
-          </a:prstGeom>
-        </p:spPr>
-        <p:style>
-          <a:lnRef idx="1">
-            <a:schemeClr val="accent1"/>
-          </a:lnRef>
-          <a:fillRef idx="0">
-            <a:schemeClr val="accent1"/>
-          </a:fillRef>
-          <a:effectRef idx="0">
-            <a:schemeClr val="accent1"/>
-          </a:effectRef>
-          <a:fontRef idx="minor">
-            <a:schemeClr val="tx1"/>
-          </a:fontRef>
-        </p:style>
-      </p:cxnSp>
-      <p:cxnSp>
-        <p:nvCxnSpPr>
-          <p:cNvPr id="57" name="Straight Connector 56">
-            <a:extLst>
-              <a:ext uri="{FF2B5EF4-FFF2-40B4-BE49-F238E27FC236}">
-                <a16:creationId xmlns:a16="http://schemas.microsoft.com/office/drawing/2014/main" id="{C30E9D9F-7FF1-F8AF-CC40-CFBDCFF85FB4}"/>
-              </a:ext>
-            </a:extLst>
-          </p:cNvPr>
-          <p:cNvCxnSpPr/>
-          <p:nvPr/>
-        </p:nvCxnSpPr>
-        <p:spPr>
-          <a:xfrm>
-            <a:off x="5414850" y="1124531"/>
-            <a:ext cx="0" cy="147646"/>
-          </a:xfrm>
-          <a:prstGeom prst="line">
-            <a:avLst/>
-          </a:prstGeom>
-          <a:ln w="9525">
-            <a:solidFill>
-              <a:schemeClr val="tx1"/>
-            </a:solidFill>
-          </a:ln>
-        </p:spPr>
-        <p:style>
-          <a:lnRef idx="1">
-            <a:schemeClr val="dk1"/>
-          </a:lnRef>
-          <a:fillRef idx="0">
-            <a:schemeClr val="dk1"/>
-          </a:fillRef>
-          <a:effectRef idx="0">
-            <a:schemeClr val="dk1"/>
-          </a:effectRef>
-          <a:fontRef idx="minor">
-            <a:schemeClr val="tx1"/>
-          </a:fontRef>
-        </p:style>
-      </p:cxnSp>
-      <p:cxnSp>
-        <p:nvCxnSpPr>
-          <p:cNvPr id="59" name="Straight Connector 58">
-            <a:extLst>
-              <a:ext uri="{FF2B5EF4-FFF2-40B4-BE49-F238E27FC236}">
-                <a16:creationId xmlns:a16="http://schemas.microsoft.com/office/drawing/2014/main" id="{87576246-9DBB-F856-2DBD-669B3144DE3C}"/>
-              </a:ext>
-            </a:extLst>
-          </p:cNvPr>
-          <p:cNvCxnSpPr>
-            <a:cxnSpLocks/>
-          </p:cNvCxnSpPr>
-          <p:nvPr/>
-        </p:nvCxnSpPr>
-        <p:spPr>
-          <a:xfrm>
-            <a:off x="5414850" y="1272177"/>
-            <a:ext cx="828040" cy="0"/>
-          </a:xfrm>
-          <a:prstGeom prst="line">
-            <a:avLst/>
-          </a:prstGeom>
-        </p:spPr>
-        <p:style>
-          <a:lnRef idx="1">
-            <a:schemeClr val="accent1"/>
-          </a:lnRef>
-          <a:fillRef idx="0">
-            <a:schemeClr val="accent1"/>
-          </a:fillRef>
-          <a:effectRef idx="0">
-            <a:schemeClr val="accent1"/>
-          </a:effectRef>
-          <a:fontRef idx="minor">
-            <a:schemeClr val="tx1"/>
-          </a:fontRef>
-        </p:style>
-      </p:cxnSp>
-      <p:cxnSp>
-        <p:nvCxnSpPr>
-          <p:cNvPr id="60" name="Straight Connector 59">
-            <a:extLst>
-              <a:ext uri="{FF2B5EF4-FFF2-40B4-BE49-F238E27FC236}">
-                <a16:creationId xmlns:a16="http://schemas.microsoft.com/office/drawing/2014/main" id="{5A452BEA-E723-B097-1501-591C682923B7}"/>
-              </a:ext>
-            </a:extLst>
-          </p:cNvPr>
-          <p:cNvCxnSpPr/>
-          <p:nvPr/>
-        </p:nvCxnSpPr>
-        <p:spPr>
-          <a:xfrm>
-            <a:off x="6242890" y="1124531"/>
-            <a:ext cx="0" cy="147646"/>
-          </a:xfrm>
-          <a:prstGeom prst="line">
-            <a:avLst/>
-          </a:prstGeom>
-          <a:ln w="9525">
-            <a:solidFill>
-              <a:schemeClr val="tx1"/>
-            </a:solidFill>
-          </a:ln>
-        </p:spPr>
-        <p:style>
-          <a:lnRef idx="1">
-            <a:schemeClr val="dk1"/>
-          </a:lnRef>
-          <a:fillRef idx="0">
-            <a:schemeClr val="dk1"/>
-          </a:fillRef>
-          <a:effectRef idx="0">
-            <a:schemeClr val="dk1"/>
-          </a:effectRef>
-          <a:fontRef idx="minor">
-            <a:schemeClr val="tx1"/>
-          </a:fontRef>
-        </p:style>
-      </p:cxnSp>
-      <p:cxnSp>
-        <p:nvCxnSpPr>
-          <p:cNvPr id="61" name="Straight Connector 60">
-            <a:extLst>
-              <a:ext uri="{FF2B5EF4-FFF2-40B4-BE49-F238E27FC236}">
-                <a16:creationId xmlns:a16="http://schemas.microsoft.com/office/drawing/2014/main" id="{0462800A-1205-97D3-F8CA-1B417CC19419}"/>
-              </a:ext>
-            </a:extLst>
-          </p:cNvPr>
-          <p:cNvCxnSpPr>
-            <a:cxnSpLocks/>
-          </p:cNvCxnSpPr>
-          <p:nvPr/>
-        </p:nvCxnSpPr>
-        <p:spPr>
-          <a:xfrm>
-            <a:off x="6242890" y="1272177"/>
-            <a:ext cx="828040" cy="0"/>
-          </a:xfrm>
-          <a:prstGeom prst="line">
-            <a:avLst/>
-          </a:prstGeom>
-        </p:spPr>
-        <p:style>
-          <a:lnRef idx="1">
-            <a:schemeClr val="accent1"/>
-          </a:lnRef>
-          <a:fillRef idx="0">
-            <a:schemeClr val="accent1"/>
-          </a:fillRef>
-          <a:effectRef idx="0">
-            <a:schemeClr val="accent1"/>
-          </a:effectRef>
-          <a:fontRef idx="minor">
-            <a:schemeClr val="tx1"/>
-          </a:fontRef>
-        </p:style>
-      </p:cxnSp>
-      <p:cxnSp>
-        <p:nvCxnSpPr>
-          <p:cNvPr id="62" name="Straight Connector 61">
-            <a:extLst>
-              <a:ext uri="{FF2B5EF4-FFF2-40B4-BE49-F238E27FC236}">
-                <a16:creationId xmlns:a16="http://schemas.microsoft.com/office/drawing/2014/main" id="{B47E75C4-42C5-BA9C-BA8D-DDFBD5A3C710}"/>
-              </a:ext>
-            </a:extLst>
-          </p:cNvPr>
-          <p:cNvCxnSpPr/>
-          <p:nvPr/>
-        </p:nvCxnSpPr>
-        <p:spPr>
-          <a:xfrm>
-            <a:off x="7071135" y="1124531"/>
-            <a:ext cx="0" cy="147646"/>
-          </a:xfrm>
-          <a:prstGeom prst="line">
-            <a:avLst/>
-          </a:prstGeom>
-          <a:ln w="9525">
-            <a:solidFill>
-              <a:schemeClr val="tx1"/>
-            </a:solidFill>
-          </a:ln>
-        </p:spPr>
-        <p:style>
-          <a:lnRef idx="1">
-            <a:schemeClr val="dk1"/>
-          </a:lnRef>
-          <a:fillRef idx="0">
-            <a:schemeClr val="dk1"/>
-          </a:fillRef>
-          <a:effectRef idx="0">
-            <a:schemeClr val="dk1"/>
-          </a:effectRef>
-          <a:fontRef idx="minor">
-            <a:schemeClr val="tx1"/>
-          </a:fontRef>
-        </p:style>
-      </p:cxnSp>
-      <p:cxnSp>
-        <p:nvCxnSpPr>
-          <p:cNvPr id="65" name="Straight Connector 64">
-            <a:extLst>
-              <a:ext uri="{FF2B5EF4-FFF2-40B4-BE49-F238E27FC236}">
-                <a16:creationId xmlns:a16="http://schemas.microsoft.com/office/drawing/2014/main" id="{4E1A56BE-1C29-2A0A-4E2C-93A5D7F1DEFF}"/>
-              </a:ext>
-            </a:extLst>
-          </p:cNvPr>
-          <p:cNvCxnSpPr>
-            <a:cxnSpLocks/>
-          </p:cNvCxnSpPr>
-          <p:nvPr/>
-        </p:nvCxnSpPr>
-        <p:spPr>
-          <a:xfrm>
-            <a:off x="7070930" y="1272177"/>
-            <a:ext cx="828040" cy="0"/>
-          </a:xfrm>
-          <a:prstGeom prst="line">
-            <a:avLst/>
-          </a:prstGeom>
-        </p:spPr>
-        <p:style>
-          <a:lnRef idx="1">
-            <a:schemeClr val="accent1"/>
-          </a:lnRef>
-          <a:fillRef idx="0">
-            <a:schemeClr val="accent1"/>
-          </a:fillRef>
-          <a:effectRef idx="0">
-            <a:schemeClr val="accent1"/>
-          </a:effectRef>
-          <a:fontRef idx="minor">
-            <a:schemeClr val="tx1"/>
-          </a:fontRef>
-        </p:style>
-      </p:cxnSp>
-      <p:cxnSp>
-        <p:nvCxnSpPr>
-          <p:cNvPr id="66" name="Straight Connector 65">
-            <a:extLst>
-              <a:ext uri="{FF2B5EF4-FFF2-40B4-BE49-F238E27FC236}">
-                <a16:creationId xmlns:a16="http://schemas.microsoft.com/office/drawing/2014/main" id="{AC7F63A5-AE40-4FFB-E5C8-6DE29AB8C756}"/>
+          <p:cNvPr id="16" name="Straight Connector 15">
+            <a:extLst>
+              <a:ext uri="{FF2B5EF4-FFF2-40B4-BE49-F238E27FC236}">
+                <a16:creationId xmlns:a16="http://schemas.microsoft.com/office/drawing/2014/main" id="{E31E9696-FF08-D7D6-0530-468DD0792316}"/>
               </a:ext>
             </a:extLst>
           </p:cNvPr>
@@ -9310,10 +8863,1140 @@
           </a:fontRef>
         </p:style>
       </p:cxnSp>
+      <p:sp>
+        <p:nvSpPr>
+          <p:cNvPr id="25" name="TextBox 24">
+            <a:extLst>
+              <a:ext uri="{FF2B5EF4-FFF2-40B4-BE49-F238E27FC236}">
+                <a16:creationId xmlns:a16="http://schemas.microsoft.com/office/drawing/2014/main" id="{A374E7FB-6EFA-5059-9462-4862EE7F4FB3}"/>
+              </a:ext>
+            </a:extLst>
+          </p:cNvPr>
+          <p:cNvSpPr txBox="1"/>
+          <p:nvPr/>
+        </p:nvSpPr>
+        <p:spPr>
+          <a:xfrm>
+            <a:off x="1190027" y="1267535"/>
+            <a:ext cx="179428" cy="246221"/>
+          </a:xfrm>
+          <a:prstGeom prst="rect">
+            <a:avLst/>
+          </a:prstGeom>
+          <a:noFill/>
+        </p:spPr>
+        <p:txBody>
+          <a:bodyPr wrap="square" rtlCol="0">
+            <a:spAutoFit/>
+          </a:bodyPr>
+          <a:lstStyle/>
+          <a:p>
+            <a:pPr algn="ctr"/>
+            <a:r>
+              <a:rPr lang="en-US" altLang="ko-KR" sz="1000" dirty="0"/>
+              <a:t>0</a:t>
+            </a:r>
+            <a:endParaRPr lang="ko-KR" altLang="en-US" sz="1000" dirty="0"/>
+          </a:p>
+        </p:txBody>
+      </p:sp>
+      <p:sp>
+        <p:nvSpPr>
+          <p:cNvPr id="27" name="TextBox 26">
+            <a:extLst>
+              <a:ext uri="{FF2B5EF4-FFF2-40B4-BE49-F238E27FC236}">
+                <a16:creationId xmlns:a16="http://schemas.microsoft.com/office/drawing/2014/main" id="{F1C86EFD-98B5-4786-165F-B8C2E7CC9B4B}"/>
+              </a:ext>
+            </a:extLst>
+          </p:cNvPr>
+          <p:cNvSpPr txBox="1"/>
+          <p:nvPr/>
+        </p:nvSpPr>
+        <p:spPr>
+          <a:xfrm>
+            <a:off x="7812244" y="1272177"/>
+            <a:ext cx="179428" cy="246221"/>
+          </a:xfrm>
+          <a:prstGeom prst="rect">
+            <a:avLst/>
+          </a:prstGeom>
+          <a:noFill/>
+        </p:spPr>
+        <p:txBody>
+          <a:bodyPr wrap="square" rtlCol="0">
+            <a:spAutoFit/>
+          </a:bodyPr>
+          <a:lstStyle/>
+          <a:p>
+            <a:pPr algn="ctr"/>
+            <a:r>
+              <a:rPr lang="en-US" altLang="ko-KR" sz="1000" dirty="0"/>
+              <a:t>1</a:t>
+            </a:r>
+            <a:endParaRPr lang="ko-KR" altLang="en-US" sz="1000" dirty="0"/>
+          </a:p>
+        </p:txBody>
+      </p:sp>
+      <p:cxnSp>
+        <p:nvCxnSpPr>
+          <p:cNvPr id="28" name="Straight Arrow Connector 27">
+            <a:extLst>
+              <a:ext uri="{FF2B5EF4-FFF2-40B4-BE49-F238E27FC236}">
+                <a16:creationId xmlns:a16="http://schemas.microsoft.com/office/drawing/2014/main" id="{29F768BA-839B-130E-2A75-38032861D416}"/>
+              </a:ext>
+            </a:extLst>
+          </p:cNvPr>
+          <p:cNvCxnSpPr/>
+          <p:nvPr/>
+        </p:nvCxnSpPr>
+        <p:spPr>
+          <a:xfrm>
+            <a:off x="1283855" y="3270323"/>
+            <a:ext cx="7370618" cy="0"/>
+          </a:xfrm>
+          <a:prstGeom prst="straightConnector1">
+            <a:avLst/>
+          </a:prstGeom>
+          <a:ln>
+            <a:solidFill>
+              <a:schemeClr val="tx1"/>
+            </a:solidFill>
+            <a:tailEnd type="triangle"/>
+          </a:ln>
+        </p:spPr>
+        <p:style>
+          <a:lnRef idx="1">
+            <a:schemeClr val="accent1"/>
+          </a:lnRef>
+          <a:fillRef idx="0">
+            <a:schemeClr val="accent1"/>
+          </a:fillRef>
+          <a:effectRef idx="0">
+            <a:schemeClr val="accent1"/>
+          </a:effectRef>
+          <a:fontRef idx="minor">
+            <a:schemeClr val="tx1"/>
+          </a:fontRef>
+        </p:style>
+      </p:cxnSp>
+      <mc:AlternateContent xmlns:mc="http://schemas.openxmlformats.org/markup-compatibility/2006">
+        <mc:Choice xmlns:a14="http://schemas.microsoft.com/office/drawing/2010/main" Requires="a14">
+          <p:sp>
+            <p:nvSpPr>
+              <p:cNvPr id="29" name="TextBox 28">
+                <a:extLst>
+                  <a:ext uri="{FF2B5EF4-FFF2-40B4-BE49-F238E27FC236}">
+                    <a16:creationId xmlns:a16="http://schemas.microsoft.com/office/drawing/2014/main" id="{EF9BED43-725E-532E-5170-7474B1C9C478}"/>
+                  </a:ext>
+                </a:extLst>
+              </p:cNvPr>
+              <p:cNvSpPr txBox="1"/>
+              <p:nvPr/>
+            </p:nvSpPr>
+            <p:spPr>
+              <a:xfrm>
+                <a:off x="8523789" y="3301828"/>
+                <a:ext cx="178767" cy="276999"/>
+              </a:xfrm>
+              <a:prstGeom prst="rect">
+                <a:avLst/>
+              </a:prstGeom>
+              <a:noFill/>
+            </p:spPr>
+            <p:txBody>
+              <a:bodyPr wrap="none" lIns="0" tIns="0" rIns="0" bIns="0" rtlCol="0">
+                <a:spAutoFit/>
+              </a:bodyPr>
+              <a:lstStyle/>
+              <a:p>
+                <a:pPr/>
+                <a14:m>
+                  <m:oMathPara xmlns:m="http://schemas.openxmlformats.org/officeDocument/2006/math">
+                    <m:oMathParaPr>
+                      <m:jc m:val="centerGroup"/>
+                    </m:oMathParaPr>
+                    <m:oMath xmlns:m="http://schemas.openxmlformats.org/officeDocument/2006/math">
+                      <m:r>
+                        <a:rPr lang="en-US" altLang="ko-KR" b="0" i="1" smtClean="0">
+                          <a:latin typeface="Cambria Math" panose="02040503050406030204" pitchFamily="18" charset="0"/>
+                        </a:rPr>
+                        <m:t>𝑡</m:t>
+                      </m:r>
+                    </m:oMath>
+                  </m:oMathPara>
+                </a14:m>
+                <a:endParaRPr lang="ko-KR" altLang="en-US" dirty="0"/>
+              </a:p>
+            </p:txBody>
+          </p:sp>
+        </mc:Choice>
+        <mc:Fallback>
+          <p:sp>
+            <p:nvSpPr>
+              <p:cNvPr id="29" name="TextBox 28">
+                <a:extLst>
+                  <a:ext uri="{FF2B5EF4-FFF2-40B4-BE49-F238E27FC236}">
+                    <a16:creationId xmlns:a16="http://schemas.microsoft.com/office/drawing/2014/main" id="{EF9BED43-725E-532E-5170-7474B1C9C478}"/>
+                  </a:ext>
+                </a:extLst>
+              </p:cNvPr>
+              <p:cNvSpPr txBox="1">
+                <a:spLocks noRot="1" noChangeAspect="1" noMove="1" noResize="1" noEditPoints="1" noAdjustHandles="1" noChangeArrowheads="1" noChangeShapeType="1" noTextEdit="1"/>
+              </p:cNvSpPr>
+              <p:nvPr/>
+            </p:nvSpPr>
+            <p:spPr>
+              <a:xfrm>
+                <a:off x="8523789" y="3301828"/>
+                <a:ext cx="178767" cy="276999"/>
+              </a:xfrm>
+              <a:prstGeom prst="rect">
+                <a:avLst/>
+              </a:prstGeom>
+              <a:blipFill>
+                <a:blip r:embed="rId2"/>
+                <a:stretch>
+                  <a:fillRect l="-16667" r="-16667" b="-8889"/>
+                </a:stretch>
+              </a:blipFill>
+            </p:spPr>
+            <p:txBody>
+              <a:bodyPr/>
+              <a:lstStyle/>
+              <a:p>
+                <a:r>
+                  <a:rPr lang="ko-KR" altLang="en-US">
+                    <a:noFill/>
+                  </a:rPr>
+                  <a:t> </a:t>
+                </a:r>
+              </a:p>
+            </p:txBody>
+          </p:sp>
+        </mc:Fallback>
+      </mc:AlternateContent>
+      <p:cxnSp>
+        <p:nvCxnSpPr>
+          <p:cNvPr id="30" name="Straight Connector 29">
+            <a:extLst>
+              <a:ext uri="{FF2B5EF4-FFF2-40B4-BE49-F238E27FC236}">
+                <a16:creationId xmlns:a16="http://schemas.microsoft.com/office/drawing/2014/main" id="{843E79AB-E01F-0A8A-FB70-314FBC1264F1}"/>
+              </a:ext>
+            </a:extLst>
+          </p:cNvPr>
+          <p:cNvCxnSpPr/>
+          <p:nvPr/>
+        </p:nvCxnSpPr>
+        <p:spPr>
+          <a:xfrm>
+            <a:off x="1279945" y="3191075"/>
+            <a:ext cx="0" cy="147646"/>
+          </a:xfrm>
+          <a:prstGeom prst="line">
+            <a:avLst/>
+          </a:prstGeom>
+          <a:ln w="9525">
+            <a:solidFill>
+              <a:schemeClr val="tx1"/>
+            </a:solidFill>
+          </a:ln>
+        </p:spPr>
+        <p:style>
+          <a:lnRef idx="1">
+            <a:schemeClr val="dk1"/>
+          </a:lnRef>
+          <a:fillRef idx="0">
+            <a:schemeClr val="dk1"/>
+          </a:fillRef>
+          <a:effectRef idx="0">
+            <a:schemeClr val="dk1"/>
+          </a:effectRef>
+          <a:fontRef idx="minor">
+            <a:schemeClr val="tx1"/>
+          </a:fontRef>
+        </p:style>
+      </p:cxnSp>
+      <p:cxnSp>
+        <p:nvCxnSpPr>
+          <p:cNvPr id="31" name="Straight Connector 30">
+            <a:extLst>
+              <a:ext uri="{FF2B5EF4-FFF2-40B4-BE49-F238E27FC236}">
+                <a16:creationId xmlns:a16="http://schemas.microsoft.com/office/drawing/2014/main" id="{EFF3A819-2F48-A5CE-2C8E-CE085A08F024}"/>
+              </a:ext>
+            </a:extLst>
+          </p:cNvPr>
+          <p:cNvCxnSpPr/>
+          <p:nvPr/>
+        </p:nvCxnSpPr>
+        <p:spPr>
+          <a:xfrm>
+            <a:off x="1279945" y="3191075"/>
+            <a:ext cx="0" cy="147646"/>
+          </a:xfrm>
+          <a:prstGeom prst="line">
+            <a:avLst/>
+          </a:prstGeom>
+          <a:ln w="9525">
+            <a:solidFill>
+              <a:schemeClr val="tx1"/>
+            </a:solidFill>
+          </a:ln>
+        </p:spPr>
+        <p:style>
+          <a:lnRef idx="1">
+            <a:schemeClr val="dk1"/>
+          </a:lnRef>
+          <a:fillRef idx="0">
+            <a:schemeClr val="dk1"/>
+          </a:fillRef>
+          <a:effectRef idx="0">
+            <a:schemeClr val="dk1"/>
+          </a:effectRef>
+          <a:fontRef idx="minor">
+            <a:schemeClr val="tx1"/>
+          </a:fontRef>
+        </p:style>
+      </p:cxnSp>
+      <p:cxnSp>
+        <p:nvCxnSpPr>
+          <p:cNvPr id="32" name="Straight Connector 31">
+            <a:extLst>
+              <a:ext uri="{FF2B5EF4-FFF2-40B4-BE49-F238E27FC236}">
+                <a16:creationId xmlns:a16="http://schemas.microsoft.com/office/drawing/2014/main" id="{9E24731E-F813-19B7-5958-F1EC38273371}"/>
+              </a:ext>
+            </a:extLst>
+          </p:cNvPr>
+          <p:cNvCxnSpPr/>
+          <p:nvPr/>
+        </p:nvCxnSpPr>
+        <p:spPr>
+          <a:xfrm>
+            <a:off x="3758770" y="3191075"/>
+            <a:ext cx="0" cy="147646"/>
+          </a:xfrm>
+          <a:prstGeom prst="line">
+            <a:avLst/>
+          </a:prstGeom>
+          <a:ln w="9525">
+            <a:solidFill>
+              <a:schemeClr val="tx1"/>
+            </a:solidFill>
+          </a:ln>
+        </p:spPr>
+        <p:style>
+          <a:lnRef idx="1">
+            <a:schemeClr val="dk1"/>
+          </a:lnRef>
+          <a:fillRef idx="0">
+            <a:schemeClr val="dk1"/>
+          </a:fillRef>
+          <a:effectRef idx="0">
+            <a:schemeClr val="dk1"/>
+          </a:effectRef>
+          <a:fontRef idx="minor">
+            <a:schemeClr val="tx1"/>
+          </a:fontRef>
+        </p:style>
+      </p:cxnSp>
+      <p:cxnSp>
+        <p:nvCxnSpPr>
+          <p:cNvPr id="34" name="Straight Connector 33">
+            <a:extLst>
+              <a:ext uri="{FF2B5EF4-FFF2-40B4-BE49-F238E27FC236}">
+                <a16:creationId xmlns:a16="http://schemas.microsoft.com/office/drawing/2014/main" id="{85980F1F-6BD9-7709-8E4A-0DEE16F52578}"/>
+              </a:ext>
+            </a:extLst>
+          </p:cNvPr>
+          <p:cNvCxnSpPr/>
+          <p:nvPr/>
+        </p:nvCxnSpPr>
+        <p:spPr>
+          <a:xfrm>
+            <a:off x="4586810" y="3191075"/>
+            <a:ext cx="0" cy="147646"/>
+          </a:xfrm>
+          <a:prstGeom prst="line">
+            <a:avLst/>
+          </a:prstGeom>
+          <a:ln w="9525">
+            <a:solidFill>
+              <a:schemeClr val="tx1"/>
+            </a:solidFill>
+          </a:ln>
+        </p:spPr>
+        <p:style>
+          <a:lnRef idx="1">
+            <a:schemeClr val="dk1"/>
+          </a:lnRef>
+          <a:fillRef idx="0">
+            <a:schemeClr val="dk1"/>
+          </a:fillRef>
+          <a:effectRef idx="0">
+            <a:schemeClr val="dk1"/>
+          </a:effectRef>
+          <a:fontRef idx="minor">
+            <a:schemeClr val="tx1"/>
+          </a:fontRef>
+        </p:style>
+      </p:cxnSp>
+      <p:cxnSp>
+        <p:nvCxnSpPr>
+          <p:cNvPr id="35" name="Straight Connector 34">
+            <a:extLst>
+              <a:ext uri="{FF2B5EF4-FFF2-40B4-BE49-F238E27FC236}">
+                <a16:creationId xmlns:a16="http://schemas.microsoft.com/office/drawing/2014/main" id="{E31E9696-FF08-D7D6-0530-468DD0792316}"/>
+              </a:ext>
+            </a:extLst>
+          </p:cNvPr>
+          <p:cNvCxnSpPr/>
+          <p:nvPr/>
+        </p:nvCxnSpPr>
+        <p:spPr>
+          <a:xfrm>
+            <a:off x="7898970" y="3191075"/>
+            <a:ext cx="0" cy="147646"/>
+          </a:xfrm>
+          <a:prstGeom prst="line">
+            <a:avLst/>
+          </a:prstGeom>
+          <a:ln w="9525">
+            <a:solidFill>
+              <a:schemeClr val="tx1"/>
+            </a:solidFill>
+          </a:ln>
+        </p:spPr>
+        <p:style>
+          <a:lnRef idx="1">
+            <a:schemeClr val="dk1"/>
+          </a:lnRef>
+          <a:fillRef idx="0">
+            <a:schemeClr val="dk1"/>
+          </a:fillRef>
+          <a:effectRef idx="0">
+            <a:schemeClr val="dk1"/>
+          </a:effectRef>
+          <a:fontRef idx="minor">
+            <a:schemeClr val="tx1"/>
+          </a:fontRef>
+        </p:style>
+      </p:cxnSp>
+      <p:sp>
+        <p:nvSpPr>
+          <p:cNvPr id="38" name="TextBox 37">
+            <a:extLst>
+              <a:ext uri="{FF2B5EF4-FFF2-40B4-BE49-F238E27FC236}">
+                <a16:creationId xmlns:a16="http://schemas.microsoft.com/office/drawing/2014/main" id="{A374E7FB-6EFA-5059-9462-4862EE7F4FB3}"/>
+              </a:ext>
+            </a:extLst>
+          </p:cNvPr>
+          <p:cNvSpPr txBox="1"/>
+          <p:nvPr/>
+        </p:nvSpPr>
+        <p:spPr>
+          <a:xfrm>
+            <a:off x="1190027" y="3334079"/>
+            <a:ext cx="179428" cy="246221"/>
+          </a:xfrm>
+          <a:prstGeom prst="rect">
+            <a:avLst/>
+          </a:prstGeom>
+          <a:noFill/>
+        </p:spPr>
+        <p:txBody>
+          <a:bodyPr wrap="square" rtlCol="0">
+            <a:spAutoFit/>
+          </a:bodyPr>
+          <a:lstStyle/>
+          <a:p>
+            <a:pPr algn="ctr"/>
+            <a:r>
+              <a:rPr lang="en-US" altLang="ko-KR" sz="1000" dirty="0"/>
+              <a:t>0</a:t>
+            </a:r>
+            <a:endParaRPr lang="ko-KR" altLang="en-US" sz="1000" dirty="0"/>
+          </a:p>
+        </p:txBody>
+      </p:sp>
+      <p:sp>
+        <p:nvSpPr>
+          <p:cNvPr id="39" name="TextBox 38">
+            <a:extLst>
+              <a:ext uri="{FF2B5EF4-FFF2-40B4-BE49-F238E27FC236}">
+                <a16:creationId xmlns:a16="http://schemas.microsoft.com/office/drawing/2014/main" id="{F1C86EFD-98B5-4786-165F-B8C2E7CC9B4B}"/>
+              </a:ext>
+            </a:extLst>
+          </p:cNvPr>
+          <p:cNvSpPr txBox="1"/>
+          <p:nvPr/>
+        </p:nvSpPr>
+        <p:spPr>
+          <a:xfrm>
+            <a:off x="7812244" y="3338721"/>
+            <a:ext cx="179428" cy="246221"/>
+          </a:xfrm>
+          <a:prstGeom prst="rect">
+            <a:avLst/>
+          </a:prstGeom>
+          <a:noFill/>
+        </p:spPr>
+        <p:txBody>
+          <a:bodyPr wrap="square" rtlCol="0">
+            <a:spAutoFit/>
+          </a:bodyPr>
+          <a:lstStyle/>
+          <a:p>
+            <a:pPr algn="ctr"/>
+            <a:r>
+              <a:rPr lang="en-US" altLang="ko-KR" sz="1000" dirty="0"/>
+              <a:t>1</a:t>
+            </a:r>
+            <a:endParaRPr lang="ko-KR" altLang="en-US" sz="1000" dirty="0"/>
+          </a:p>
+        </p:txBody>
+      </p:sp>
+      <mc:AlternateContent xmlns:mc="http://schemas.openxmlformats.org/markup-compatibility/2006">
+        <mc:Choice xmlns:a14="http://schemas.microsoft.com/office/drawing/2010/main" Requires="a14">
+          <p:sp>
+            <p:nvSpPr>
+              <p:cNvPr id="40" name="TextBox 39">
+                <a:extLst>
+                  <a:ext uri="{FF2B5EF4-FFF2-40B4-BE49-F238E27FC236}">
+                    <a16:creationId xmlns:a16="http://schemas.microsoft.com/office/drawing/2014/main" id="{0523E65B-E0B1-85C3-4A56-A7D4840EB7EB}"/>
+                  </a:ext>
+                </a:extLst>
+              </p:cNvPr>
+              <p:cNvSpPr txBox="1"/>
+              <p:nvPr/>
+            </p:nvSpPr>
+            <p:spPr>
+              <a:xfrm>
+                <a:off x="3611366" y="3432729"/>
+                <a:ext cx="342851" cy="292196"/>
+              </a:xfrm>
+              <a:prstGeom prst="rect">
+                <a:avLst/>
+              </a:prstGeom>
+              <a:noFill/>
+            </p:spPr>
+            <p:txBody>
+              <a:bodyPr wrap="none" lIns="0" tIns="0" rIns="0" bIns="0" rtlCol="0">
+                <a:spAutoFit/>
+              </a:bodyPr>
+              <a:lstStyle/>
+              <a:p>
+                <a14:m>
+                  <m:oMathPara xmlns:m="http://schemas.openxmlformats.org/officeDocument/2006/math">
+                    <m:oMathParaPr>
+                      <m:jc m:val="centerGroup"/>
+                    </m:oMathParaPr>
+                    <m:oMath xmlns:m="http://schemas.openxmlformats.org/officeDocument/2006/math">
+                      <m:f>
+                        <m:fPr>
+                          <m:ctrlPr>
+                            <a:rPr lang="en-US" altLang="ko-KR" sz="1000" i="1" smtClean="0">
+                              <a:latin typeface="Cambria Math" panose="02040503050406030204" pitchFamily="18" charset="0"/>
+                            </a:rPr>
+                          </m:ctrlPr>
+                        </m:fPr>
+                        <m:num>
+                          <m:r>
+                            <a:rPr lang="en-US" altLang="ko-KR" sz="1000" b="0" i="1" smtClean="0">
+                              <a:latin typeface="Cambria Math" panose="02040503050406030204" pitchFamily="18" charset="0"/>
+                            </a:rPr>
+                            <m:t>𝑘</m:t>
+                          </m:r>
+                          <m:r>
+                            <a:rPr lang="en-US" altLang="ko-KR" sz="1000" b="0" i="1" smtClean="0">
+                              <a:latin typeface="Cambria Math" panose="02040503050406030204" pitchFamily="18" charset="0"/>
+                            </a:rPr>
+                            <m:t>−1</m:t>
+                          </m:r>
+                        </m:num>
+                        <m:den>
+                          <m:r>
+                            <a:rPr lang="en-US" altLang="ko-KR" sz="1000" b="0" i="1" smtClean="0">
+                              <a:latin typeface="Cambria Math" panose="02040503050406030204" pitchFamily="18" charset="0"/>
+                            </a:rPr>
+                            <m:t>𝑚</m:t>
+                          </m:r>
+                        </m:den>
+                      </m:f>
+                    </m:oMath>
+                  </m:oMathPara>
+                </a14:m>
+                <a:endParaRPr lang="ko-KR" altLang="en-US" sz="1000" dirty="0"/>
+              </a:p>
+            </p:txBody>
+          </p:sp>
+        </mc:Choice>
+        <mc:Fallback>
+          <p:sp>
+            <p:nvSpPr>
+              <p:cNvPr id="40" name="TextBox 39">
+                <a:extLst>
+                  <a:ext uri="{FF2B5EF4-FFF2-40B4-BE49-F238E27FC236}">
+                    <a16:creationId xmlns:a16="http://schemas.microsoft.com/office/drawing/2014/main" id="{0523E65B-E0B1-85C3-4A56-A7D4840EB7EB}"/>
+                  </a:ext>
+                </a:extLst>
+              </p:cNvPr>
+              <p:cNvSpPr txBox="1">
+                <a:spLocks noRot="1" noChangeAspect="1" noMove="1" noResize="1" noEditPoints="1" noAdjustHandles="1" noChangeArrowheads="1" noChangeShapeType="1" noTextEdit="1"/>
+              </p:cNvSpPr>
+              <p:nvPr/>
+            </p:nvSpPr>
+            <p:spPr>
+              <a:xfrm>
+                <a:off x="3611366" y="3432729"/>
+                <a:ext cx="342851" cy="292196"/>
+              </a:xfrm>
+              <a:prstGeom prst="rect">
+                <a:avLst/>
+              </a:prstGeom>
+              <a:blipFill>
+                <a:blip r:embed="rId3"/>
+                <a:stretch>
+                  <a:fillRect l="-7018" t="-4167" r="-7018" b="-10417"/>
+                </a:stretch>
+              </a:blipFill>
+            </p:spPr>
+            <p:txBody>
+              <a:bodyPr/>
+              <a:lstStyle/>
+              <a:p>
+                <a:r>
+                  <a:rPr lang="ko-KR" altLang="en-US">
+                    <a:noFill/>
+                  </a:rPr>
+                  <a:t> </a:t>
+                </a:r>
+              </a:p>
+            </p:txBody>
+          </p:sp>
+        </mc:Fallback>
+      </mc:AlternateContent>
+      <mc:AlternateContent xmlns:mc="http://schemas.openxmlformats.org/markup-compatibility/2006">
+        <mc:Choice xmlns:a14="http://schemas.microsoft.com/office/drawing/2010/main" Requires="a14">
+          <p:sp>
+            <p:nvSpPr>
+              <p:cNvPr id="42" name="TextBox 41">
+                <a:extLst>
+                  <a:ext uri="{FF2B5EF4-FFF2-40B4-BE49-F238E27FC236}">
+                    <a16:creationId xmlns:a16="http://schemas.microsoft.com/office/drawing/2014/main" id="{0114BA25-4D0D-2CFA-E802-90AEAB6A162A}"/>
+                  </a:ext>
+                </a:extLst>
+              </p:cNvPr>
+              <p:cNvSpPr txBox="1"/>
+              <p:nvPr/>
+            </p:nvSpPr>
+            <p:spPr>
+              <a:xfrm>
+                <a:off x="4517655" y="3430430"/>
+                <a:ext cx="154466" cy="292196"/>
+              </a:xfrm>
+              <a:prstGeom prst="rect">
+                <a:avLst/>
+              </a:prstGeom>
+              <a:noFill/>
+            </p:spPr>
+            <p:txBody>
+              <a:bodyPr wrap="none" lIns="0" tIns="0" rIns="0" bIns="0" rtlCol="0">
+                <a:spAutoFit/>
+              </a:bodyPr>
+              <a:lstStyle/>
+              <a:p>
+                <a14:m>
+                  <m:oMathPara xmlns:m="http://schemas.openxmlformats.org/officeDocument/2006/math">
+                    <m:oMathParaPr>
+                      <m:jc m:val="centerGroup"/>
+                    </m:oMathParaPr>
+                    <m:oMath xmlns:m="http://schemas.openxmlformats.org/officeDocument/2006/math">
+                      <m:f>
+                        <m:fPr>
+                          <m:ctrlPr>
+                            <a:rPr lang="en-US" altLang="ko-KR" sz="1000" i="1" smtClean="0">
+                              <a:latin typeface="Cambria Math" panose="02040503050406030204" pitchFamily="18" charset="0"/>
+                            </a:rPr>
+                          </m:ctrlPr>
+                        </m:fPr>
+                        <m:num>
+                          <m:r>
+                            <a:rPr lang="en-US" altLang="ko-KR" sz="1000" b="0" i="1" smtClean="0">
+                              <a:latin typeface="Cambria Math" panose="02040503050406030204" pitchFamily="18" charset="0"/>
+                            </a:rPr>
+                            <m:t>𝑘</m:t>
+                          </m:r>
+                        </m:num>
+                        <m:den>
+                          <m:r>
+                            <a:rPr lang="en-US" altLang="ko-KR" sz="1000" b="0" i="1" smtClean="0">
+                              <a:latin typeface="Cambria Math" panose="02040503050406030204" pitchFamily="18" charset="0"/>
+                            </a:rPr>
+                            <m:t>𝑚</m:t>
+                          </m:r>
+                        </m:den>
+                      </m:f>
+                    </m:oMath>
+                  </m:oMathPara>
+                </a14:m>
+                <a:endParaRPr lang="ko-KR" altLang="en-US" sz="1000" dirty="0"/>
+              </a:p>
+            </p:txBody>
+          </p:sp>
+        </mc:Choice>
+        <mc:Fallback>
+          <p:sp>
+            <p:nvSpPr>
+              <p:cNvPr id="42" name="TextBox 41">
+                <a:extLst>
+                  <a:ext uri="{FF2B5EF4-FFF2-40B4-BE49-F238E27FC236}">
+                    <a16:creationId xmlns:a16="http://schemas.microsoft.com/office/drawing/2014/main" id="{0114BA25-4D0D-2CFA-E802-90AEAB6A162A}"/>
+                  </a:ext>
+                </a:extLst>
+              </p:cNvPr>
+              <p:cNvSpPr txBox="1">
+                <a:spLocks noRot="1" noChangeAspect="1" noMove="1" noResize="1" noEditPoints="1" noAdjustHandles="1" noChangeArrowheads="1" noChangeShapeType="1" noTextEdit="1"/>
+              </p:cNvSpPr>
+              <p:nvPr/>
+            </p:nvSpPr>
+            <p:spPr>
+              <a:xfrm>
+                <a:off x="4517655" y="3430430"/>
+                <a:ext cx="154466" cy="292196"/>
+              </a:xfrm>
+              <a:prstGeom prst="rect">
+                <a:avLst/>
+              </a:prstGeom>
+              <a:blipFill>
+                <a:blip r:embed="rId4"/>
+                <a:stretch>
+                  <a:fillRect l="-4000" t="-6250" r="-12000" b="-8333"/>
+                </a:stretch>
+              </a:blipFill>
+            </p:spPr>
+            <p:txBody>
+              <a:bodyPr/>
+              <a:lstStyle/>
+              <a:p>
+                <a:r>
+                  <a:rPr lang="ko-KR" altLang="en-US">
+                    <a:noFill/>
+                  </a:rPr>
+                  <a:t> </a:t>
+                </a:r>
+              </a:p>
+            </p:txBody>
+          </p:sp>
+        </mc:Fallback>
+      </mc:AlternateContent>
+      <p:cxnSp>
+        <p:nvCxnSpPr>
+          <p:cNvPr id="44" name="Straight Connector 43">
+            <a:extLst>
+              <a:ext uri="{FF2B5EF4-FFF2-40B4-BE49-F238E27FC236}">
+                <a16:creationId xmlns:a16="http://schemas.microsoft.com/office/drawing/2014/main" id="{117B6E0C-0683-ACD2-31C6-AC8A80AF43E3}"/>
+              </a:ext>
+            </a:extLst>
+          </p:cNvPr>
+          <p:cNvCxnSpPr>
+            <a:cxnSpLocks/>
+          </p:cNvCxnSpPr>
+          <p:nvPr/>
+        </p:nvCxnSpPr>
+        <p:spPr>
+          <a:xfrm>
+            <a:off x="1279945" y="1203779"/>
+            <a:ext cx="6619025" cy="0"/>
+          </a:xfrm>
+          <a:prstGeom prst="line">
+            <a:avLst/>
+          </a:prstGeom>
+          <a:ln w="76200">
+            <a:solidFill>
+              <a:schemeClr val="accent1">
+                <a:lumMod val="40000"/>
+                <a:lumOff val="60000"/>
+              </a:schemeClr>
+            </a:solidFill>
+          </a:ln>
+        </p:spPr>
+        <p:style>
+          <a:lnRef idx="1">
+            <a:schemeClr val="accent1"/>
+          </a:lnRef>
+          <a:fillRef idx="0">
+            <a:schemeClr val="accent1"/>
+          </a:fillRef>
+          <a:effectRef idx="0">
+            <a:schemeClr val="accent1"/>
+          </a:effectRef>
+          <a:fontRef idx="minor">
+            <a:schemeClr val="tx1"/>
+          </a:fontRef>
+        </p:style>
+      </p:cxnSp>
+      <p:cxnSp>
+        <p:nvCxnSpPr>
+          <p:cNvPr id="50" name="Straight Connector 49">
+            <a:extLst>
+              <a:ext uri="{FF2B5EF4-FFF2-40B4-BE49-F238E27FC236}">
+                <a16:creationId xmlns:a16="http://schemas.microsoft.com/office/drawing/2014/main" id="{7EEFCDA2-61D0-470A-0520-3216DD2422E1}"/>
+              </a:ext>
+            </a:extLst>
+          </p:cNvPr>
+          <p:cNvCxnSpPr>
+            <a:cxnSpLocks/>
+          </p:cNvCxnSpPr>
+          <p:nvPr/>
+        </p:nvCxnSpPr>
+        <p:spPr>
+          <a:xfrm>
+            <a:off x="3758770" y="3270323"/>
+            <a:ext cx="828040" cy="0"/>
+          </a:xfrm>
+          <a:prstGeom prst="line">
+            <a:avLst/>
+          </a:prstGeom>
+          <a:ln w="76200">
+            <a:solidFill>
+              <a:schemeClr val="accent1">
+                <a:lumMod val="40000"/>
+                <a:lumOff val="60000"/>
+              </a:schemeClr>
+            </a:solidFill>
+          </a:ln>
+        </p:spPr>
+        <p:style>
+          <a:lnRef idx="1">
+            <a:schemeClr val="accent1"/>
+          </a:lnRef>
+          <a:fillRef idx="0">
+            <a:schemeClr val="accent1"/>
+          </a:fillRef>
+          <a:effectRef idx="0">
+            <a:schemeClr val="accent1"/>
+          </a:effectRef>
+          <a:fontRef idx="minor">
+            <a:schemeClr val="tx1"/>
+          </a:fontRef>
+        </p:style>
+      </p:cxnSp>
+      <mc:AlternateContent xmlns:mc="http://schemas.openxmlformats.org/markup-compatibility/2006">
+        <mc:Choice xmlns:a14="http://schemas.microsoft.com/office/drawing/2010/main" Requires="a14">
+          <p:sp>
+            <p:nvSpPr>
+              <p:cNvPr id="58" name="TextBox 57">
+                <a:extLst>
+                  <a:ext uri="{FF2B5EF4-FFF2-40B4-BE49-F238E27FC236}">
+                    <a16:creationId xmlns:a16="http://schemas.microsoft.com/office/drawing/2014/main" id="{B2C2F58E-501F-498F-355C-BDC491E69ABC}"/>
+                  </a:ext>
+                </a:extLst>
+              </p:cNvPr>
+              <p:cNvSpPr txBox="1"/>
+              <p:nvPr/>
+            </p:nvSpPr>
+            <p:spPr>
+              <a:xfrm>
+                <a:off x="9142651" y="2993670"/>
+                <a:ext cx="1909818" cy="542456"/>
+              </a:xfrm>
+              <a:prstGeom prst="rect">
+                <a:avLst/>
+              </a:prstGeom>
+              <a:noFill/>
+            </p:spPr>
+            <p:txBody>
+              <a:bodyPr wrap="none" lIns="0" tIns="0" rIns="0" bIns="0" rtlCol="0">
+                <a:spAutoFit/>
+              </a:bodyPr>
+              <a:lstStyle/>
+              <a:p>
+                <a14:m>
+                  <m:oMathPara xmlns:m="http://schemas.openxmlformats.org/officeDocument/2006/math">
+                    <m:oMathParaPr>
+                      <m:jc m:val="centerGroup"/>
+                    </m:oMathParaPr>
+                    <m:oMath xmlns:m="http://schemas.openxmlformats.org/officeDocument/2006/math">
+                      <m:r>
+                        <a:rPr lang="en-US" altLang="ko-KR" b="0" i="1" smtClean="0">
+                          <a:latin typeface="Cambria Math" panose="02040503050406030204" pitchFamily="18" charset="0"/>
+                        </a:rPr>
+                        <m:t>𝐸</m:t>
+                      </m:r>
+                      <m:d>
+                        <m:dPr>
+                          <m:begChr m:val="["/>
+                          <m:endChr m:val="]"/>
+                          <m:ctrlPr>
+                            <a:rPr lang="en-US" altLang="ko-KR" b="0" i="1" smtClean="0">
+                              <a:latin typeface="Cambria Math" panose="02040503050406030204" pitchFamily="18" charset="0"/>
+                            </a:rPr>
+                          </m:ctrlPr>
+                        </m:dPr>
+                        <m:e>
+                          <m:r>
+                            <a:rPr lang="en-US" altLang="ko-KR" b="0" i="1" smtClean="0">
+                              <a:latin typeface="Cambria Math" panose="02040503050406030204" pitchFamily="18" charset="0"/>
+                            </a:rPr>
+                            <m:t>#</m:t>
+                          </m:r>
+                          <m:r>
+                            <a:rPr lang="en-US" altLang="ko-KR" b="0" i="1" smtClean="0">
+                              <a:latin typeface="Cambria Math" panose="02040503050406030204" pitchFamily="18" charset="0"/>
+                            </a:rPr>
+                            <m:t>𝑎𝑟𝑟𝑖𝑣𝑎𝑙𝑠</m:t>
+                          </m:r>
+                        </m:e>
+                      </m:d>
+                      <m:r>
+                        <a:rPr lang="en-US" altLang="ko-KR" b="0" i="1" smtClean="0">
+                          <a:latin typeface="Cambria Math" panose="02040503050406030204" pitchFamily="18" charset="0"/>
+                        </a:rPr>
+                        <m:t>=</m:t>
+                      </m:r>
+                      <m:f>
+                        <m:fPr>
+                          <m:ctrlPr>
+                            <a:rPr lang="en-US" altLang="ko-KR" b="0" i="1" smtClean="0">
+                              <a:latin typeface="Cambria Math" panose="02040503050406030204" pitchFamily="18" charset="0"/>
+                            </a:rPr>
+                          </m:ctrlPr>
+                        </m:fPr>
+                        <m:num>
+                          <m:r>
+                            <a:rPr lang="ko-KR" altLang="en-US" b="0" i="1" smtClean="0">
+                              <a:latin typeface="Cambria Math" panose="02040503050406030204" pitchFamily="18" charset="0"/>
+                            </a:rPr>
+                            <m:t>𝜆</m:t>
+                          </m:r>
+                        </m:num>
+                        <m:den>
+                          <m:r>
+                            <a:rPr lang="en-US" altLang="ko-KR" b="0" i="1" smtClean="0">
+                              <a:latin typeface="Cambria Math" panose="02040503050406030204" pitchFamily="18" charset="0"/>
+                            </a:rPr>
+                            <m:t>𝑚</m:t>
+                          </m:r>
+                        </m:den>
+                      </m:f>
+                    </m:oMath>
+                  </m:oMathPara>
+                </a14:m>
+                <a:endParaRPr lang="ko-KR" altLang="en-US" dirty="0"/>
+              </a:p>
+            </p:txBody>
+          </p:sp>
+        </mc:Choice>
+        <mc:Fallback>
+          <p:sp>
+            <p:nvSpPr>
+              <p:cNvPr id="58" name="TextBox 57">
+                <a:extLst>
+                  <a:ext uri="{FF2B5EF4-FFF2-40B4-BE49-F238E27FC236}">
+                    <a16:creationId xmlns:a16="http://schemas.microsoft.com/office/drawing/2014/main" id="{B2C2F58E-501F-498F-355C-BDC491E69ABC}"/>
+                  </a:ext>
+                </a:extLst>
+              </p:cNvPr>
+              <p:cNvSpPr txBox="1">
+                <a:spLocks noRot="1" noChangeAspect="1" noMove="1" noResize="1" noEditPoints="1" noAdjustHandles="1" noChangeArrowheads="1" noChangeShapeType="1" noTextEdit="1"/>
+              </p:cNvSpPr>
+              <p:nvPr/>
+            </p:nvSpPr>
+            <p:spPr>
+              <a:xfrm>
+                <a:off x="9142651" y="2993670"/>
+                <a:ext cx="1909818" cy="542456"/>
+              </a:xfrm>
+              <a:prstGeom prst="rect">
+                <a:avLst/>
+              </a:prstGeom>
+              <a:blipFill>
+                <a:blip r:embed="rId5"/>
+                <a:stretch>
+                  <a:fillRect/>
+                </a:stretch>
+              </a:blipFill>
+            </p:spPr>
+            <p:txBody>
+              <a:bodyPr/>
+              <a:lstStyle/>
+              <a:p>
+                <a:r>
+                  <a:rPr lang="ko-KR" altLang="en-US">
+                    <a:noFill/>
+                  </a:rPr>
+                  <a:t> </a:t>
+                </a:r>
+              </a:p>
+            </p:txBody>
+          </p:sp>
+        </mc:Fallback>
+      </mc:AlternateContent>
+      <mc:AlternateContent xmlns:mc="http://schemas.openxmlformats.org/markup-compatibility/2006">
+        <mc:Choice xmlns:a14="http://schemas.microsoft.com/office/drawing/2010/main" Requires="a14">
+          <p:sp>
+            <p:nvSpPr>
+              <p:cNvPr id="63" name="TextBox 62">
+                <a:extLst>
+                  <a:ext uri="{FF2B5EF4-FFF2-40B4-BE49-F238E27FC236}">
+                    <a16:creationId xmlns:a16="http://schemas.microsoft.com/office/drawing/2014/main" id="{6EB4687F-2978-8646-433F-C3ECA7FB1BD1}"/>
+                  </a:ext>
+                </a:extLst>
+              </p:cNvPr>
+              <p:cNvSpPr txBox="1"/>
+              <p:nvPr/>
+            </p:nvSpPr>
+            <p:spPr>
+              <a:xfrm>
+                <a:off x="9142651" y="1059854"/>
+                <a:ext cx="1822422" cy="276999"/>
+              </a:xfrm>
+              <a:prstGeom prst="rect">
+                <a:avLst/>
+              </a:prstGeom>
+              <a:noFill/>
+            </p:spPr>
+            <p:txBody>
+              <a:bodyPr wrap="none" lIns="0" tIns="0" rIns="0" bIns="0" rtlCol="0">
+                <a:spAutoFit/>
+              </a:bodyPr>
+              <a:lstStyle/>
+              <a:p>
+                <a14:m>
+                  <m:oMathPara xmlns:m="http://schemas.openxmlformats.org/officeDocument/2006/math">
+                    <m:oMathParaPr>
+                      <m:jc m:val="centerGroup"/>
+                    </m:oMathParaPr>
+                    <m:oMath xmlns:m="http://schemas.openxmlformats.org/officeDocument/2006/math">
+                      <m:r>
+                        <a:rPr lang="en-US" altLang="ko-KR" b="0" i="1" smtClean="0">
+                          <a:latin typeface="Cambria Math" panose="02040503050406030204" pitchFamily="18" charset="0"/>
+                        </a:rPr>
+                        <m:t>𝐸</m:t>
+                      </m:r>
+                      <m:d>
+                        <m:dPr>
+                          <m:begChr m:val="["/>
+                          <m:endChr m:val="]"/>
+                          <m:ctrlPr>
+                            <a:rPr lang="en-US" altLang="ko-KR" b="0" i="1" smtClean="0">
+                              <a:latin typeface="Cambria Math" panose="02040503050406030204" pitchFamily="18" charset="0"/>
+                            </a:rPr>
+                          </m:ctrlPr>
+                        </m:dPr>
+                        <m:e>
+                          <m:r>
+                            <a:rPr lang="en-US" altLang="ko-KR" b="0" i="1" smtClean="0">
+                              <a:latin typeface="Cambria Math" panose="02040503050406030204" pitchFamily="18" charset="0"/>
+                            </a:rPr>
+                            <m:t>#</m:t>
+                          </m:r>
+                          <m:r>
+                            <a:rPr lang="en-US" altLang="ko-KR" b="0" i="1" smtClean="0">
+                              <a:latin typeface="Cambria Math" panose="02040503050406030204" pitchFamily="18" charset="0"/>
+                            </a:rPr>
+                            <m:t>𝑎𝑟𝑟𝑖𝑣𝑎𝑙𝑠</m:t>
+                          </m:r>
+                        </m:e>
+                      </m:d>
+                      <m:r>
+                        <a:rPr lang="en-US" altLang="ko-KR" b="0" i="1" smtClean="0">
+                          <a:latin typeface="Cambria Math" panose="02040503050406030204" pitchFamily="18" charset="0"/>
+                        </a:rPr>
+                        <m:t>=</m:t>
+                      </m:r>
+                      <m:r>
+                        <a:rPr lang="ko-KR" altLang="en-US" b="0" i="1" smtClean="0">
+                          <a:latin typeface="Cambria Math" panose="02040503050406030204" pitchFamily="18" charset="0"/>
+                        </a:rPr>
+                        <m:t>𝜆</m:t>
+                      </m:r>
+                    </m:oMath>
+                  </m:oMathPara>
+                </a14:m>
+                <a:endParaRPr lang="ko-KR" altLang="en-US" dirty="0"/>
+              </a:p>
+            </p:txBody>
+          </p:sp>
+        </mc:Choice>
+        <mc:Fallback>
+          <p:sp>
+            <p:nvSpPr>
+              <p:cNvPr id="63" name="TextBox 62">
+                <a:extLst>
+                  <a:ext uri="{FF2B5EF4-FFF2-40B4-BE49-F238E27FC236}">
+                    <a16:creationId xmlns:a16="http://schemas.microsoft.com/office/drawing/2014/main" id="{6EB4687F-2978-8646-433F-C3ECA7FB1BD1}"/>
+                  </a:ext>
+                </a:extLst>
+              </p:cNvPr>
+              <p:cNvSpPr txBox="1">
+                <a:spLocks noRot="1" noChangeAspect="1" noMove="1" noResize="1" noEditPoints="1" noAdjustHandles="1" noChangeArrowheads="1" noChangeShapeType="1" noTextEdit="1"/>
+              </p:cNvSpPr>
+              <p:nvPr/>
+            </p:nvSpPr>
+            <p:spPr>
+              <a:xfrm>
+                <a:off x="9142651" y="1059854"/>
+                <a:ext cx="1822422" cy="276999"/>
+              </a:xfrm>
+              <a:prstGeom prst="rect">
+                <a:avLst/>
+              </a:prstGeom>
+              <a:blipFill>
+                <a:blip r:embed="rId6"/>
+                <a:stretch>
+                  <a:fillRect l="-2007" r="-2007" b="-13333"/>
+                </a:stretch>
+              </a:blipFill>
+            </p:spPr>
+            <p:txBody>
+              <a:bodyPr/>
+              <a:lstStyle/>
+              <a:p>
+                <a:r>
+                  <a:rPr lang="ko-KR" altLang="en-US">
+                    <a:noFill/>
+                  </a:rPr>
+                  <a:t> </a:t>
+                </a:r>
+              </a:p>
+            </p:txBody>
+          </p:sp>
+        </mc:Fallback>
+      </mc:AlternateContent>
     </p:spTree>
     <p:extLst>
       <p:ext uri="{BB962C8B-B14F-4D97-AF65-F5344CB8AC3E}">
         <p14:creationId xmlns:p14="http://schemas.microsoft.com/office/powerpoint/2010/main" val="3068090569"/>
+      </p:ext>
+    </p:extLst>
+  </p:cSld>
+  <p:clrMapOvr>
+    <a:masterClrMapping/>
+  </p:clrMapOvr>
+</p:sld>
+</file>
+
+<file path=ppt/slides/slide4.xml><?xml version="1.0" encoding="utf-8"?>
+<p:sld xmlns:a="http://schemas.openxmlformats.org/drawingml/2006/main" xmlns:r="http://schemas.openxmlformats.org/officeDocument/2006/relationships" xmlns:p="http://schemas.openxmlformats.org/presentationml/2006/main">
+  <p:cSld>
+    <p:spTree>
+      <p:nvGrpSpPr>
+        <p:cNvPr id="1" name=""/>
+        <p:cNvGrpSpPr/>
+        <p:nvPr/>
+      </p:nvGrpSpPr>
+      <p:grpSpPr>
+        <a:xfrm>
+          <a:off x="0" y="0"/>
+          <a:ext cx="0" cy="0"/>
+          <a:chOff x="0" y="0"/>
+          <a:chExt cx="0" cy="0"/>
+        </a:xfrm>
+      </p:grpSpPr>
+    </p:spTree>
+    <p:extLst>
+      <p:ext uri="{BB962C8B-B14F-4D97-AF65-F5344CB8AC3E}">
+        <p14:creationId xmlns:p14="http://schemas.microsoft.com/office/powerpoint/2010/main" val="1318597094"/>
       </p:ext>
     </p:extLst>
   </p:cSld>

</xml_diff>

<commit_message>
queue - 2.1, 2.2
</commit_message>
<xml_diff>
--- a/images/2024-03-15-mm1_queue/mm1_queue.pptx
+++ b/images/2024-03-15-mm1_queue/mm1_queue.pptx
@@ -9,6 +9,7 @@
     <p:sldId id="258" r:id="rId3"/>
     <p:sldId id="259" r:id="rId4"/>
     <p:sldId id="260" r:id="rId5"/>
+    <p:sldId id="261" r:id="rId6"/>
   </p:sldIdLst>
   <p:sldSz cx="12192000" cy="6858000"/>
   <p:notesSz cx="6858000" cy="9144000"/>
@@ -8644,8 +8645,8 @@
           </a:fontRef>
         </p:style>
       </p:cxnSp>
-      <mc:AlternateContent xmlns:mc="http://schemas.openxmlformats.org/markup-compatibility/2006">
-        <mc:Choice xmlns:a14="http://schemas.microsoft.com/office/drawing/2010/main" Requires="a14">
+      <mc:AlternateContent xmlns:mc="http://schemas.openxmlformats.org/markup-compatibility/2006" xmlns:a14="http://schemas.microsoft.com/office/drawing/2010/main">
+        <mc:Choice Requires="a14">
           <p:sp>
             <p:nvSpPr>
               <p:cNvPr id="3" name="TextBox 2">
@@ -8695,7 +8696,7 @@
             </p:txBody>
           </p:sp>
         </mc:Choice>
-        <mc:Fallback>
+        <mc:Fallback xmlns="">
           <p:sp>
             <p:nvSpPr>
               <p:cNvPr id="3" name="TextBox 2">
@@ -8979,8 +8980,8 @@
           </a:fontRef>
         </p:style>
       </p:cxnSp>
-      <mc:AlternateContent xmlns:mc="http://schemas.openxmlformats.org/markup-compatibility/2006">
-        <mc:Choice xmlns:a14="http://schemas.microsoft.com/office/drawing/2010/main" Requires="a14">
+      <mc:AlternateContent xmlns:mc="http://schemas.openxmlformats.org/markup-compatibility/2006" xmlns:a14="http://schemas.microsoft.com/office/drawing/2010/main">
+        <mc:Choice Requires="a14">
           <p:sp>
             <p:nvSpPr>
               <p:cNvPr id="29" name="TextBox 28">
@@ -9030,7 +9031,7 @@
             </p:txBody>
           </p:sp>
         </mc:Choice>
-        <mc:Fallback>
+        <mc:Fallback xmlns="">
           <p:sp>
             <p:nvSpPr>
               <p:cNvPr id="29" name="TextBox 28">
@@ -9354,8 +9355,8 @@
           </a:p>
         </p:txBody>
       </p:sp>
-      <mc:AlternateContent xmlns:mc="http://schemas.openxmlformats.org/markup-compatibility/2006">
-        <mc:Choice xmlns:a14="http://schemas.microsoft.com/office/drawing/2010/main" Requires="a14">
+      <mc:AlternateContent xmlns:mc="http://schemas.openxmlformats.org/markup-compatibility/2006" xmlns:a14="http://schemas.microsoft.com/office/drawing/2010/main">
+        <mc:Choice Requires="a14">
           <p:sp>
             <p:nvSpPr>
               <p:cNvPr id="40" name="TextBox 39">
@@ -9384,6 +9385,7 @@
               </a:bodyPr>
               <a:lstStyle/>
               <a:p>
+                <a:pPr/>
                 <a14:m>
                   <m:oMathPara xmlns:m="http://schemas.openxmlformats.org/officeDocument/2006/math">
                     <m:oMathParaPr>
@@ -9429,7 +9431,7 @@
             </p:txBody>
           </p:sp>
         </mc:Choice>
-        <mc:Fallback>
+        <mc:Fallback xmlns="">
           <p:sp>
             <p:nvSpPr>
               <p:cNvPr id="40" name="TextBox 39">
@@ -9474,8 +9476,8 @@
           </p:sp>
         </mc:Fallback>
       </mc:AlternateContent>
-      <mc:AlternateContent xmlns:mc="http://schemas.openxmlformats.org/markup-compatibility/2006">
-        <mc:Choice xmlns:a14="http://schemas.microsoft.com/office/drawing/2010/main" Requires="a14">
+      <mc:AlternateContent xmlns:mc="http://schemas.openxmlformats.org/markup-compatibility/2006" xmlns:a14="http://schemas.microsoft.com/office/drawing/2010/main">
+        <mc:Choice Requires="a14">
           <p:sp>
             <p:nvSpPr>
               <p:cNvPr id="42" name="TextBox 41">
@@ -9504,6 +9506,7 @@
               </a:bodyPr>
               <a:lstStyle/>
               <a:p>
+                <a:pPr/>
                 <a14:m>
                   <m:oMathPara xmlns:m="http://schemas.openxmlformats.org/officeDocument/2006/math">
                     <m:oMathParaPr>
@@ -9543,7 +9546,7 @@
             </p:txBody>
           </p:sp>
         </mc:Choice>
-        <mc:Fallback>
+        <mc:Fallback xmlns="">
           <p:sp>
             <p:nvSpPr>
               <p:cNvPr id="42" name="TextBox 41">
@@ -9680,8 +9683,8 @@
           </a:fontRef>
         </p:style>
       </p:cxnSp>
-      <mc:AlternateContent xmlns:mc="http://schemas.openxmlformats.org/markup-compatibility/2006">
-        <mc:Choice xmlns:a14="http://schemas.microsoft.com/office/drawing/2010/main" Requires="a14">
+      <mc:AlternateContent xmlns:mc="http://schemas.openxmlformats.org/markup-compatibility/2006" xmlns:a14="http://schemas.microsoft.com/office/drawing/2010/main">
+        <mc:Choice Requires="a14">
           <p:sp>
             <p:nvSpPr>
               <p:cNvPr id="58" name="TextBox 57">
@@ -9710,6 +9713,7 @@
               </a:bodyPr>
               <a:lstStyle/>
               <a:p>
+                <a:pPr/>
                 <a14:m>
                   <m:oMathPara xmlns:m="http://schemas.openxmlformats.org/officeDocument/2006/math">
                     <m:oMathParaPr>
@@ -9786,7 +9790,7 @@
             </p:txBody>
           </p:sp>
         </mc:Choice>
-        <mc:Fallback>
+        <mc:Fallback xmlns="">
           <p:sp>
             <p:nvSpPr>
               <p:cNvPr id="58" name="TextBox 57">
@@ -9831,8 +9835,8 @@
           </p:sp>
         </mc:Fallback>
       </mc:AlternateContent>
-      <mc:AlternateContent xmlns:mc="http://schemas.openxmlformats.org/markup-compatibility/2006">
-        <mc:Choice xmlns:a14="http://schemas.microsoft.com/office/drawing/2010/main" Requires="a14">
+      <mc:AlternateContent xmlns:mc="http://schemas.openxmlformats.org/markup-compatibility/2006" xmlns:a14="http://schemas.microsoft.com/office/drawing/2010/main">
+        <mc:Choice Requires="a14">
           <p:sp>
             <p:nvSpPr>
               <p:cNvPr id="63" name="TextBox 62">
@@ -9861,6 +9865,7 @@
               </a:bodyPr>
               <a:lstStyle/>
               <a:p>
+                <a:pPr/>
                 <a14:m>
                   <m:oMathPara xmlns:m="http://schemas.openxmlformats.org/officeDocument/2006/math">
                     <m:oMathParaPr>
@@ -9918,7 +9923,7 @@
             </p:txBody>
           </p:sp>
         </mc:Choice>
-        <mc:Fallback>
+        <mc:Fallback xmlns="">
           <p:sp>
             <p:nvSpPr>
               <p:cNvPr id="63" name="TextBox 62">
@@ -9993,10 +9998,3502 @@
           <a:chExt cx="0" cy="0"/>
         </a:xfrm>
       </p:grpSpPr>
+      <p:grpSp>
+        <p:nvGrpSpPr>
+          <p:cNvPr id="6" name="Group 5">
+            <a:extLst>
+              <a:ext uri="{FF2B5EF4-FFF2-40B4-BE49-F238E27FC236}">
+                <a16:creationId xmlns:a16="http://schemas.microsoft.com/office/drawing/2014/main" id="{BED577E6-05B2-C28F-0C67-633C42433856}"/>
+              </a:ext>
+            </a:extLst>
+          </p:cNvPr>
+          <p:cNvGrpSpPr/>
+          <p:nvPr/>
+        </p:nvGrpSpPr>
+        <p:grpSpPr>
+          <a:xfrm>
+            <a:off x="1154401" y="428048"/>
+            <a:ext cx="2752725" cy="1162050"/>
+            <a:chOff x="1154401" y="428048"/>
+            <a:chExt cx="2752725" cy="1162050"/>
+          </a:xfrm>
+        </p:grpSpPr>
+        <p:pic>
+          <p:nvPicPr>
+            <p:cNvPr id="3" name="Picture 2">
+              <a:extLst>
+                <a:ext uri="{FF2B5EF4-FFF2-40B4-BE49-F238E27FC236}">
+                  <a16:creationId xmlns:a16="http://schemas.microsoft.com/office/drawing/2014/main" id="{AA10992A-8C1A-D310-D08A-32EA244BBF75}"/>
+                </a:ext>
+              </a:extLst>
+            </p:cNvPr>
+            <p:cNvPicPr>
+              <a:picLocks noChangeAspect="1"/>
+            </p:cNvPicPr>
+            <p:nvPr/>
+          </p:nvPicPr>
+          <p:blipFill>
+            <a:blip r:embed="rId2">
+              <a:extLst>
+                <a:ext uri="{28A0092B-C50C-407E-A947-70E740481C1C}">
+                  <a14:useLocalDpi xmlns:a14="http://schemas.microsoft.com/office/drawing/2010/main" val="0"/>
+                </a:ext>
+              </a:extLst>
+            </a:blip>
+            <a:stretch>
+              <a:fillRect/>
+            </a:stretch>
+          </p:blipFill>
+          <p:spPr>
+            <a:xfrm>
+              <a:off x="1154401" y="428048"/>
+              <a:ext cx="2752725" cy="1162050"/>
+            </a:xfrm>
+            <a:prstGeom prst="rect">
+              <a:avLst/>
+            </a:prstGeom>
+          </p:spPr>
+        </p:pic>
+        <p:sp>
+          <p:nvSpPr>
+            <p:cNvPr id="4" name="TextBox 3">
+              <a:extLst>
+                <a:ext uri="{FF2B5EF4-FFF2-40B4-BE49-F238E27FC236}">
+                  <a16:creationId xmlns:a16="http://schemas.microsoft.com/office/drawing/2014/main" id="{15F8F5B8-7098-D746-1121-66FFA85B44BD}"/>
+                </a:ext>
+              </a:extLst>
+            </p:cNvPr>
+            <p:cNvSpPr txBox="1"/>
+            <p:nvPr/>
+          </p:nvSpPr>
+          <p:spPr>
+            <a:xfrm>
+              <a:off x="1542471" y="762852"/>
+              <a:ext cx="465192" cy="215444"/>
+            </a:xfrm>
+            <a:prstGeom prst="rect">
+              <a:avLst/>
+            </a:prstGeom>
+            <a:noFill/>
+          </p:spPr>
+          <p:txBody>
+            <a:bodyPr wrap="none" rtlCol="0">
+              <a:spAutoFit/>
+            </a:bodyPr>
+            <a:lstStyle/>
+            <a:p>
+              <a:r>
+                <a:rPr lang="en-US" altLang="ko-KR" sz="800" dirty="0"/>
+                <a:t>arrival</a:t>
+              </a:r>
+              <a:endParaRPr lang="ko-KR" altLang="en-US" sz="800" dirty="0"/>
+            </a:p>
+          </p:txBody>
+        </p:sp>
+        <p:sp>
+          <p:nvSpPr>
+            <p:cNvPr id="5" name="TextBox 4">
+              <a:extLst>
+                <a:ext uri="{FF2B5EF4-FFF2-40B4-BE49-F238E27FC236}">
+                  <a16:creationId xmlns:a16="http://schemas.microsoft.com/office/drawing/2014/main" id="{1CA8583D-7C1C-33A6-4B75-13EEF26DCEA4}"/>
+                </a:ext>
+              </a:extLst>
+            </p:cNvPr>
+            <p:cNvSpPr txBox="1"/>
+            <p:nvPr/>
+          </p:nvSpPr>
+          <p:spPr>
+            <a:xfrm>
+              <a:off x="2775528" y="744380"/>
+              <a:ext cx="638316" cy="215444"/>
+            </a:xfrm>
+            <a:prstGeom prst="rect">
+              <a:avLst/>
+            </a:prstGeom>
+            <a:noFill/>
+          </p:spPr>
+          <p:txBody>
+            <a:bodyPr wrap="none" rtlCol="0">
+              <a:spAutoFit/>
+            </a:bodyPr>
+            <a:lstStyle/>
+            <a:p>
+              <a:r>
+                <a:rPr lang="en-US" altLang="ko-KR" sz="800" dirty="0"/>
+                <a:t>departure</a:t>
+              </a:r>
+              <a:endParaRPr lang="ko-KR" altLang="en-US" sz="800" dirty="0"/>
+            </a:p>
+          </p:txBody>
+        </p:sp>
+      </p:grpSp>
+      <p:grpSp>
+        <p:nvGrpSpPr>
+          <p:cNvPr id="12" name="Group 11">
+            <a:extLst>
+              <a:ext uri="{FF2B5EF4-FFF2-40B4-BE49-F238E27FC236}">
+                <a16:creationId xmlns:a16="http://schemas.microsoft.com/office/drawing/2014/main" id="{315EF1B3-2CFB-E1BE-45C6-4513F504D884}"/>
+              </a:ext>
+            </a:extLst>
+          </p:cNvPr>
+          <p:cNvGrpSpPr/>
+          <p:nvPr/>
+        </p:nvGrpSpPr>
+        <p:grpSpPr>
+          <a:xfrm>
+            <a:off x="407385" y="1426402"/>
+            <a:ext cx="4486901" cy="2619741"/>
+            <a:chOff x="407385" y="1426402"/>
+            <a:chExt cx="4486901" cy="2619741"/>
+          </a:xfrm>
+        </p:grpSpPr>
+        <p:pic>
+          <p:nvPicPr>
+            <p:cNvPr id="8" name="Picture 7">
+              <a:extLst>
+                <a:ext uri="{FF2B5EF4-FFF2-40B4-BE49-F238E27FC236}">
+                  <a16:creationId xmlns:a16="http://schemas.microsoft.com/office/drawing/2014/main" id="{3744417C-347C-0EBC-7F73-409E8F0702C4}"/>
+                </a:ext>
+              </a:extLst>
+            </p:cNvPr>
+            <p:cNvPicPr>
+              <a:picLocks noChangeAspect="1"/>
+            </p:cNvPicPr>
+            <p:nvPr/>
+          </p:nvPicPr>
+          <p:blipFill>
+            <a:blip r:embed="rId3"/>
+            <a:stretch>
+              <a:fillRect/>
+            </a:stretch>
+          </p:blipFill>
+          <p:spPr>
+            <a:xfrm>
+              <a:off x="407385" y="1426402"/>
+              <a:ext cx="4486901" cy="2619741"/>
+            </a:xfrm>
+            <a:prstGeom prst="rect">
+              <a:avLst/>
+            </a:prstGeom>
+          </p:spPr>
+        </p:pic>
+        <p:sp>
+          <p:nvSpPr>
+            <p:cNvPr id="9" name="TextBox 8">
+              <a:extLst>
+                <a:ext uri="{FF2B5EF4-FFF2-40B4-BE49-F238E27FC236}">
+                  <a16:creationId xmlns:a16="http://schemas.microsoft.com/office/drawing/2014/main" id="{E5234689-5658-9457-BAA1-A131CED60203}"/>
+                </a:ext>
+              </a:extLst>
+            </p:cNvPr>
+            <p:cNvSpPr txBox="1"/>
+            <p:nvPr/>
+          </p:nvSpPr>
+          <p:spPr>
+            <a:xfrm>
+              <a:off x="1219055" y="2180635"/>
+              <a:ext cx="535724" cy="246221"/>
+            </a:xfrm>
+            <a:prstGeom prst="rect">
+              <a:avLst/>
+            </a:prstGeom>
+            <a:noFill/>
+          </p:spPr>
+          <p:txBody>
+            <a:bodyPr wrap="none" rtlCol="0">
+              <a:spAutoFit/>
+            </a:bodyPr>
+            <a:lstStyle/>
+            <a:p>
+              <a:r>
+                <a:rPr lang="en-US" altLang="ko-KR" sz="1000" dirty="0"/>
+                <a:t>arrival</a:t>
+              </a:r>
+              <a:endParaRPr lang="ko-KR" altLang="en-US" sz="1000" dirty="0"/>
+            </a:p>
+          </p:txBody>
+        </p:sp>
+        <p:sp>
+          <p:nvSpPr>
+            <p:cNvPr id="10" name="TextBox 9">
+              <a:extLst>
+                <a:ext uri="{FF2B5EF4-FFF2-40B4-BE49-F238E27FC236}">
+                  <a16:creationId xmlns:a16="http://schemas.microsoft.com/office/drawing/2014/main" id="{53139565-4A08-366B-4488-D26038A3B645}"/>
+                </a:ext>
+              </a:extLst>
+            </p:cNvPr>
+            <p:cNvSpPr txBox="1"/>
+            <p:nvPr/>
+          </p:nvSpPr>
+          <p:spPr>
+            <a:xfrm>
+              <a:off x="3177311" y="2176135"/>
+              <a:ext cx="752129" cy="246221"/>
+            </a:xfrm>
+            <a:prstGeom prst="rect">
+              <a:avLst/>
+            </a:prstGeom>
+            <a:noFill/>
+          </p:spPr>
+          <p:txBody>
+            <a:bodyPr wrap="none" rtlCol="0">
+              <a:spAutoFit/>
+            </a:bodyPr>
+            <a:lstStyle/>
+            <a:p>
+              <a:r>
+                <a:rPr lang="en-US" altLang="ko-KR" sz="1000" dirty="0"/>
+                <a:t>departure</a:t>
+              </a:r>
+              <a:endParaRPr lang="ko-KR" altLang="en-US" sz="1000" dirty="0"/>
+            </a:p>
+          </p:txBody>
+        </p:sp>
+        <p:sp>
+          <p:nvSpPr>
+            <p:cNvPr id="11" name="TextBox 10">
+              <a:extLst>
+                <a:ext uri="{FF2B5EF4-FFF2-40B4-BE49-F238E27FC236}">
+                  <a16:creationId xmlns:a16="http://schemas.microsoft.com/office/drawing/2014/main" id="{B4F67CD1-9AB9-3FB4-F318-40ABA4C915EE}"/>
+                </a:ext>
+              </a:extLst>
+            </p:cNvPr>
+            <p:cNvSpPr txBox="1"/>
+            <p:nvPr/>
+          </p:nvSpPr>
+          <p:spPr>
+            <a:xfrm>
+              <a:off x="2265305" y="2299245"/>
+              <a:ext cx="530915" cy="246221"/>
+            </a:xfrm>
+            <a:prstGeom prst="rect">
+              <a:avLst/>
+            </a:prstGeom>
+            <a:noFill/>
+          </p:spPr>
+          <p:txBody>
+            <a:bodyPr wrap="none" rtlCol="0">
+              <a:spAutoFit/>
+            </a:bodyPr>
+            <a:lstStyle/>
+            <a:p>
+              <a:r>
+                <a:rPr lang="en-US" altLang="ko-KR" sz="1000" dirty="0">
+                  <a:solidFill>
+                    <a:schemeClr val="bg1"/>
+                  </a:solidFill>
+                </a:rPr>
+                <a:t>server</a:t>
+              </a:r>
+              <a:endParaRPr lang="ko-KR" altLang="en-US" sz="1000" dirty="0">
+                <a:solidFill>
+                  <a:schemeClr val="bg1"/>
+                </a:solidFill>
+              </a:endParaRPr>
+            </a:p>
+          </p:txBody>
+        </p:sp>
+      </p:grpSp>
+      <p:pic>
+        <p:nvPicPr>
+          <p:cNvPr id="7" name="Picture 6">
+            <a:extLst>
+              <a:ext uri="{FF2B5EF4-FFF2-40B4-BE49-F238E27FC236}">
+                <a16:creationId xmlns:a16="http://schemas.microsoft.com/office/drawing/2014/main" id="{BB592BEE-076A-2032-A202-54640D0E9C79}"/>
+              </a:ext>
+            </a:extLst>
+          </p:cNvPr>
+          <p:cNvPicPr>
+            <a:picLocks noChangeAspect="1"/>
+          </p:cNvPicPr>
+          <p:nvPr/>
+        </p:nvPicPr>
+        <p:blipFill>
+          <a:blip r:embed="rId4"/>
+          <a:stretch>
+            <a:fillRect/>
+          </a:stretch>
+        </p:blipFill>
+        <p:spPr>
+          <a:xfrm>
+            <a:off x="5212635" y="428048"/>
+            <a:ext cx="6144482" cy="5649113"/>
+          </a:xfrm>
+          <a:prstGeom prst="rect">
+            <a:avLst/>
+          </a:prstGeom>
+        </p:spPr>
+      </p:pic>
     </p:spTree>
     <p:extLst>
       <p:ext uri="{BB962C8B-B14F-4D97-AF65-F5344CB8AC3E}">
         <p14:creationId xmlns:p14="http://schemas.microsoft.com/office/powerpoint/2010/main" val="1318597094"/>
+      </p:ext>
+    </p:extLst>
+  </p:cSld>
+  <p:clrMapOvr>
+    <a:masterClrMapping/>
+  </p:clrMapOvr>
+</p:sld>
+</file>
+
+<file path=ppt/slides/slide5.xml><?xml version="1.0" encoding="utf-8"?>
+<p:sld xmlns:a="http://schemas.openxmlformats.org/drawingml/2006/main" xmlns:r="http://schemas.openxmlformats.org/officeDocument/2006/relationships" xmlns:p="http://schemas.openxmlformats.org/presentationml/2006/main">
+  <p:cSld>
+    <p:spTree>
+      <p:nvGrpSpPr>
+        <p:cNvPr id="1" name=""/>
+        <p:cNvGrpSpPr/>
+        <p:nvPr/>
+      </p:nvGrpSpPr>
+      <p:grpSpPr>
+        <a:xfrm>
+          <a:off x="0" y="0"/>
+          <a:ext cx="0" cy="0"/>
+          <a:chOff x="0" y="0"/>
+          <a:chExt cx="0" cy="0"/>
+        </a:xfrm>
+      </p:grpSpPr>
+      <p:sp>
+        <p:nvSpPr>
+          <p:cNvPr id="2" name="Oval 1">
+            <a:extLst>
+              <a:ext uri="{FF2B5EF4-FFF2-40B4-BE49-F238E27FC236}">
+                <a16:creationId xmlns:a16="http://schemas.microsoft.com/office/drawing/2014/main" id="{F710AC7F-CED3-C9B8-6BE8-73424A736425}"/>
+              </a:ext>
+            </a:extLst>
+          </p:cNvPr>
+          <p:cNvSpPr/>
+          <p:nvPr/>
+        </p:nvSpPr>
+        <p:spPr>
+          <a:xfrm>
+            <a:off x="1995054" y="1681018"/>
+            <a:ext cx="868218" cy="868218"/>
+          </a:xfrm>
+          <a:prstGeom prst="ellipse">
+            <a:avLst/>
+          </a:prstGeom>
+          <a:noFill/>
+        </p:spPr>
+        <p:style>
+          <a:lnRef idx="2">
+            <a:schemeClr val="accent1">
+              <a:shade val="15000"/>
+            </a:schemeClr>
+          </a:lnRef>
+          <a:fillRef idx="1">
+            <a:schemeClr val="accent1"/>
+          </a:fillRef>
+          <a:effectRef idx="0">
+            <a:schemeClr val="accent1"/>
+          </a:effectRef>
+          <a:fontRef idx="minor">
+            <a:schemeClr val="lt1"/>
+          </a:fontRef>
+        </p:style>
+        <p:txBody>
+          <a:bodyPr rtlCol="0" anchor="ctr"/>
+          <a:lstStyle/>
+          <a:p>
+            <a:pPr algn="ctr"/>
+            <a:r>
+              <a:rPr lang="en-US" altLang="ko-KR" dirty="0">
+                <a:solidFill>
+                  <a:schemeClr val="tx1"/>
+                </a:solidFill>
+              </a:rPr>
+              <a:t>0</a:t>
+            </a:r>
+            <a:endParaRPr lang="ko-KR" altLang="en-US" dirty="0">
+              <a:solidFill>
+                <a:schemeClr val="tx1"/>
+              </a:solidFill>
+            </a:endParaRPr>
+          </a:p>
+        </p:txBody>
+      </p:sp>
+      <p:sp>
+        <p:nvSpPr>
+          <p:cNvPr id="13" name="Oval 12">
+            <a:extLst>
+              <a:ext uri="{FF2B5EF4-FFF2-40B4-BE49-F238E27FC236}">
+                <a16:creationId xmlns:a16="http://schemas.microsoft.com/office/drawing/2014/main" id="{923B9E3E-1CC7-3C0C-758B-311F94E6779C}"/>
+              </a:ext>
+            </a:extLst>
+          </p:cNvPr>
+          <p:cNvSpPr/>
+          <p:nvPr/>
+        </p:nvSpPr>
+        <p:spPr>
+          <a:xfrm>
+            <a:off x="3643745" y="1681018"/>
+            <a:ext cx="868218" cy="868218"/>
+          </a:xfrm>
+          <a:prstGeom prst="ellipse">
+            <a:avLst/>
+          </a:prstGeom>
+          <a:noFill/>
+        </p:spPr>
+        <p:style>
+          <a:lnRef idx="2">
+            <a:schemeClr val="accent1">
+              <a:shade val="15000"/>
+            </a:schemeClr>
+          </a:lnRef>
+          <a:fillRef idx="1">
+            <a:schemeClr val="accent1"/>
+          </a:fillRef>
+          <a:effectRef idx="0">
+            <a:schemeClr val="accent1"/>
+          </a:effectRef>
+          <a:fontRef idx="minor">
+            <a:schemeClr val="lt1"/>
+          </a:fontRef>
+        </p:style>
+        <p:txBody>
+          <a:bodyPr rtlCol="0" anchor="ctr"/>
+          <a:lstStyle/>
+          <a:p>
+            <a:pPr algn="ctr"/>
+            <a:r>
+              <a:rPr lang="en-US" altLang="ko-KR" dirty="0">
+                <a:solidFill>
+                  <a:schemeClr val="tx1"/>
+                </a:solidFill>
+              </a:rPr>
+              <a:t>1</a:t>
+            </a:r>
+            <a:endParaRPr lang="ko-KR" altLang="en-US" dirty="0">
+              <a:solidFill>
+                <a:schemeClr val="tx1"/>
+              </a:solidFill>
+            </a:endParaRPr>
+          </a:p>
+        </p:txBody>
+      </p:sp>
+      <p:sp>
+        <p:nvSpPr>
+          <p:cNvPr id="14" name="Oval 13">
+            <a:extLst>
+              <a:ext uri="{FF2B5EF4-FFF2-40B4-BE49-F238E27FC236}">
+                <a16:creationId xmlns:a16="http://schemas.microsoft.com/office/drawing/2014/main" id="{A7B90C72-BE63-8858-CE57-4E070A936449}"/>
+              </a:ext>
+            </a:extLst>
+          </p:cNvPr>
+          <p:cNvSpPr/>
+          <p:nvPr/>
+        </p:nvSpPr>
+        <p:spPr>
+          <a:xfrm>
+            <a:off x="5292436" y="1681018"/>
+            <a:ext cx="868218" cy="868218"/>
+          </a:xfrm>
+          <a:prstGeom prst="ellipse">
+            <a:avLst/>
+          </a:prstGeom>
+          <a:noFill/>
+        </p:spPr>
+        <p:style>
+          <a:lnRef idx="2">
+            <a:schemeClr val="accent1">
+              <a:shade val="15000"/>
+            </a:schemeClr>
+          </a:lnRef>
+          <a:fillRef idx="1">
+            <a:schemeClr val="accent1"/>
+          </a:fillRef>
+          <a:effectRef idx="0">
+            <a:schemeClr val="accent1"/>
+          </a:effectRef>
+          <a:fontRef idx="minor">
+            <a:schemeClr val="lt1"/>
+          </a:fontRef>
+        </p:style>
+        <p:txBody>
+          <a:bodyPr rtlCol="0" anchor="ctr"/>
+          <a:lstStyle/>
+          <a:p>
+            <a:pPr algn="ctr"/>
+            <a:r>
+              <a:rPr lang="en-US" altLang="ko-KR" dirty="0">
+                <a:solidFill>
+                  <a:schemeClr val="tx1"/>
+                </a:solidFill>
+              </a:rPr>
+              <a:t>2</a:t>
+            </a:r>
+            <a:endParaRPr lang="ko-KR" altLang="en-US" dirty="0">
+              <a:solidFill>
+                <a:schemeClr val="tx1"/>
+              </a:solidFill>
+            </a:endParaRPr>
+          </a:p>
+        </p:txBody>
+      </p:sp>
+      <p:sp>
+        <p:nvSpPr>
+          <p:cNvPr id="15" name="Oval 14">
+            <a:extLst>
+              <a:ext uri="{FF2B5EF4-FFF2-40B4-BE49-F238E27FC236}">
+                <a16:creationId xmlns:a16="http://schemas.microsoft.com/office/drawing/2014/main" id="{2546BA91-0539-6E63-1012-95DD896CED43}"/>
+              </a:ext>
+            </a:extLst>
+          </p:cNvPr>
+          <p:cNvSpPr/>
+          <p:nvPr/>
+        </p:nvSpPr>
+        <p:spPr>
+          <a:xfrm>
+            <a:off x="6941127" y="1681018"/>
+            <a:ext cx="868218" cy="868218"/>
+          </a:xfrm>
+          <a:prstGeom prst="ellipse">
+            <a:avLst/>
+          </a:prstGeom>
+          <a:noFill/>
+        </p:spPr>
+        <p:style>
+          <a:lnRef idx="2">
+            <a:schemeClr val="accent1">
+              <a:shade val="15000"/>
+            </a:schemeClr>
+          </a:lnRef>
+          <a:fillRef idx="1">
+            <a:schemeClr val="accent1"/>
+          </a:fillRef>
+          <a:effectRef idx="0">
+            <a:schemeClr val="accent1"/>
+          </a:effectRef>
+          <a:fontRef idx="minor">
+            <a:schemeClr val="lt1"/>
+          </a:fontRef>
+        </p:style>
+        <p:txBody>
+          <a:bodyPr rtlCol="0" anchor="ctr"/>
+          <a:lstStyle/>
+          <a:p>
+            <a:pPr algn="ctr"/>
+            <a:r>
+              <a:rPr lang="en-US" altLang="ko-KR" dirty="0">
+                <a:solidFill>
+                  <a:schemeClr val="tx1"/>
+                </a:solidFill>
+              </a:rPr>
+              <a:t>3</a:t>
+            </a:r>
+            <a:endParaRPr lang="ko-KR" altLang="en-US" dirty="0">
+              <a:solidFill>
+                <a:schemeClr val="tx1"/>
+              </a:solidFill>
+            </a:endParaRPr>
+          </a:p>
+        </p:txBody>
+      </p:sp>
+      <p:sp>
+        <p:nvSpPr>
+          <p:cNvPr id="16" name="Arc 15">
+            <a:extLst>
+              <a:ext uri="{FF2B5EF4-FFF2-40B4-BE49-F238E27FC236}">
+                <a16:creationId xmlns:a16="http://schemas.microsoft.com/office/drawing/2014/main" id="{767D8888-F3FD-E8F7-2DA6-E9855A115918}"/>
+              </a:ext>
+            </a:extLst>
+          </p:cNvPr>
+          <p:cNvSpPr/>
+          <p:nvPr/>
+        </p:nvSpPr>
+        <p:spPr>
+          <a:xfrm>
+            <a:off x="2716183" y="1474470"/>
+            <a:ext cx="1052945" cy="707390"/>
+          </a:xfrm>
+          <a:prstGeom prst="arc">
+            <a:avLst>
+              <a:gd name="adj1" fmla="val 11886020"/>
+              <a:gd name="adj2" fmla="val 20737714"/>
+            </a:avLst>
+          </a:prstGeom>
+          <a:ln>
+            <a:headEnd type="none" w="med" len="med"/>
+            <a:tailEnd type="arrow" w="med" len="med"/>
+          </a:ln>
+        </p:spPr>
+        <p:style>
+          <a:lnRef idx="1">
+            <a:schemeClr val="accent1"/>
+          </a:lnRef>
+          <a:fillRef idx="0">
+            <a:schemeClr val="accent1"/>
+          </a:fillRef>
+          <a:effectRef idx="0">
+            <a:schemeClr val="accent1"/>
+          </a:effectRef>
+          <a:fontRef idx="minor">
+            <a:schemeClr val="tx1"/>
+          </a:fontRef>
+        </p:style>
+        <p:txBody>
+          <a:bodyPr rtlCol="0" anchor="ctr"/>
+          <a:lstStyle/>
+          <a:p>
+            <a:pPr algn="ctr"/>
+            <a:endParaRPr lang="ko-KR" altLang="en-US"/>
+          </a:p>
+        </p:txBody>
+      </p:sp>
+      <p:sp>
+        <p:nvSpPr>
+          <p:cNvPr id="17" name="Arc 16">
+            <a:extLst>
+              <a:ext uri="{FF2B5EF4-FFF2-40B4-BE49-F238E27FC236}">
+                <a16:creationId xmlns:a16="http://schemas.microsoft.com/office/drawing/2014/main" id="{DFB2EAA6-EE3F-BDE1-F28C-3C13480BF571}"/>
+              </a:ext>
+            </a:extLst>
+          </p:cNvPr>
+          <p:cNvSpPr/>
+          <p:nvPr/>
+        </p:nvSpPr>
+        <p:spPr>
+          <a:xfrm>
+            <a:off x="2727036" y="2118360"/>
+            <a:ext cx="1052945" cy="707390"/>
+          </a:xfrm>
+          <a:prstGeom prst="arc">
+            <a:avLst>
+              <a:gd name="adj1" fmla="val 1016396"/>
+              <a:gd name="adj2" fmla="val 9887383"/>
+            </a:avLst>
+          </a:prstGeom>
+          <a:ln>
+            <a:headEnd type="none" w="med" len="med"/>
+            <a:tailEnd type="arrow" w="med" len="med"/>
+          </a:ln>
+        </p:spPr>
+        <p:style>
+          <a:lnRef idx="1">
+            <a:schemeClr val="accent1"/>
+          </a:lnRef>
+          <a:fillRef idx="0">
+            <a:schemeClr val="accent1"/>
+          </a:fillRef>
+          <a:effectRef idx="0">
+            <a:schemeClr val="accent1"/>
+          </a:effectRef>
+          <a:fontRef idx="minor">
+            <a:schemeClr val="tx1"/>
+          </a:fontRef>
+        </p:style>
+        <p:txBody>
+          <a:bodyPr rtlCol="0" anchor="ctr"/>
+          <a:lstStyle/>
+          <a:p>
+            <a:pPr algn="ctr"/>
+            <a:endParaRPr lang="ko-KR" altLang="en-US"/>
+          </a:p>
+        </p:txBody>
+      </p:sp>
+      <mc:AlternateContent xmlns:mc="http://schemas.openxmlformats.org/markup-compatibility/2006">
+        <mc:Choice xmlns:a14="http://schemas.microsoft.com/office/drawing/2010/main" Requires="a14">
+          <p:sp>
+            <p:nvSpPr>
+              <p:cNvPr id="22" name="TextBox 21">
+                <a:extLst>
+                  <a:ext uri="{FF2B5EF4-FFF2-40B4-BE49-F238E27FC236}">
+                    <a16:creationId xmlns:a16="http://schemas.microsoft.com/office/drawing/2014/main" id="{3C110FC9-76FE-EDA6-BEE4-F3F2A9E9474D}"/>
+                  </a:ext>
+                </a:extLst>
+              </p:cNvPr>
+              <p:cNvSpPr txBox="1"/>
+              <p:nvPr/>
+            </p:nvSpPr>
+            <p:spPr>
+              <a:xfrm>
+                <a:off x="2878460" y="1212860"/>
+                <a:ext cx="733727" cy="261610"/>
+              </a:xfrm>
+              <a:prstGeom prst="rect">
+                <a:avLst/>
+              </a:prstGeom>
+              <a:noFill/>
+            </p:spPr>
+            <p:txBody>
+              <a:bodyPr wrap="none" rtlCol="0">
+                <a:spAutoFit/>
+              </a:bodyPr>
+              <a:lstStyle/>
+              <a:p>
+                <a:r>
+                  <a:rPr lang="en-US" altLang="ko-KR" sz="1100" dirty="0"/>
+                  <a:t>arrival(</a:t>
+                </a:r>
+                <a14:m>
+                  <m:oMath xmlns:m="http://schemas.openxmlformats.org/officeDocument/2006/math">
+                    <m:r>
+                      <a:rPr lang="ko-KR" altLang="en-US" sz="1100" i="1" smtClean="0">
+                        <a:latin typeface="Cambria Math" panose="02040503050406030204" pitchFamily="18" charset="0"/>
+                      </a:rPr>
+                      <m:t>𝜆</m:t>
+                    </m:r>
+                  </m:oMath>
+                </a14:m>
+                <a:r>
+                  <a:rPr lang="en-US" altLang="ko-KR" sz="1100" dirty="0"/>
+                  <a:t>)</a:t>
+                </a:r>
+                <a:endParaRPr lang="ko-KR" altLang="en-US" sz="1100" dirty="0"/>
+              </a:p>
+            </p:txBody>
+          </p:sp>
+        </mc:Choice>
+        <mc:Fallback>
+          <p:sp>
+            <p:nvSpPr>
+              <p:cNvPr id="22" name="TextBox 21">
+                <a:extLst>
+                  <a:ext uri="{FF2B5EF4-FFF2-40B4-BE49-F238E27FC236}">
+                    <a16:creationId xmlns:a16="http://schemas.microsoft.com/office/drawing/2014/main" id="{3C110FC9-76FE-EDA6-BEE4-F3F2A9E9474D}"/>
+                  </a:ext>
+                </a:extLst>
+              </p:cNvPr>
+              <p:cNvSpPr txBox="1">
+                <a:spLocks noRot="1" noChangeAspect="1" noMove="1" noResize="1" noEditPoints="1" noAdjustHandles="1" noChangeArrowheads="1" noChangeShapeType="1" noTextEdit="1"/>
+              </p:cNvSpPr>
+              <p:nvPr/>
+            </p:nvSpPr>
+            <p:spPr>
+              <a:xfrm>
+                <a:off x="2878460" y="1212860"/>
+                <a:ext cx="733727" cy="261610"/>
+              </a:xfrm>
+              <a:prstGeom prst="rect">
+                <a:avLst/>
+              </a:prstGeom>
+              <a:blipFill>
+                <a:blip r:embed="rId2"/>
+                <a:stretch>
+                  <a:fillRect t="-2326" b="-13953"/>
+                </a:stretch>
+              </a:blipFill>
+            </p:spPr>
+            <p:txBody>
+              <a:bodyPr/>
+              <a:lstStyle/>
+              <a:p>
+                <a:r>
+                  <a:rPr lang="ko-KR" altLang="en-US">
+                    <a:noFill/>
+                  </a:rPr>
+                  <a:t> </a:t>
+                </a:r>
+              </a:p>
+            </p:txBody>
+          </p:sp>
+        </mc:Fallback>
+      </mc:AlternateContent>
+      <mc:AlternateContent xmlns:mc="http://schemas.openxmlformats.org/markup-compatibility/2006">
+        <mc:Choice xmlns:a14="http://schemas.microsoft.com/office/drawing/2010/main" Requires="a14">
+          <p:sp>
+            <p:nvSpPr>
+              <p:cNvPr id="25" name="TextBox 24">
+                <a:extLst>
+                  <a:ext uri="{FF2B5EF4-FFF2-40B4-BE49-F238E27FC236}">
+                    <a16:creationId xmlns:a16="http://schemas.microsoft.com/office/drawing/2014/main" id="{0E172C2E-8AAD-CC77-630B-8D2EBAC67061}"/>
+                  </a:ext>
+                </a:extLst>
+              </p:cNvPr>
+              <p:cNvSpPr txBox="1"/>
+              <p:nvPr/>
+            </p:nvSpPr>
+            <p:spPr>
+              <a:xfrm>
+                <a:off x="2765746" y="2855773"/>
+                <a:ext cx="975523" cy="261610"/>
+              </a:xfrm>
+              <a:prstGeom prst="rect">
+                <a:avLst/>
+              </a:prstGeom>
+              <a:noFill/>
+            </p:spPr>
+            <p:txBody>
+              <a:bodyPr wrap="none" rtlCol="0">
+                <a:spAutoFit/>
+              </a:bodyPr>
+              <a:lstStyle/>
+              <a:p>
+                <a:r>
+                  <a:rPr lang="en-US" altLang="ko-KR" sz="1100" dirty="0"/>
+                  <a:t>departure(</a:t>
+                </a:r>
+                <a14:m>
+                  <m:oMath xmlns:m="http://schemas.openxmlformats.org/officeDocument/2006/math">
+                    <m:r>
+                      <a:rPr lang="ko-KR" altLang="en-US" sz="1100" i="1" smtClean="0">
+                        <a:latin typeface="Cambria Math" panose="02040503050406030204" pitchFamily="18" charset="0"/>
+                      </a:rPr>
+                      <m:t>𝜇</m:t>
+                    </m:r>
+                  </m:oMath>
+                </a14:m>
+                <a:r>
+                  <a:rPr lang="en-US" altLang="ko-KR" sz="1100" dirty="0"/>
+                  <a:t>)</a:t>
+                </a:r>
+                <a:endParaRPr lang="ko-KR" altLang="en-US" sz="1100" dirty="0"/>
+              </a:p>
+            </p:txBody>
+          </p:sp>
+        </mc:Choice>
+        <mc:Fallback>
+          <p:sp>
+            <p:nvSpPr>
+              <p:cNvPr id="25" name="TextBox 24">
+                <a:extLst>
+                  <a:ext uri="{FF2B5EF4-FFF2-40B4-BE49-F238E27FC236}">
+                    <a16:creationId xmlns:a16="http://schemas.microsoft.com/office/drawing/2014/main" id="{0E172C2E-8AAD-CC77-630B-8D2EBAC67061}"/>
+                  </a:ext>
+                </a:extLst>
+              </p:cNvPr>
+              <p:cNvSpPr txBox="1">
+                <a:spLocks noRot="1" noChangeAspect="1" noMove="1" noResize="1" noEditPoints="1" noAdjustHandles="1" noChangeArrowheads="1" noChangeShapeType="1" noTextEdit="1"/>
+              </p:cNvSpPr>
+              <p:nvPr/>
+            </p:nvSpPr>
+            <p:spPr>
+              <a:xfrm>
+                <a:off x="2765746" y="2855773"/>
+                <a:ext cx="975523" cy="261610"/>
+              </a:xfrm>
+              <a:prstGeom prst="rect">
+                <a:avLst/>
+              </a:prstGeom>
+              <a:blipFill>
+                <a:blip r:embed="rId3"/>
+                <a:stretch>
+                  <a:fillRect t="-2326" b="-13953"/>
+                </a:stretch>
+              </a:blipFill>
+            </p:spPr>
+            <p:txBody>
+              <a:bodyPr/>
+              <a:lstStyle/>
+              <a:p>
+                <a:r>
+                  <a:rPr lang="ko-KR" altLang="en-US">
+                    <a:noFill/>
+                  </a:rPr>
+                  <a:t> </a:t>
+                </a:r>
+              </a:p>
+            </p:txBody>
+          </p:sp>
+        </mc:Fallback>
+      </mc:AlternateContent>
+      <p:sp>
+        <p:nvSpPr>
+          <p:cNvPr id="40" name="TextBox 39">
+            <a:extLst>
+              <a:ext uri="{FF2B5EF4-FFF2-40B4-BE49-F238E27FC236}">
+                <a16:creationId xmlns:a16="http://schemas.microsoft.com/office/drawing/2014/main" id="{3FB8A81B-6DA5-4E19-3C78-1C46E4CD1054}"/>
+              </a:ext>
+            </a:extLst>
+          </p:cNvPr>
+          <p:cNvSpPr txBox="1"/>
+          <p:nvPr/>
+        </p:nvSpPr>
+        <p:spPr>
+          <a:xfrm>
+            <a:off x="8729176" y="1961346"/>
+            <a:ext cx="502061" cy="369332"/>
+          </a:xfrm>
+          <a:prstGeom prst="rect">
+            <a:avLst/>
+          </a:prstGeom>
+          <a:noFill/>
+        </p:spPr>
+        <p:txBody>
+          <a:bodyPr wrap="none" rtlCol="0">
+            <a:spAutoFit/>
+          </a:bodyPr>
+          <a:lstStyle/>
+          <a:p>
+            <a:r>
+              <a:rPr lang="en-US" altLang="ko-KR" dirty="0"/>
+              <a:t>· · ·</a:t>
+            </a:r>
+            <a:endParaRPr lang="ko-KR" altLang="en-US" dirty="0"/>
+          </a:p>
+        </p:txBody>
+      </p:sp>
+      <p:sp>
+        <p:nvSpPr>
+          <p:cNvPr id="41" name="Arc 40">
+            <a:extLst>
+              <a:ext uri="{FF2B5EF4-FFF2-40B4-BE49-F238E27FC236}">
+                <a16:creationId xmlns:a16="http://schemas.microsoft.com/office/drawing/2014/main" id="{B2B7F5BC-421E-302E-645E-BB72BD8A933D}"/>
+              </a:ext>
+            </a:extLst>
+          </p:cNvPr>
+          <p:cNvSpPr/>
+          <p:nvPr/>
+        </p:nvSpPr>
+        <p:spPr>
+          <a:xfrm>
+            <a:off x="4370301" y="1474470"/>
+            <a:ext cx="1052945" cy="707390"/>
+          </a:xfrm>
+          <a:prstGeom prst="arc">
+            <a:avLst>
+              <a:gd name="adj1" fmla="val 11886020"/>
+              <a:gd name="adj2" fmla="val 20737714"/>
+            </a:avLst>
+          </a:prstGeom>
+          <a:ln>
+            <a:headEnd type="none" w="med" len="med"/>
+            <a:tailEnd type="arrow" w="med" len="med"/>
+          </a:ln>
+        </p:spPr>
+        <p:style>
+          <a:lnRef idx="1">
+            <a:schemeClr val="accent1"/>
+          </a:lnRef>
+          <a:fillRef idx="0">
+            <a:schemeClr val="accent1"/>
+          </a:fillRef>
+          <a:effectRef idx="0">
+            <a:schemeClr val="accent1"/>
+          </a:effectRef>
+          <a:fontRef idx="minor">
+            <a:schemeClr val="tx1"/>
+          </a:fontRef>
+        </p:style>
+        <p:txBody>
+          <a:bodyPr rtlCol="0" anchor="ctr"/>
+          <a:lstStyle/>
+          <a:p>
+            <a:pPr algn="ctr"/>
+            <a:endParaRPr lang="ko-KR" altLang="en-US"/>
+          </a:p>
+        </p:txBody>
+      </p:sp>
+      <p:sp>
+        <p:nvSpPr>
+          <p:cNvPr id="42" name="Arc 41">
+            <a:extLst>
+              <a:ext uri="{FF2B5EF4-FFF2-40B4-BE49-F238E27FC236}">
+                <a16:creationId xmlns:a16="http://schemas.microsoft.com/office/drawing/2014/main" id="{314E4B55-1D0F-D11F-F44F-BABE5626A41E}"/>
+              </a:ext>
+            </a:extLst>
+          </p:cNvPr>
+          <p:cNvSpPr/>
+          <p:nvPr/>
+        </p:nvSpPr>
+        <p:spPr>
+          <a:xfrm>
+            <a:off x="4381154" y="2118360"/>
+            <a:ext cx="1052945" cy="707390"/>
+          </a:xfrm>
+          <a:prstGeom prst="arc">
+            <a:avLst>
+              <a:gd name="adj1" fmla="val 1016396"/>
+              <a:gd name="adj2" fmla="val 9887383"/>
+            </a:avLst>
+          </a:prstGeom>
+          <a:ln>
+            <a:headEnd type="none" w="med" len="med"/>
+            <a:tailEnd type="arrow" w="med" len="med"/>
+          </a:ln>
+        </p:spPr>
+        <p:style>
+          <a:lnRef idx="1">
+            <a:schemeClr val="accent1"/>
+          </a:lnRef>
+          <a:fillRef idx="0">
+            <a:schemeClr val="accent1"/>
+          </a:fillRef>
+          <a:effectRef idx="0">
+            <a:schemeClr val="accent1"/>
+          </a:effectRef>
+          <a:fontRef idx="minor">
+            <a:schemeClr val="tx1"/>
+          </a:fontRef>
+        </p:style>
+        <p:txBody>
+          <a:bodyPr rtlCol="0" anchor="ctr"/>
+          <a:lstStyle/>
+          <a:p>
+            <a:pPr algn="ctr"/>
+            <a:endParaRPr lang="ko-KR" altLang="en-US"/>
+          </a:p>
+        </p:txBody>
+      </p:sp>
+      <mc:AlternateContent xmlns:mc="http://schemas.openxmlformats.org/markup-compatibility/2006">
+        <mc:Choice xmlns:a14="http://schemas.microsoft.com/office/drawing/2010/main" Requires="a14">
+          <p:sp>
+            <p:nvSpPr>
+              <p:cNvPr id="43" name="TextBox 42">
+                <a:extLst>
+                  <a:ext uri="{FF2B5EF4-FFF2-40B4-BE49-F238E27FC236}">
+                    <a16:creationId xmlns:a16="http://schemas.microsoft.com/office/drawing/2014/main" id="{6232D987-B89C-4DC2-AB6A-D779293FD425}"/>
+                  </a:ext>
+                </a:extLst>
+              </p:cNvPr>
+              <p:cNvSpPr txBox="1"/>
+              <p:nvPr/>
+            </p:nvSpPr>
+            <p:spPr>
+              <a:xfrm>
+                <a:off x="4532578" y="1212860"/>
+                <a:ext cx="733727" cy="261610"/>
+              </a:xfrm>
+              <a:prstGeom prst="rect">
+                <a:avLst/>
+              </a:prstGeom>
+              <a:noFill/>
+            </p:spPr>
+            <p:txBody>
+              <a:bodyPr wrap="none" rtlCol="0">
+                <a:spAutoFit/>
+              </a:bodyPr>
+              <a:lstStyle/>
+              <a:p>
+                <a:r>
+                  <a:rPr lang="en-US" altLang="ko-KR" sz="1100" dirty="0"/>
+                  <a:t>arrival(</a:t>
+                </a:r>
+                <a14:m>
+                  <m:oMath xmlns:m="http://schemas.openxmlformats.org/officeDocument/2006/math">
+                    <m:r>
+                      <a:rPr lang="ko-KR" altLang="en-US" sz="1100" i="1" smtClean="0">
+                        <a:latin typeface="Cambria Math" panose="02040503050406030204" pitchFamily="18" charset="0"/>
+                      </a:rPr>
+                      <m:t>𝜆</m:t>
+                    </m:r>
+                  </m:oMath>
+                </a14:m>
+                <a:r>
+                  <a:rPr lang="en-US" altLang="ko-KR" sz="1100" dirty="0"/>
+                  <a:t>)</a:t>
+                </a:r>
+                <a:endParaRPr lang="ko-KR" altLang="en-US" sz="1100" dirty="0"/>
+              </a:p>
+            </p:txBody>
+          </p:sp>
+        </mc:Choice>
+        <mc:Fallback>
+          <p:sp>
+            <p:nvSpPr>
+              <p:cNvPr id="43" name="TextBox 42">
+                <a:extLst>
+                  <a:ext uri="{FF2B5EF4-FFF2-40B4-BE49-F238E27FC236}">
+                    <a16:creationId xmlns:a16="http://schemas.microsoft.com/office/drawing/2014/main" id="{6232D987-B89C-4DC2-AB6A-D779293FD425}"/>
+                  </a:ext>
+                </a:extLst>
+              </p:cNvPr>
+              <p:cNvSpPr txBox="1">
+                <a:spLocks noRot="1" noChangeAspect="1" noMove="1" noResize="1" noEditPoints="1" noAdjustHandles="1" noChangeArrowheads="1" noChangeShapeType="1" noTextEdit="1"/>
+              </p:cNvSpPr>
+              <p:nvPr/>
+            </p:nvSpPr>
+            <p:spPr>
+              <a:xfrm>
+                <a:off x="4532578" y="1212860"/>
+                <a:ext cx="733727" cy="261610"/>
+              </a:xfrm>
+              <a:prstGeom prst="rect">
+                <a:avLst/>
+              </a:prstGeom>
+              <a:blipFill>
+                <a:blip r:embed="rId4"/>
+                <a:stretch>
+                  <a:fillRect t="-2326" b="-13953"/>
+                </a:stretch>
+              </a:blipFill>
+            </p:spPr>
+            <p:txBody>
+              <a:bodyPr/>
+              <a:lstStyle/>
+              <a:p>
+                <a:r>
+                  <a:rPr lang="ko-KR" altLang="en-US">
+                    <a:noFill/>
+                  </a:rPr>
+                  <a:t> </a:t>
+                </a:r>
+              </a:p>
+            </p:txBody>
+          </p:sp>
+        </mc:Fallback>
+      </mc:AlternateContent>
+      <mc:AlternateContent xmlns:mc="http://schemas.openxmlformats.org/markup-compatibility/2006">
+        <mc:Choice xmlns:a14="http://schemas.microsoft.com/office/drawing/2010/main" Requires="a14">
+          <p:sp>
+            <p:nvSpPr>
+              <p:cNvPr id="44" name="TextBox 43">
+                <a:extLst>
+                  <a:ext uri="{FF2B5EF4-FFF2-40B4-BE49-F238E27FC236}">
+                    <a16:creationId xmlns:a16="http://schemas.microsoft.com/office/drawing/2014/main" id="{7684A447-38C1-682B-05AC-D02507D4C137}"/>
+                  </a:ext>
+                </a:extLst>
+              </p:cNvPr>
+              <p:cNvSpPr txBox="1"/>
+              <p:nvPr/>
+            </p:nvSpPr>
+            <p:spPr>
+              <a:xfrm>
+                <a:off x="4419864" y="2855773"/>
+                <a:ext cx="975523" cy="261610"/>
+              </a:xfrm>
+              <a:prstGeom prst="rect">
+                <a:avLst/>
+              </a:prstGeom>
+              <a:noFill/>
+            </p:spPr>
+            <p:txBody>
+              <a:bodyPr wrap="none" rtlCol="0">
+                <a:spAutoFit/>
+              </a:bodyPr>
+              <a:lstStyle/>
+              <a:p>
+                <a:r>
+                  <a:rPr lang="en-US" altLang="ko-KR" sz="1100" dirty="0"/>
+                  <a:t>departure(</a:t>
+                </a:r>
+                <a14:m>
+                  <m:oMath xmlns:m="http://schemas.openxmlformats.org/officeDocument/2006/math">
+                    <m:r>
+                      <a:rPr lang="ko-KR" altLang="en-US" sz="1100" i="1" smtClean="0">
+                        <a:latin typeface="Cambria Math" panose="02040503050406030204" pitchFamily="18" charset="0"/>
+                      </a:rPr>
+                      <m:t>𝜇</m:t>
+                    </m:r>
+                  </m:oMath>
+                </a14:m>
+                <a:r>
+                  <a:rPr lang="en-US" altLang="ko-KR" sz="1100" dirty="0"/>
+                  <a:t>)</a:t>
+                </a:r>
+                <a:endParaRPr lang="ko-KR" altLang="en-US" sz="1100" dirty="0"/>
+              </a:p>
+            </p:txBody>
+          </p:sp>
+        </mc:Choice>
+        <mc:Fallback>
+          <p:sp>
+            <p:nvSpPr>
+              <p:cNvPr id="44" name="TextBox 43">
+                <a:extLst>
+                  <a:ext uri="{FF2B5EF4-FFF2-40B4-BE49-F238E27FC236}">
+                    <a16:creationId xmlns:a16="http://schemas.microsoft.com/office/drawing/2014/main" id="{7684A447-38C1-682B-05AC-D02507D4C137}"/>
+                  </a:ext>
+                </a:extLst>
+              </p:cNvPr>
+              <p:cNvSpPr txBox="1">
+                <a:spLocks noRot="1" noChangeAspect="1" noMove="1" noResize="1" noEditPoints="1" noAdjustHandles="1" noChangeArrowheads="1" noChangeShapeType="1" noTextEdit="1"/>
+              </p:cNvSpPr>
+              <p:nvPr/>
+            </p:nvSpPr>
+            <p:spPr>
+              <a:xfrm>
+                <a:off x="4419864" y="2855773"/>
+                <a:ext cx="975523" cy="261610"/>
+              </a:xfrm>
+              <a:prstGeom prst="rect">
+                <a:avLst/>
+              </a:prstGeom>
+              <a:blipFill>
+                <a:blip r:embed="rId3"/>
+                <a:stretch>
+                  <a:fillRect t="-2326" b="-13953"/>
+                </a:stretch>
+              </a:blipFill>
+            </p:spPr>
+            <p:txBody>
+              <a:bodyPr/>
+              <a:lstStyle/>
+              <a:p>
+                <a:r>
+                  <a:rPr lang="ko-KR" altLang="en-US">
+                    <a:noFill/>
+                  </a:rPr>
+                  <a:t> </a:t>
+                </a:r>
+              </a:p>
+            </p:txBody>
+          </p:sp>
+        </mc:Fallback>
+      </mc:AlternateContent>
+      <p:sp>
+        <p:nvSpPr>
+          <p:cNvPr id="45" name="Arc 44">
+            <a:extLst>
+              <a:ext uri="{FF2B5EF4-FFF2-40B4-BE49-F238E27FC236}">
+                <a16:creationId xmlns:a16="http://schemas.microsoft.com/office/drawing/2014/main" id="{2C774C67-4C3B-25BC-4C6C-D7BD93C8DAFB}"/>
+              </a:ext>
+            </a:extLst>
+          </p:cNvPr>
+          <p:cNvSpPr/>
+          <p:nvPr/>
+        </p:nvSpPr>
+        <p:spPr>
+          <a:xfrm>
+            <a:off x="6021880" y="1474470"/>
+            <a:ext cx="1052945" cy="707390"/>
+          </a:xfrm>
+          <a:prstGeom prst="arc">
+            <a:avLst>
+              <a:gd name="adj1" fmla="val 11886020"/>
+              <a:gd name="adj2" fmla="val 20737714"/>
+            </a:avLst>
+          </a:prstGeom>
+          <a:ln>
+            <a:headEnd type="none" w="med" len="med"/>
+            <a:tailEnd type="arrow" w="med" len="med"/>
+          </a:ln>
+        </p:spPr>
+        <p:style>
+          <a:lnRef idx="1">
+            <a:schemeClr val="accent1"/>
+          </a:lnRef>
+          <a:fillRef idx="0">
+            <a:schemeClr val="accent1"/>
+          </a:fillRef>
+          <a:effectRef idx="0">
+            <a:schemeClr val="accent1"/>
+          </a:effectRef>
+          <a:fontRef idx="minor">
+            <a:schemeClr val="tx1"/>
+          </a:fontRef>
+        </p:style>
+        <p:txBody>
+          <a:bodyPr rtlCol="0" anchor="ctr"/>
+          <a:lstStyle/>
+          <a:p>
+            <a:pPr algn="ctr"/>
+            <a:endParaRPr lang="ko-KR" altLang="en-US"/>
+          </a:p>
+        </p:txBody>
+      </p:sp>
+      <p:sp>
+        <p:nvSpPr>
+          <p:cNvPr id="46" name="Arc 45">
+            <a:extLst>
+              <a:ext uri="{FF2B5EF4-FFF2-40B4-BE49-F238E27FC236}">
+                <a16:creationId xmlns:a16="http://schemas.microsoft.com/office/drawing/2014/main" id="{024A6950-4011-EDAC-1111-B80AFE395546}"/>
+              </a:ext>
+            </a:extLst>
+          </p:cNvPr>
+          <p:cNvSpPr/>
+          <p:nvPr/>
+        </p:nvSpPr>
+        <p:spPr>
+          <a:xfrm>
+            <a:off x="6032733" y="2118360"/>
+            <a:ext cx="1052945" cy="707390"/>
+          </a:xfrm>
+          <a:prstGeom prst="arc">
+            <a:avLst>
+              <a:gd name="adj1" fmla="val 1016396"/>
+              <a:gd name="adj2" fmla="val 9887383"/>
+            </a:avLst>
+          </a:prstGeom>
+          <a:ln>
+            <a:headEnd type="none" w="med" len="med"/>
+            <a:tailEnd type="arrow" w="med" len="med"/>
+          </a:ln>
+        </p:spPr>
+        <p:style>
+          <a:lnRef idx="1">
+            <a:schemeClr val="accent1"/>
+          </a:lnRef>
+          <a:fillRef idx="0">
+            <a:schemeClr val="accent1"/>
+          </a:fillRef>
+          <a:effectRef idx="0">
+            <a:schemeClr val="accent1"/>
+          </a:effectRef>
+          <a:fontRef idx="minor">
+            <a:schemeClr val="tx1"/>
+          </a:fontRef>
+        </p:style>
+        <p:txBody>
+          <a:bodyPr rtlCol="0" anchor="ctr"/>
+          <a:lstStyle/>
+          <a:p>
+            <a:pPr algn="ctr"/>
+            <a:endParaRPr lang="ko-KR" altLang="en-US"/>
+          </a:p>
+        </p:txBody>
+      </p:sp>
+      <mc:AlternateContent xmlns:mc="http://schemas.openxmlformats.org/markup-compatibility/2006">
+        <mc:Choice xmlns:a14="http://schemas.microsoft.com/office/drawing/2010/main" Requires="a14">
+          <p:sp>
+            <p:nvSpPr>
+              <p:cNvPr id="47" name="TextBox 46">
+                <a:extLst>
+                  <a:ext uri="{FF2B5EF4-FFF2-40B4-BE49-F238E27FC236}">
+                    <a16:creationId xmlns:a16="http://schemas.microsoft.com/office/drawing/2014/main" id="{A3B5857F-ACC0-C290-2CE3-26B459D27E2F}"/>
+                  </a:ext>
+                </a:extLst>
+              </p:cNvPr>
+              <p:cNvSpPr txBox="1"/>
+              <p:nvPr/>
+            </p:nvSpPr>
+            <p:spPr>
+              <a:xfrm>
+                <a:off x="6184157" y="1212860"/>
+                <a:ext cx="733727" cy="261610"/>
+              </a:xfrm>
+              <a:prstGeom prst="rect">
+                <a:avLst/>
+              </a:prstGeom>
+              <a:noFill/>
+            </p:spPr>
+            <p:txBody>
+              <a:bodyPr wrap="none" rtlCol="0">
+                <a:spAutoFit/>
+              </a:bodyPr>
+              <a:lstStyle/>
+              <a:p>
+                <a:r>
+                  <a:rPr lang="en-US" altLang="ko-KR" sz="1100" dirty="0"/>
+                  <a:t>arrival(</a:t>
+                </a:r>
+                <a14:m>
+                  <m:oMath xmlns:m="http://schemas.openxmlformats.org/officeDocument/2006/math">
+                    <m:r>
+                      <a:rPr lang="ko-KR" altLang="en-US" sz="1100" i="1" smtClean="0">
+                        <a:latin typeface="Cambria Math" panose="02040503050406030204" pitchFamily="18" charset="0"/>
+                      </a:rPr>
+                      <m:t>𝜆</m:t>
+                    </m:r>
+                  </m:oMath>
+                </a14:m>
+                <a:r>
+                  <a:rPr lang="en-US" altLang="ko-KR" sz="1100" dirty="0"/>
+                  <a:t>)</a:t>
+                </a:r>
+                <a:endParaRPr lang="ko-KR" altLang="en-US" sz="1100" dirty="0"/>
+              </a:p>
+            </p:txBody>
+          </p:sp>
+        </mc:Choice>
+        <mc:Fallback>
+          <p:sp>
+            <p:nvSpPr>
+              <p:cNvPr id="47" name="TextBox 46">
+                <a:extLst>
+                  <a:ext uri="{FF2B5EF4-FFF2-40B4-BE49-F238E27FC236}">
+                    <a16:creationId xmlns:a16="http://schemas.microsoft.com/office/drawing/2014/main" id="{A3B5857F-ACC0-C290-2CE3-26B459D27E2F}"/>
+                  </a:ext>
+                </a:extLst>
+              </p:cNvPr>
+              <p:cNvSpPr txBox="1">
+                <a:spLocks noRot="1" noChangeAspect="1" noMove="1" noResize="1" noEditPoints="1" noAdjustHandles="1" noChangeArrowheads="1" noChangeShapeType="1" noTextEdit="1"/>
+              </p:cNvSpPr>
+              <p:nvPr/>
+            </p:nvSpPr>
+            <p:spPr>
+              <a:xfrm>
+                <a:off x="6184157" y="1212860"/>
+                <a:ext cx="733727" cy="261610"/>
+              </a:xfrm>
+              <a:prstGeom prst="rect">
+                <a:avLst/>
+              </a:prstGeom>
+              <a:blipFill>
+                <a:blip r:embed="rId2"/>
+                <a:stretch>
+                  <a:fillRect t="-2326" b="-13953"/>
+                </a:stretch>
+              </a:blipFill>
+            </p:spPr>
+            <p:txBody>
+              <a:bodyPr/>
+              <a:lstStyle/>
+              <a:p>
+                <a:r>
+                  <a:rPr lang="ko-KR" altLang="en-US">
+                    <a:noFill/>
+                  </a:rPr>
+                  <a:t> </a:t>
+                </a:r>
+              </a:p>
+            </p:txBody>
+          </p:sp>
+        </mc:Fallback>
+      </mc:AlternateContent>
+      <mc:AlternateContent xmlns:mc="http://schemas.openxmlformats.org/markup-compatibility/2006">
+        <mc:Choice xmlns:a14="http://schemas.microsoft.com/office/drawing/2010/main" Requires="a14">
+          <p:sp>
+            <p:nvSpPr>
+              <p:cNvPr id="48" name="TextBox 47">
+                <a:extLst>
+                  <a:ext uri="{FF2B5EF4-FFF2-40B4-BE49-F238E27FC236}">
+                    <a16:creationId xmlns:a16="http://schemas.microsoft.com/office/drawing/2014/main" id="{C82067C4-3D49-B39C-CA25-753FEC25C254}"/>
+                  </a:ext>
+                </a:extLst>
+              </p:cNvPr>
+              <p:cNvSpPr txBox="1"/>
+              <p:nvPr/>
+            </p:nvSpPr>
+            <p:spPr>
+              <a:xfrm>
+                <a:off x="6071443" y="2855773"/>
+                <a:ext cx="975523" cy="261610"/>
+              </a:xfrm>
+              <a:prstGeom prst="rect">
+                <a:avLst/>
+              </a:prstGeom>
+              <a:noFill/>
+            </p:spPr>
+            <p:txBody>
+              <a:bodyPr wrap="none" rtlCol="0">
+                <a:spAutoFit/>
+              </a:bodyPr>
+              <a:lstStyle/>
+              <a:p>
+                <a:r>
+                  <a:rPr lang="en-US" altLang="ko-KR" sz="1100" dirty="0"/>
+                  <a:t>departure(</a:t>
+                </a:r>
+                <a14:m>
+                  <m:oMath xmlns:m="http://schemas.openxmlformats.org/officeDocument/2006/math">
+                    <m:r>
+                      <a:rPr lang="ko-KR" altLang="en-US" sz="1100" i="1" smtClean="0">
+                        <a:latin typeface="Cambria Math" panose="02040503050406030204" pitchFamily="18" charset="0"/>
+                      </a:rPr>
+                      <m:t>𝜇</m:t>
+                    </m:r>
+                  </m:oMath>
+                </a14:m>
+                <a:r>
+                  <a:rPr lang="en-US" altLang="ko-KR" sz="1100" dirty="0"/>
+                  <a:t>)</a:t>
+                </a:r>
+                <a:endParaRPr lang="ko-KR" altLang="en-US" sz="1100" dirty="0"/>
+              </a:p>
+            </p:txBody>
+          </p:sp>
+        </mc:Choice>
+        <mc:Fallback>
+          <p:sp>
+            <p:nvSpPr>
+              <p:cNvPr id="48" name="TextBox 47">
+                <a:extLst>
+                  <a:ext uri="{FF2B5EF4-FFF2-40B4-BE49-F238E27FC236}">
+                    <a16:creationId xmlns:a16="http://schemas.microsoft.com/office/drawing/2014/main" id="{C82067C4-3D49-B39C-CA25-753FEC25C254}"/>
+                  </a:ext>
+                </a:extLst>
+              </p:cNvPr>
+              <p:cNvSpPr txBox="1">
+                <a:spLocks noRot="1" noChangeAspect="1" noMove="1" noResize="1" noEditPoints="1" noAdjustHandles="1" noChangeArrowheads="1" noChangeShapeType="1" noTextEdit="1"/>
+              </p:cNvSpPr>
+              <p:nvPr/>
+            </p:nvSpPr>
+            <p:spPr>
+              <a:xfrm>
+                <a:off x="6071443" y="2855773"/>
+                <a:ext cx="975523" cy="261610"/>
+              </a:xfrm>
+              <a:prstGeom prst="rect">
+                <a:avLst/>
+              </a:prstGeom>
+              <a:blipFill>
+                <a:blip r:embed="rId3"/>
+                <a:stretch>
+                  <a:fillRect t="-2326" b="-13953"/>
+                </a:stretch>
+              </a:blipFill>
+            </p:spPr>
+            <p:txBody>
+              <a:bodyPr/>
+              <a:lstStyle/>
+              <a:p>
+                <a:r>
+                  <a:rPr lang="ko-KR" altLang="en-US">
+                    <a:noFill/>
+                  </a:rPr>
+                  <a:t> </a:t>
+                </a:r>
+              </a:p>
+            </p:txBody>
+          </p:sp>
+        </mc:Fallback>
+      </mc:AlternateContent>
+      <p:sp>
+        <p:nvSpPr>
+          <p:cNvPr id="49" name="Arc 48">
+            <a:extLst>
+              <a:ext uri="{FF2B5EF4-FFF2-40B4-BE49-F238E27FC236}">
+                <a16:creationId xmlns:a16="http://schemas.microsoft.com/office/drawing/2014/main" id="{066FAC99-C2D3-947E-B321-CD7B72905313}"/>
+              </a:ext>
+            </a:extLst>
+          </p:cNvPr>
+          <p:cNvSpPr/>
+          <p:nvPr/>
+        </p:nvSpPr>
+        <p:spPr>
+          <a:xfrm>
+            <a:off x="7712171" y="1474470"/>
+            <a:ext cx="1052945" cy="707390"/>
+          </a:xfrm>
+          <a:prstGeom prst="arc">
+            <a:avLst>
+              <a:gd name="adj1" fmla="val 11886020"/>
+              <a:gd name="adj2" fmla="val 20737714"/>
+            </a:avLst>
+          </a:prstGeom>
+          <a:ln>
+            <a:headEnd type="none" w="med" len="med"/>
+            <a:tailEnd type="arrow" w="med" len="med"/>
+          </a:ln>
+        </p:spPr>
+        <p:style>
+          <a:lnRef idx="1">
+            <a:schemeClr val="accent1"/>
+          </a:lnRef>
+          <a:fillRef idx="0">
+            <a:schemeClr val="accent1"/>
+          </a:fillRef>
+          <a:effectRef idx="0">
+            <a:schemeClr val="accent1"/>
+          </a:effectRef>
+          <a:fontRef idx="minor">
+            <a:schemeClr val="tx1"/>
+          </a:fontRef>
+        </p:style>
+        <p:txBody>
+          <a:bodyPr rtlCol="0" anchor="ctr"/>
+          <a:lstStyle/>
+          <a:p>
+            <a:pPr algn="ctr"/>
+            <a:endParaRPr lang="ko-KR" altLang="en-US"/>
+          </a:p>
+        </p:txBody>
+      </p:sp>
+      <p:sp>
+        <p:nvSpPr>
+          <p:cNvPr id="50" name="Arc 49">
+            <a:extLst>
+              <a:ext uri="{FF2B5EF4-FFF2-40B4-BE49-F238E27FC236}">
+                <a16:creationId xmlns:a16="http://schemas.microsoft.com/office/drawing/2014/main" id="{9229733D-7ADD-DCEA-0610-5EAA7906572E}"/>
+              </a:ext>
+            </a:extLst>
+          </p:cNvPr>
+          <p:cNvSpPr/>
+          <p:nvPr/>
+        </p:nvSpPr>
+        <p:spPr>
+          <a:xfrm>
+            <a:off x="7723024" y="2118360"/>
+            <a:ext cx="1052945" cy="707390"/>
+          </a:xfrm>
+          <a:prstGeom prst="arc">
+            <a:avLst>
+              <a:gd name="adj1" fmla="val 1016396"/>
+              <a:gd name="adj2" fmla="val 9887383"/>
+            </a:avLst>
+          </a:prstGeom>
+          <a:ln>
+            <a:headEnd type="none" w="med" len="med"/>
+            <a:tailEnd type="arrow" w="med" len="med"/>
+          </a:ln>
+        </p:spPr>
+        <p:style>
+          <a:lnRef idx="1">
+            <a:schemeClr val="accent1"/>
+          </a:lnRef>
+          <a:fillRef idx="0">
+            <a:schemeClr val="accent1"/>
+          </a:fillRef>
+          <a:effectRef idx="0">
+            <a:schemeClr val="accent1"/>
+          </a:effectRef>
+          <a:fontRef idx="minor">
+            <a:schemeClr val="tx1"/>
+          </a:fontRef>
+        </p:style>
+        <p:txBody>
+          <a:bodyPr rtlCol="0" anchor="ctr"/>
+          <a:lstStyle/>
+          <a:p>
+            <a:pPr algn="ctr"/>
+            <a:endParaRPr lang="ko-KR" altLang="en-US"/>
+          </a:p>
+        </p:txBody>
+      </p:sp>
+      <mc:AlternateContent xmlns:mc="http://schemas.openxmlformats.org/markup-compatibility/2006">
+        <mc:Choice xmlns:a14="http://schemas.microsoft.com/office/drawing/2010/main" Requires="a14">
+          <p:sp>
+            <p:nvSpPr>
+              <p:cNvPr id="51" name="TextBox 50">
+                <a:extLst>
+                  <a:ext uri="{FF2B5EF4-FFF2-40B4-BE49-F238E27FC236}">
+                    <a16:creationId xmlns:a16="http://schemas.microsoft.com/office/drawing/2014/main" id="{35535F04-D772-13A1-7096-511B0AB6E86A}"/>
+                  </a:ext>
+                </a:extLst>
+              </p:cNvPr>
+              <p:cNvSpPr txBox="1"/>
+              <p:nvPr/>
+            </p:nvSpPr>
+            <p:spPr>
+              <a:xfrm>
+                <a:off x="7874448" y="1212860"/>
+                <a:ext cx="733727" cy="261610"/>
+              </a:xfrm>
+              <a:prstGeom prst="rect">
+                <a:avLst/>
+              </a:prstGeom>
+              <a:noFill/>
+            </p:spPr>
+            <p:txBody>
+              <a:bodyPr wrap="none" rtlCol="0">
+                <a:spAutoFit/>
+              </a:bodyPr>
+              <a:lstStyle/>
+              <a:p>
+                <a:r>
+                  <a:rPr lang="en-US" altLang="ko-KR" sz="1100" dirty="0"/>
+                  <a:t>arrival(</a:t>
+                </a:r>
+                <a14:m>
+                  <m:oMath xmlns:m="http://schemas.openxmlformats.org/officeDocument/2006/math">
+                    <m:r>
+                      <a:rPr lang="ko-KR" altLang="en-US" sz="1100" i="1" smtClean="0">
+                        <a:latin typeface="Cambria Math" panose="02040503050406030204" pitchFamily="18" charset="0"/>
+                      </a:rPr>
+                      <m:t>𝜆</m:t>
+                    </m:r>
+                  </m:oMath>
+                </a14:m>
+                <a:r>
+                  <a:rPr lang="en-US" altLang="ko-KR" sz="1100" dirty="0"/>
+                  <a:t>)</a:t>
+                </a:r>
+                <a:endParaRPr lang="ko-KR" altLang="en-US" sz="1100" dirty="0"/>
+              </a:p>
+            </p:txBody>
+          </p:sp>
+        </mc:Choice>
+        <mc:Fallback>
+          <p:sp>
+            <p:nvSpPr>
+              <p:cNvPr id="51" name="TextBox 50">
+                <a:extLst>
+                  <a:ext uri="{FF2B5EF4-FFF2-40B4-BE49-F238E27FC236}">
+                    <a16:creationId xmlns:a16="http://schemas.microsoft.com/office/drawing/2014/main" id="{35535F04-D772-13A1-7096-511B0AB6E86A}"/>
+                  </a:ext>
+                </a:extLst>
+              </p:cNvPr>
+              <p:cNvSpPr txBox="1">
+                <a:spLocks noRot="1" noChangeAspect="1" noMove="1" noResize="1" noEditPoints="1" noAdjustHandles="1" noChangeArrowheads="1" noChangeShapeType="1" noTextEdit="1"/>
+              </p:cNvSpPr>
+              <p:nvPr/>
+            </p:nvSpPr>
+            <p:spPr>
+              <a:xfrm>
+                <a:off x="7874448" y="1212860"/>
+                <a:ext cx="733727" cy="261610"/>
+              </a:xfrm>
+              <a:prstGeom prst="rect">
+                <a:avLst/>
+              </a:prstGeom>
+              <a:blipFill>
+                <a:blip r:embed="rId4"/>
+                <a:stretch>
+                  <a:fillRect t="-2326" b="-13953"/>
+                </a:stretch>
+              </a:blipFill>
+            </p:spPr>
+            <p:txBody>
+              <a:bodyPr/>
+              <a:lstStyle/>
+              <a:p>
+                <a:r>
+                  <a:rPr lang="ko-KR" altLang="en-US">
+                    <a:noFill/>
+                  </a:rPr>
+                  <a:t> </a:t>
+                </a:r>
+              </a:p>
+            </p:txBody>
+          </p:sp>
+        </mc:Fallback>
+      </mc:AlternateContent>
+      <mc:AlternateContent xmlns:mc="http://schemas.openxmlformats.org/markup-compatibility/2006">
+        <mc:Choice xmlns:a14="http://schemas.microsoft.com/office/drawing/2010/main" Requires="a14">
+          <p:sp>
+            <p:nvSpPr>
+              <p:cNvPr id="52" name="TextBox 51">
+                <a:extLst>
+                  <a:ext uri="{FF2B5EF4-FFF2-40B4-BE49-F238E27FC236}">
+                    <a16:creationId xmlns:a16="http://schemas.microsoft.com/office/drawing/2014/main" id="{40C75F9B-D1A7-9DF7-D597-9FFB1406044B}"/>
+                  </a:ext>
+                </a:extLst>
+              </p:cNvPr>
+              <p:cNvSpPr txBox="1"/>
+              <p:nvPr/>
+            </p:nvSpPr>
+            <p:spPr>
+              <a:xfrm>
+                <a:off x="7761734" y="2855773"/>
+                <a:ext cx="975523" cy="261610"/>
+              </a:xfrm>
+              <a:prstGeom prst="rect">
+                <a:avLst/>
+              </a:prstGeom>
+              <a:noFill/>
+            </p:spPr>
+            <p:txBody>
+              <a:bodyPr wrap="none" rtlCol="0">
+                <a:spAutoFit/>
+              </a:bodyPr>
+              <a:lstStyle/>
+              <a:p>
+                <a:r>
+                  <a:rPr lang="en-US" altLang="ko-KR" sz="1100" dirty="0"/>
+                  <a:t>departure(</a:t>
+                </a:r>
+                <a14:m>
+                  <m:oMath xmlns:m="http://schemas.openxmlformats.org/officeDocument/2006/math">
+                    <m:r>
+                      <a:rPr lang="ko-KR" altLang="en-US" sz="1100" i="1" smtClean="0">
+                        <a:latin typeface="Cambria Math" panose="02040503050406030204" pitchFamily="18" charset="0"/>
+                      </a:rPr>
+                      <m:t>𝜇</m:t>
+                    </m:r>
+                  </m:oMath>
+                </a14:m>
+                <a:r>
+                  <a:rPr lang="en-US" altLang="ko-KR" sz="1100" dirty="0"/>
+                  <a:t>)</a:t>
+                </a:r>
+                <a:endParaRPr lang="ko-KR" altLang="en-US" sz="1100" dirty="0"/>
+              </a:p>
+            </p:txBody>
+          </p:sp>
+        </mc:Choice>
+        <mc:Fallback>
+          <p:sp>
+            <p:nvSpPr>
+              <p:cNvPr id="52" name="TextBox 51">
+                <a:extLst>
+                  <a:ext uri="{FF2B5EF4-FFF2-40B4-BE49-F238E27FC236}">
+                    <a16:creationId xmlns:a16="http://schemas.microsoft.com/office/drawing/2014/main" id="{40C75F9B-D1A7-9DF7-D597-9FFB1406044B}"/>
+                  </a:ext>
+                </a:extLst>
+              </p:cNvPr>
+              <p:cNvSpPr txBox="1">
+                <a:spLocks noRot="1" noChangeAspect="1" noMove="1" noResize="1" noEditPoints="1" noAdjustHandles="1" noChangeArrowheads="1" noChangeShapeType="1" noTextEdit="1"/>
+              </p:cNvSpPr>
+              <p:nvPr/>
+            </p:nvSpPr>
+            <p:spPr>
+              <a:xfrm>
+                <a:off x="7761734" y="2855773"/>
+                <a:ext cx="975523" cy="261610"/>
+              </a:xfrm>
+              <a:prstGeom prst="rect">
+                <a:avLst/>
+              </a:prstGeom>
+              <a:blipFill>
+                <a:blip r:embed="rId3"/>
+                <a:stretch>
+                  <a:fillRect t="-2326" b="-13953"/>
+                </a:stretch>
+              </a:blipFill>
+            </p:spPr>
+            <p:txBody>
+              <a:bodyPr/>
+              <a:lstStyle/>
+              <a:p>
+                <a:r>
+                  <a:rPr lang="ko-KR" altLang="en-US">
+                    <a:noFill/>
+                  </a:rPr>
+                  <a:t> </a:t>
+                </a:r>
+              </a:p>
+            </p:txBody>
+          </p:sp>
+        </mc:Fallback>
+      </mc:AlternateContent>
+      <p:sp>
+        <p:nvSpPr>
+          <p:cNvPr id="53" name="Oval 52">
+            <a:extLst>
+              <a:ext uri="{FF2B5EF4-FFF2-40B4-BE49-F238E27FC236}">
+                <a16:creationId xmlns:a16="http://schemas.microsoft.com/office/drawing/2014/main" id="{91AB6D1B-B373-73F0-E69B-9C64DA08E318}"/>
+              </a:ext>
+            </a:extLst>
+          </p:cNvPr>
+          <p:cNvSpPr/>
+          <p:nvPr/>
+        </p:nvSpPr>
+        <p:spPr>
+          <a:xfrm>
+            <a:off x="1995054" y="4208775"/>
+            <a:ext cx="868218" cy="868218"/>
+          </a:xfrm>
+          <a:prstGeom prst="ellipse">
+            <a:avLst/>
+          </a:prstGeom>
+          <a:noFill/>
+        </p:spPr>
+        <p:style>
+          <a:lnRef idx="2">
+            <a:schemeClr val="accent1">
+              <a:shade val="15000"/>
+            </a:schemeClr>
+          </a:lnRef>
+          <a:fillRef idx="1">
+            <a:schemeClr val="accent1"/>
+          </a:fillRef>
+          <a:effectRef idx="0">
+            <a:schemeClr val="accent1"/>
+          </a:effectRef>
+          <a:fontRef idx="minor">
+            <a:schemeClr val="lt1"/>
+          </a:fontRef>
+        </p:style>
+        <p:txBody>
+          <a:bodyPr rtlCol="0" anchor="ctr"/>
+          <a:lstStyle/>
+          <a:p>
+            <a:pPr algn="ctr"/>
+            <a:r>
+              <a:rPr lang="en-US" altLang="ko-KR" dirty="0">
+                <a:solidFill>
+                  <a:schemeClr val="tx1"/>
+                </a:solidFill>
+              </a:rPr>
+              <a:t>0</a:t>
+            </a:r>
+            <a:endParaRPr lang="ko-KR" altLang="en-US" dirty="0">
+              <a:solidFill>
+                <a:schemeClr val="tx1"/>
+              </a:solidFill>
+            </a:endParaRPr>
+          </a:p>
+        </p:txBody>
+      </p:sp>
+      <p:sp>
+        <p:nvSpPr>
+          <p:cNvPr id="54" name="Oval 53">
+            <a:extLst>
+              <a:ext uri="{FF2B5EF4-FFF2-40B4-BE49-F238E27FC236}">
+                <a16:creationId xmlns:a16="http://schemas.microsoft.com/office/drawing/2014/main" id="{BF87869F-79A8-F887-4D55-EF808373EFAB}"/>
+              </a:ext>
+            </a:extLst>
+          </p:cNvPr>
+          <p:cNvSpPr/>
+          <p:nvPr/>
+        </p:nvSpPr>
+        <p:spPr>
+          <a:xfrm>
+            <a:off x="3643745" y="4208775"/>
+            <a:ext cx="868218" cy="868218"/>
+          </a:xfrm>
+          <a:prstGeom prst="ellipse">
+            <a:avLst/>
+          </a:prstGeom>
+          <a:noFill/>
+        </p:spPr>
+        <p:style>
+          <a:lnRef idx="2">
+            <a:schemeClr val="accent1">
+              <a:shade val="15000"/>
+            </a:schemeClr>
+          </a:lnRef>
+          <a:fillRef idx="1">
+            <a:schemeClr val="accent1"/>
+          </a:fillRef>
+          <a:effectRef idx="0">
+            <a:schemeClr val="accent1"/>
+          </a:effectRef>
+          <a:fontRef idx="minor">
+            <a:schemeClr val="lt1"/>
+          </a:fontRef>
+        </p:style>
+        <p:txBody>
+          <a:bodyPr rtlCol="0" anchor="ctr"/>
+          <a:lstStyle/>
+          <a:p>
+            <a:pPr algn="ctr"/>
+            <a:r>
+              <a:rPr lang="en-US" altLang="ko-KR" dirty="0">
+                <a:solidFill>
+                  <a:schemeClr val="tx1"/>
+                </a:solidFill>
+              </a:rPr>
+              <a:t>1</a:t>
+            </a:r>
+            <a:endParaRPr lang="ko-KR" altLang="en-US" dirty="0">
+              <a:solidFill>
+                <a:schemeClr val="tx1"/>
+              </a:solidFill>
+            </a:endParaRPr>
+          </a:p>
+        </p:txBody>
+      </p:sp>
+      <p:sp>
+        <p:nvSpPr>
+          <p:cNvPr id="55" name="Oval 54">
+            <a:extLst>
+              <a:ext uri="{FF2B5EF4-FFF2-40B4-BE49-F238E27FC236}">
+                <a16:creationId xmlns:a16="http://schemas.microsoft.com/office/drawing/2014/main" id="{AEDD0CBB-805C-229A-0266-6F39F00C4BA1}"/>
+              </a:ext>
+            </a:extLst>
+          </p:cNvPr>
+          <p:cNvSpPr/>
+          <p:nvPr/>
+        </p:nvSpPr>
+        <p:spPr>
+          <a:xfrm>
+            <a:off x="5292436" y="4208775"/>
+            <a:ext cx="868218" cy="868218"/>
+          </a:xfrm>
+          <a:prstGeom prst="ellipse">
+            <a:avLst/>
+          </a:prstGeom>
+          <a:noFill/>
+        </p:spPr>
+        <p:style>
+          <a:lnRef idx="2">
+            <a:schemeClr val="accent1">
+              <a:shade val="15000"/>
+            </a:schemeClr>
+          </a:lnRef>
+          <a:fillRef idx="1">
+            <a:schemeClr val="accent1"/>
+          </a:fillRef>
+          <a:effectRef idx="0">
+            <a:schemeClr val="accent1"/>
+          </a:effectRef>
+          <a:fontRef idx="minor">
+            <a:schemeClr val="lt1"/>
+          </a:fontRef>
+        </p:style>
+        <p:txBody>
+          <a:bodyPr rtlCol="0" anchor="ctr"/>
+          <a:lstStyle/>
+          <a:p>
+            <a:pPr algn="ctr"/>
+            <a:r>
+              <a:rPr lang="en-US" altLang="ko-KR" dirty="0">
+                <a:solidFill>
+                  <a:schemeClr val="tx1"/>
+                </a:solidFill>
+              </a:rPr>
+              <a:t>2</a:t>
+            </a:r>
+            <a:endParaRPr lang="ko-KR" altLang="en-US" dirty="0">
+              <a:solidFill>
+                <a:schemeClr val="tx1"/>
+              </a:solidFill>
+            </a:endParaRPr>
+          </a:p>
+        </p:txBody>
+      </p:sp>
+      <p:sp>
+        <p:nvSpPr>
+          <p:cNvPr id="56" name="Oval 55">
+            <a:extLst>
+              <a:ext uri="{FF2B5EF4-FFF2-40B4-BE49-F238E27FC236}">
+                <a16:creationId xmlns:a16="http://schemas.microsoft.com/office/drawing/2014/main" id="{0F83B556-D450-89FF-3383-F27CC5F8B191}"/>
+              </a:ext>
+            </a:extLst>
+          </p:cNvPr>
+          <p:cNvSpPr/>
+          <p:nvPr/>
+        </p:nvSpPr>
+        <p:spPr>
+          <a:xfrm>
+            <a:off x="6941127" y="4208775"/>
+            <a:ext cx="868218" cy="868218"/>
+          </a:xfrm>
+          <a:prstGeom prst="ellipse">
+            <a:avLst/>
+          </a:prstGeom>
+          <a:noFill/>
+        </p:spPr>
+        <p:style>
+          <a:lnRef idx="2">
+            <a:schemeClr val="accent1">
+              <a:shade val="15000"/>
+            </a:schemeClr>
+          </a:lnRef>
+          <a:fillRef idx="1">
+            <a:schemeClr val="accent1"/>
+          </a:fillRef>
+          <a:effectRef idx="0">
+            <a:schemeClr val="accent1"/>
+          </a:effectRef>
+          <a:fontRef idx="minor">
+            <a:schemeClr val="lt1"/>
+          </a:fontRef>
+        </p:style>
+        <p:txBody>
+          <a:bodyPr rtlCol="0" anchor="ctr"/>
+          <a:lstStyle/>
+          <a:p>
+            <a:pPr algn="ctr"/>
+            <a:r>
+              <a:rPr lang="en-US" altLang="ko-KR" dirty="0">
+                <a:solidFill>
+                  <a:schemeClr val="tx1"/>
+                </a:solidFill>
+              </a:rPr>
+              <a:t>3</a:t>
+            </a:r>
+            <a:endParaRPr lang="ko-KR" altLang="en-US" dirty="0">
+              <a:solidFill>
+                <a:schemeClr val="tx1"/>
+              </a:solidFill>
+            </a:endParaRPr>
+          </a:p>
+        </p:txBody>
+      </p:sp>
+      <p:sp>
+        <p:nvSpPr>
+          <p:cNvPr id="57" name="Arc 56">
+            <a:extLst>
+              <a:ext uri="{FF2B5EF4-FFF2-40B4-BE49-F238E27FC236}">
+                <a16:creationId xmlns:a16="http://schemas.microsoft.com/office/drawing/2014/main" id="{69F2F927-F52F-AD40-1309-7E7AB7401B70}"/>
+              </a:ext>
+            </a:extLst>
+          </p:cNvPr>
+          <p:cNvSpPr/>
+          <p:nvPr/>
+        </p:nvSpPr>
+        <p:spPr>
+          <a:xfrm>
+            <a:off x="2716183" y="4002227"/>
+            <a:ext cx="1052945" cy="707390"/>
+          </a:xfrm>
+          <a:prstGeom prst="arc">
+            <a:avLst>
+              <a:gd name="adj1" fmla="val 11886020"/>
+              <a:gd name="adj2" fmla="val 20737714"/>
+            </a:avLst>
+          </a:prstGeom>
+          <a:ln>
+            <a:headEnd type="none" w="med" len="med"/>
+            <a:tailEnd type="arrow" w="med" len="med"/>
+          </a:ln>
+        </p:spPr>
+        <p:style>
+          <a:lnRef idx="1">
+            <a:schemeClr val="accent1"/>
+          </a:lnRef>
+          <a:fillRef idx="0">
+            <a:schemeClr val="accent1"/>
+          </a:fillRef>
+          <a:effectRef idx="0">
+            <a:schemeClr val="accent1"/>
+          </a:effectRef>
+          <a:fontRef idx="minor">
+            <a:schemeClr val="tx1"/>
+          </a:fontRef>
+        </p:style>
+        <p:txBody>
+          <a:bodyPr rtlCol="0" anchor="ctr"/>
+          <a:lstStyle/>
+          <a:p>
+            <a:pPr algn="ctr"/>
+            <a:endParaRPr lang="ko-KR" altLang="en-US"/>
+          </a:p>
+        </p:txBody>
+      </p:sp>
+      <p:sp>
+        <p:nvSpPr>
+          <p:cNvPr id="58" name="Arc 57">
+            <a:extLst>
+              <a:ext uri="{FF2B5EF4-FFF2-40B4-BE49-F238E27FC236}">
+                <a16:creationId xmlns:a16="http://schemas.microsoft.com/office/drawing/2014/main" id="{4CADC619-B840-07F4-FA81-F7751BB5B43B}"/>
+              </a:ext>
+            </a:extLst>
+          </p:cNvPr>
+          <p:cNvSpPr/>
+          <p:nvPr/>
+        </p:nvSpPr>
+        <p:spPr>
+          <a:xfrm>
+            <a:off x="2727036" y="4646117"/>
+            <a:ext cx="1052945" cy="707390"/>
+          </a:xfrm>
+          <a:prstGeom prst="arc">
+            <a:avLst>
+              <a:gd name="adj1" fmla="val 1016396"/>
+              <a:gd name="adj2" fmla="val 9887383"/>
+            </a:avLst>
+          </a:prstGeom>
+          <a:ln>
+            <a:headEnd type="none" w="med" len="med"/>
+            <a:tailEnd type="arrow" w="med" len="med"/>
+          </a:ln>
+        </p:spPr>
+        <p:style>
+          <a:lnRef idx="1">
+            <a:schemeClr val="accent1"/>
+          </a:lnRef>
+          <a:fillRef idx="0">
+            <a:schemeClr val="accent1"/>
+          </a:fillRef>
+          <a:effectRef idx="0">
+            <a:schemeClr val="accent1"/>
+          </a:effectRef>
+          <a:fontRef idx="minor">
+            <a:schemeClr val="tx1"/>
+          </a:fontRef>
+        </p:style>
+        <p:txBody>
+          <a:bodyPr rtlCol="0" anchor="ctr"/>
+          <a:lstStyle/>
+          <a:p>
+            <a:pPr algn="ctr"/>
+            <a:endParaRPr lang="ko-KR" altLang="en-US"/>
+          </a:p>
+        </p:txBody>
+      </p:sp>
+      <mc:AlternateContent xmlns:mc="http://schemas.openxmlformats.org/markup-compatibility/2006">
+        <mc:Choice xmlns:a14="http://schemas.microsoft.com/office/drawing/2010/main" Requires="a14">
+          <p:sp>
+            <p:nvSpPr>
+              <p:cNvPr id="59" name="TextBox 58">
+                <a:extLst>
+                  <a:ext uri="{FF2B5EF4-FFF2-40B4-BE49-F238E27FC236}">
+                    <a16:creationId xmlns:a16="http://schemas.microsoft.com/office/drawing/2014/main" id="{A6D574A3-63EB-8478-33A1-50EB76E2CCE6}"/>
+                  </a:ext>
+                </a:extLst>
+              </p:cNvPr>
+              <p:cNvSpPr txBox="1"/>
+              <p:nvPr/>
+            </p:nvSpPr>
+            <p:spPr>
+              <a:xfrm>
+                <a:off x="2897128" y="3668563"/>
+                <a:ext cx="778418" cy="345672"/>
+              </a:xfrm>
+              <a:prstGeom prst="rect">
+                <a:avLst/>
+              </a:prstGeom>
+              <a:noFill/>
+            </p:spPr>
+            <p:txBody>
+              <a:bodyPr wrap="none" rtlCol="0">
+                <a:spAutoFit/>
+              </a:bodyPr>
+              <a:lstStyle/>
+              <a:p>
+                <a:r>
+                  <a:rPr lang="en-US" altLang="ko-KR" sz="1100" dirty="0"/>
+                  <a:t>arrival</a:t>
+                </a:r>
+                <a14:m>
+                  <m:oMath xmlns:m="http://schemas.openxmlformats.org/officeDocument/2006/math">
+                    <m:d>
+                      <m:dPr>
+                        <m:ctrlPr>
+                          <a:rPr lang="en-US" altLang="ko-KR" sz="1100" i="1" smtClean="0">
+                            <a:latin typeface="Cambria Math" panose="02040503050406030204" pitchFamily="18" charset="0"/>
+                          </a:rPr>
+                        </m:ctrlPr>
+                      </m:dPr>
+                      <m:e>
+                        <m:f>
+                          <m:fPr>
+                            <m:ctrlPr>
+                              <a:rPr lang="en-US" altLang="ko-KR" sz="1100" i="1">
+                                <a:latin typeface="Cambria Math" panose="02040503050406030204" pitchFamily="18" charset="0"/>
+                              </a:rPr>
+                            </m:ctrlPr>
+                          </m:fPr>
+                          <m:num>
+                            <m:r>
+                              <a:rPr lang="ko-KR" altLang="en-US" sz="1100" i="1">
+                                <a:latin typeface="Cambria Math" panose="02040503050406030204" pitchFamily="18" charset="0"/>
+                              </a:rPr>
+                              <m:t>𝜆</m:t>
+                            </m:r>
+                          </m:num>
+                          <m:den>
+                            <m:r>
+                              <a:rPr lang="en-US" altLang="ko-KR" sz="1100" i="1">
+                                <a:latin typeface="Cambria Math" panose="02040503050406030204" pitchFamily="18" charset="0"/>
+                              </a:rPr>
+                              <m:t>𝑛</m:t>
+                            </m:r>
+                          </m:den>
+                        </m:f>
+                      </m:e>
+                    </m:d>
+                  </m:oMath>
+                </a14:m>
+                <a:endParaRPr lang="ko-KR" altLang="en-US" sz="1100" dirty="0"/>
+              </a:p>
+            </p:txBody>
+          </p:sp>
+        </mc:Choice>
+        <mc:Fallback>
+          <p:sp>
+            <p:nvSpPr>
+              <p:cNvPr id="59" name="TextBox 58">
+                <a:extLst>
+                  <a:ext uri="{FF2B5EF4-FFF2-40B4-BE49-F238E27FC236}">
+                    <a16:creationId xmlns:a16="http://schemas.microsoft.com/office/drawing/2014/main" id="{A6D574A3-63EB-8478-33A1-50EB76E2CCE6}"/>
+                  </a:ext>
+                </a:extLst>
+              </p:cNvPr>
+              <p:cNvSpPr txBox="1">
+                <a:spLocks noRot="1" noChangeAspect="1" noMove="1" noResize="1" noEditPoints="1" noAdjustHandles="1" noChangeArrowheads="1" noChangeShapeType="1" noTextEdit="1"/>
+              </p:cNvSpPr>
+              <p:nvPr/>
+            </p:nvSpPr>
+            <p:spPr>
+              <a:xfrm>
+                <a:off x="2897128" y="3668563"/>
+                <a:ext cx="778418" cy="345672"/>
+              </a:xfrm>
+              <a:prstGeom prst="rect">
+                <a:avLst/>
+              </a:prstGeom>
+              <a:blipFill>
+                <a:blip r:embed="rId5"/>
+                <a:stretch>
+                  <a:fillRect/>
+                </a:stretch>
+              </a:blipFill>
+            </p:spPr>
+            <p:txBody>
+              <a:bodyPr/>
+              <a:lstStyle/>
+              <a:p>
+                <a:r>
+                  <a:rPr lang="ko-KR" altLang="en-US">
+                    <a:noFill/>
+                  </a:rPr>
+                  <a:t> </a:t>
+                </a:r>
+              </a:p>
+            </p:txBody>
+          </p:sp>
+        </mc:Fallback>
+      </mc:AlternateContent>
+      <mc:AlternateContent xmlns:mc="http://schemas.openxmlformats.org/markup-compatibility/2006">
+        <mc:Choice xmlns:a14="http://schemas.microsoft.com/office/drawing/2010/main" Requires="a14">
+          <p:sp>
+            <p:nvSpPr>
+              <p:cNvPr id="60" name="TextBox 59">
+                <a:extLst>
+                  <a:ext uri="{FF2B5EF4-FFF2-40B4-BE49-F238E27FC236}">
+                    <a16:creationId xmlns:a16="http://schemas.microsoft.com/office/drawing/2014/main" id="{6DC40456-8792-880A-61AA-0D8BC44ABE01}"/>
+                  </a:ext>
+                </a:extLst>
+              </p:cNvPr>
+              <p:cNvSpPr txBox="1"/>
+              <p:nvPr/>
+            </p:nvSpPr>
+            <p:spPr>
+              <a:xfrm>
+                <a:off x="2765746" y="5369550"/>
+                <a:ext cx="1041182" cy="351828"/>
+              </a:xfrm>
+              <a:prstGeom prst="rect">
+                <a:avLst/>
+              </a:prstGeom>
+              <a:noFill/>
+            </p:spPr>
+            <p:txBody>
+              <a:bodyPr wrap="none" rtlCol="0">
+                <a:spAutoFit/>
+              </a:bodyPr>
+              <a:lstStyle/>
+              <a:p>
+                <a:r>
+                  <a:rPr lang="en-US" altLang="ko-KR" sz="1100" dirty="0"/>
+                  <a:t>departure</a:t>
+                </a:r>
+                <a14:m>
+                  <m:oMath xmlns:m="http://schemas.openxmlformats.org/officeDocument/2006/math">
+                    <m:d>
+                      <m:dPr>
+                        <m:ctrlPr>
+                          <a:rPr lang="en-US" altLang="ko-KR" sz="1100" i="1">
+                            <a:latin typeface="Cambria Math" panose="02040503050406030204" pitchFamily="18" charset="0"/>
+                          </a:rPr>
+                        </m:ctrlPr>
+                      </m:dPr>
+                      <m:e>
+                        <m:f>
+                          <m:fPr>
+                            <m:ctrlPr>
+                              <a:rPr lang="en-US" altLang="ko-KR" sz="1100" i="1">
+                                <a:latin typeface="Cambria Math" panose="02040503050406030204" pitchFamily="18" charset="0"/>
+                              </a:rPr>
+                            </m:ctrlPr>
+                          </m:fPr>
+                          <m:num>
+                            <m:r>
+                              <a:rPr lang="ko-KR" altLang="en-US" sz="1100" i="1" smtClean="0">
+                                <a:latin typeface="Cambria Math" panose="02040503050406030204" pitchFamily="18" charset="0"/>
+                              </a:rPr>
+                              <m:t>𝜇</m:t>
+                            </m:r>
+                          </m:num>
+                          <m:den>
+                            <m:r>
+                              <a:rPr lang="en-US" altLang="ko-KR" sz="1100" i="1">
+                                <a:latin typeface="Cambria Math" panose="02040503050406030204" pitchFamily="18" charset="0"/>
+                              </a:rPr>
+                              <m:t>𝑛</m:t>
+                            </m:r>
+                          </m:den>
+                        </m:f>
+                      </m:e>
+                    </m:d>
+                  </m:oMath>
+                </a14:m>
+                <a:endParaRPr lang="ko-KR" altLang="en-US" sz="1100" dirty="0"/>
+              </a:p>
+            </p:txBody>
+          </p:sp>
+        </mc:Choice>
+        <mc:Fallback>
+          <p:sp>
+            <p:nvSpPr>
+              <p:cNvPr id="60" name="TextBox 59">
+                <a:extLst>
+                  <a:ext uri="{FF2B5EF4-FFF2-40B4-BE49-F238E27FC236}">
+                    <a16:creationId xmlns:a16="http://schemas.microsoft.com/office/drawing/2014/main" id="{6DC40456-8792-880A-61AA-0D8BC44ABE01}"/>
+                  </a:ext>
+                </a:extLst>
+              </p:cNvPr>
+              <p:cNvSpPr txBox="1">
+                <a:spLocks noRot="1" noChangeAspect="1" noMove="1" noResize="1" noEditPoints="1" noAdjustHandles="1" noChangeArrowheads="1" noChangeShapeType="1" noTextEdit="1"/>
+              </p:cNvSpPr>
+              <p:nvPr/>
+            </p:nvSpPr>
+            <p:spPr>
+              <a:xfrm>
+                <a:off x="2765746" y="5369550"/>
+                <a:ext cx="1041182" cy="351828"/>
+              </a:xfrm>
+              <a:prstGeom prst="rect">
+                <a:avLst/>
+              </a:prstGeom>
+              <a:blipFill>
+                <a:blip r:embed="rId6"/>
+                <a:stretch>
+                  <a:fillRect/>
+                </a:stretch>
+              </a:blipFill>
+            </p:spPr>
+            <p:txBody>
+              <a:bodyPr/>
+              <a:lstStyle/>
+              <a:p>
+                <a:r>
+                  <a:rPr lang="ko-KR" altLang="en-US">
+                    <a:noFill/>
+                  </a:rPr>
+                  <a:t> </a:t>
+                </a:r>
+              </a:p>
+            </p:txBody>
+          </p:sp>
+        </mc:Fallback>
+      </mc:AlternateContent>
+      <p:sp>
+        <p:nvSpPr>
+          <p:cNvPr id="61" name="TextBox 60">
+            <a:extLst>
+              <a:ext uri="{FF2B5EF4-FFF2-40B4-BE49-F238E27FC236}">
+                <a16:creationId xmlns:a16="http://schemas.microsoft.com/office/drawing/2014/main" id="{FD8289C3-2660-92C6-8909-2D8304483B96}"/>
+              </a:ext>
+            </a:extLst>
+          </p:cNvPr>
+          <p:cNvSpPr txBox="1"/>
+          <p:nvPr/>
+        </p:nvSpPr>
+        <p:spPr>
+          <a:xfrm>
+            <a:off x="8729176" y="4489103"/>
+            <a:ext cx="502061" cy="369332"/>
+          </a:xfrm>
+          <a:prstGeom prst="rect">
+            <a:avLst/>
+          </a:prstGeom>
+          <a:noFill/>
+        </p:spPr>
+        <p:txBody>
+          <a:bodyPr wrap="none" rtlCol="0">
+            <a:spAutoFit/>
+          </a:bodyPr>
+          <a:lstStyle/>
+          <a:p>
+            <a:r>
+              <a:rPr lang="en-US" altLang="ko-KR" dirty="0"/>
+              <a:t>· · ·</a:t>
+            </a:r>
+            <a:endParaRPr lang="ko-KR" altLang="en-US" dirty="0"/>
+          </a:p>
+        </p:txBody>
+      </p:sp>
+      <p:sp>
+        <p:nvSpPr>
+          <p:cNvPr id="74" name="Arc 73">
+            <a:extLst>
+              <a:ext uri="{FF2B5EF4-FFF2-40B4-BE49-F238E27FC236}">
+                <a16:creationId xmlns:a16="http://schemas.microsoft.com/office/drawing/2014/main" id="{731CCE5D-918E-328B-F264-53F4617D25CF}"/>
+              </a:ext>
+            </a:extLst>
+          </p:cNvPr>
+          <p:cNvSpPr/>
+          <p:nvPr/>
+        </p:nvSpPr>
+        <p:spPr>
+          <a:xfrm>
+            <a:off x="4440694" y="4002227"/>
+            <a:ext cx="1052945" cy="707390"/>
+          </a:xfrm>
+          <a:prstGeom prst="arc">
+            <a:avLst>
+              <a:gd name="adj1" fmla="val 11886020"/>
+              <a:gd name="adj2" fmla="val 20737714"/>
+            </a:avLst>
+          </a:prstGeom>
+          <a:ln>
+            <a:headEnd type="none" w="med" len="med"/>
+            <a:tailEnd type="arrow" w="med" len="med"/>
+          </a:ln>
+        </p:spPr>
+        <p:style>
+          <a:lnRef idx="1">
+            <a:schemeClr val="accent1"/>
+          </a:lnRef>
+          <a:fillRef idx="0">
+            <a:schemeClr val="accent1"/>
+          </a:fillRef>
+          <a:effectRef idx="0">
+            <a:schemeClr val="accent1"/>
+          </a:effectRef>
+          <a:fontRef idx="minor">
+            <a:schemeClr val="tx1"/>
+          </a:fontRef>
+        </p:style>
+        <p:txBody>
+          <a:bodyPr rtlCol="0" anchor="ctr"/>
+          <a:lstStyle/>
+          <a:p>
+            <a:pPr algn="ctr"/>
+            <a:endParaRPr lang="ko-KR" altLang="en-US"/>
+          </a:p>
+        </p:txBody>
+      </p:sp>
+      <p:sp>
+        <p:nvSpPr>
+          <p:cNvPr id="75" name="Arc 74">
+            <a:extLst>
+              <a:ext uri="{FF2B5EF4-FFF2-40B4-BE49-F238E27FC236}">
+                <a16:creationId xmlns:a16="http://schemas.microsoft.com/office/drawing/2014/main" id="{FE2B2033-61AB-D194-04BE-A7E62F8BE24B}"/>
+              </a:ext>
+            </a:extLst>
+          </p:cNvPr>
+          <p:cNvSpPr/>
+          <p:nvPr/>
+        </p:nvSpPr>
+        <p:spPr>
+          <a:xfrm>
+            <a:off x="4451547" y="4646117"/>
+            <a:ext cx="1052945" cy="707390"/>
+          </a:xfrm>
+          <a:prstGeom prst="arc">
+            <a:avLst>
+              <a:gd name="adj1" fmla="val 1016396"/>
+              <a:gd name="adj2" fmla="val 9887383"/>
+            </a:avLst>
+          </a:prstGeom>
+          <a:ln>
+            <a:headEnd type="none" w="med" len="med"/>
+            <a:tailEnd type="arrow" w="med" len="med"/>
+          </a:ln>
+        </p:spPr>
+        <p:style>
+          <a:lnRef idx="1">
+            <a:schemeClr val="accent1"/>
+          </a:lnRef>
+          <a:fillRef idx="0">
+            <a:schemeClr val="accent1"/>
+          </a:fillRef>
+          <a:effectRef idx="0">
+            <a:schemeClr val="accent1"/>
+          </a:effectRef>
+          <a:fontRef idx="minor">
+            <a:schemeClr val="tx1"/>
+          </a:fontRef>
+        </p:style>
+        <p:txBody>
+          <a:bodyPr rtlCol="0" anchor="ctr"/>
+          <a:lstStyle/>
+          <a:p>
+            <a:pPr algn="ctr"/>
+            <a:endParaRPr lang="ko-KR" altLang="en-US"/>
+          </a:p>
+        </p:txBody>
+      </p:sp>
+      <mc:AlternateContent xmlns:mc="http://schemas.openxmlformats.org/markup-compatibility/2006">
+        <mc:Choice xmlns:a14="http://schemas.microsoft.com/office/drawing/2010/main" Requires="a14">
+          <p:sp>
+            <p:nvSpPr>
+              <p:cNvPr id="76" name="TextBox 75">
+                <a:extLst>
+                  <a:ext uri="{FF2B5EF4-FFF2-40B4-BE49-F238E27FC236}">
+                    <a16:creationId xmlns:a16="http://schemas.microsoft.com/office/drawing/2014/main" id="{70C60805-E0AA-A064-CE69-ABF312923FCA}"/>
+                  </a:ext>
+                </a:extLst>
+              </p:cNvPr>
+              <p:cNvSpPr txBox="1"/>
+              <p:nvPr/>
+            </p:nvSpPr>
+            <p:spPr>
+              <a:xfrm>
+                <a:off x="4621639" y="3668563"/>
+                <a:ext cx="778418" cy="345672"/>
+              </a:xfrm>
+              <a:prstGeom prst="rect">
+                <a:avLst/>
+              </a:prstGeom>
+              <a:noFill/>
+            </p:spPr>
+            <p:txBody>
+              <a:bodyPr wrap="none" rtlCol="0">
+                <a:spAutoFit/>
+              </a:bodyPr>
+              <a:lstStyle/>
+              <a:p>
+                <a:r>
+                  <a:rPr lang="en-US" altLang="ko-KR" sz="1100" dirty="0"/>
+                  <a:t>arrival</a:t>
+                </a:r>
+                <a14:m>
+                  <m:oMath xmlns:m="http://schemas.openxmlformats.org/officeDocument/2006/math">
+                    <m:d>
+                      <m:dPr>
+                        <m:ctrlPr>
+                          <a:rPr lang="en-US" altLang="ko-KR" sz="1100" i="1" smtClean="0">
+                            <a:latin typeface="Cambria Math" panose="02040503050406030204" pitchFamily="18" charset="0"/>
+                          </a:rPr>
+                        </m:ctrlPr>
+                      </m:dPr>
+                      <m:e>
+                        <m:f>
+                          <m:fPr>
+                            <m:ctrlPr>
+                              <a:rPr lang="en-US" altLang="ko-KR" sz="1100" i="1">
+                                <a:latin typeface="Cambria Math" panose="02040503050406030204" pitchFamily="18" charset="0"/>
+                              </a:rPr>
+                            </m:ctrlPr>
+                          </m:fPr>
+                          <m:num>
+                            <m:r>
+                              <a:rPr lang="ko-KR" altLang="en-US" sz="1100" i="1">
+                                <a:latin typeface="Cambria Math" panose="02040503050406030204" pitchFamily="18" charset="0"/>
+                              </a:rPr>
+                              <m:t>𝜆</m:t>
+                            </m:r>
+                          </m:num>
+                          <m:den>
+                            <m:r>
+                              <a:rPr lang="en-US" altLang="ko-KR" sz="1100" i="1">
+                                <a:latin typeface="Cambria Math" panose="02040503050406030204" pitchFamily="18" charset="0"/>
+                              </a:rPr>
+                              <m:t>𝑛</m:t>
+                            </m:r>
+                          </m:den>
+                        </m:f>
+                      </m:e>
+                    </m:d>
+                  </m:oMath>
+                </a14:m>
+                <a:endParaRPr lang="ko-KR" altLang="en-US" sz="1100" dirty="0"/>
+              </a:p>
+            </p:txBody>
+          </p:sp>
+        </mc:Choice>
+        <mc:Fallback>
+          <p:sp>
+            <p:nvSpPr>
+              <p:cNvPr id="76" name="TextBox 75">
+                <a:extLst>
+                  <a:ext uri="{FF2B5EF4-FFF2-40B4-BE49-F238E27FC236}">
+                    <a16:creationId xmlns:a16="http://schemas.microsoft.com/office/drawing/2014/main" id="{70C60805-E0AA-A064-CE69-ABF312923FCA}"/>
+                  </a:ext>
+                </a:extLst>
+              </p:cNvPr>
+              <p:cNvSpPr txBox="1">
+                <a:spLocks noRot="1" noChangeAspect="1" noMove="1" noResize="1" noEditPoints="1" noAdjustHandles="1" noChangeArrowheads="1" noChangeShapeType="1" noTextEdit="1"/>
+              </p:cNvSpPr>
+              <p:nvPr/>
+            </p:nvSpPr>
+            <p:spPr>
+              <a:xfrm>
+                <a:off x="4621639" y="3668563"/>
+                <a:ext cx="778418" cy="345672"/>
+              </a:xfrm>
+              <a:prstGeom prst="rect">
+                <a:avLst/>
+              </a:prstGeom>
+              <a:blipFill>
+                <a:blip r:embed="rId7"/>
+                <a:stretch>
+                  <a:fillRect/>
+                </a:stretch>
+              </a:blipFill>
+            </p:spPr>
+            <p:txBody>
+              <a:bodyPr/>
+              <a:lstStyle/>
+              <a:p>
+                <a:r>
+                  <a:rPr lang="ko-KR" altLang="en-US">
+                    <a:noFill/>
+                  </a:rPr>
+                  <a:t> </a:t>
+                </a:r>
+              </a:p>
+            </p:txBody>
+          </p:sp>
+        </mc:Fallback>
+      </mc:AlternateContent>
+      <mc:AlternateContent xmlns:mc="http://schemas.openxmlformats.org/markup-compatibility/2006">
+        <mc:Choice xmlns:a14="http://schemas.microsoft.com/office/drawing/2010/main" Requires="a14">
+          <p:sp>
+            <p:nvSpPr>
+              <p:cNvPr id="77" name="TextBox 76">
+                <a:extLst>
+                  <a:ext uri="{FF2B5EF4-FFF2-40B4-BE49-F238E27FC236}">
+                    <a16:creationId xmlns:a16="http://schemas.microsoft.com/office/drawing/2014/main" id="{86530E97-9B7C-87CB-5489-00B51B47444F}"/>
+                  </a:ext>
+                </a:extLst>
+              </p:cNvPr>
+              <p:cNvSpPr txBox="1"/>
+              <p:nvPr/>
+            </p:nvSpPr>
+            <p:spPr>
+              <a:xfrm>
+                <a:off x="4490257" y="5369550"/>
+                <a:ext cx="1041182" cy="351828"/>
+              </a:xfrm>
+              <a:prstGeom prst="rect">
+                <a:avLst/>
+              </a:prstGeom>
+              <a:noFill/>
+            </p:spPr>
+            <p:txBody>
+              <a:bodyPr wrap="none" rtlCol="0">
+                <a:spAutoFit/>
+              </a:bodyPr>
+              <a:lstStyle/>
+              <a:p>
+                <a:r>
+                  <a:rPr lang="en-US" altLang="ko-KR" sz="1100" dirty="0"/>
+                  <a:t>departure</a:t>
+                </a:r>
+                <a14:m>
+                  <m:oMath xmlns:m="http://schemas.openxmlformats.org/officeDocument/2006/math">
+                    <m:d>
+                      <m:dPr>
+                        <m:ctrlPr>
+                          <a:rPr lang="en-US" altLang="ko-KR" sz="1100" i="1">
+                            <a:latin typeface="Cambria Math" panose="02040503050406030204" pitchFamily="18" charset="0"/>
+                          </a:rPr>
+                        </m:ctrlPr>
+                      </m:dPr>
+                      <m:e>
+                        <m:f>
+                          <m:fPr>
+                            <m:ctrlPr>
+                              <a:rPr lang="en-US" altLang="ko-KR" sz="1100" i="1">
+                                <a:latin typeface="Cambria Math" panose="02040503050406030204" pitchFamily="18" charset="0"/>
+                              </a:rPr>
+                            </m:ctrlPr>
+                          </m:fPr>
+                          <m:num>
+                            <m:r>
+                              <a:rPr lang="ko-KR" altLang="en-US" sz="1100" i="1" smtClean="0">
+                                <a:latin typeface="Cambria Math" panose="02040503050406030204" pitchFamily="18" charset="0"/>
+                              </a:rPr>
+                              <m:t>𝜇</m:t>
+                            </m:r>
+                          </m:num>
+                          <m:den>
+                            <m:r>
+                              <a:rPr lang="en-US" altLang="ko-KR" sz="1100" i="1">
+                                <a:latin typeface="Cambria Math" panose="02040503050406030204" pitchFamily="18" charset="0"/>
+                              </a:rPr>
+                              <m:t>𝑛</m:t>
+                            </m:r>
+                          </m:den>
+                        </m:f>
+                      </m:e>
+                    </m:d>
+                  </m:oMath>
+                </a14:m>
+                <a:endParaRPr lang="ko-KR" altLang="en-US" sz="1100" dirty="0"/>
+              </a:p>
+            </p:txBody>
+          </p:sp>
+        </mc:Choice>
+        <mc:Fallback>
+          <p:sp>
+            <p:nvSpPr>
+              <p:cNvPr id="77" name="TextBox 76">
+                <a:extLst>
+                  <a:ext uri="{FF2B5EF4-FFF2-40B4-BE49-F238E27FC236}">
+                    <a16:creationId xmlns:a16="http://schemas.microsoft.com/office/drawing/2014/main" id="{86530E97-9B7C-87CB-5489-00B51B47444F}"/>
+                  </a:ext>
+                </a:extLst>
+              </p:cNvPr>
+              <p:cNvSpPr txBox="1">
+                <a:spLocks noRot="1" noChangeAspect="1" noMove="1" noResize="1" noEditPoints="1" noAdjustHandles="1" noChangeArrowheads="1" noChangeShapeType="1" noTextEdit="1"/>
+              </p:cNvSpPr>
+              <p:nvPr/>
+            </p:nvSpPr>
+            <p:spPr>
+              <a:xfrm>
+                <a:off x="4490257" y="5369550"/>
+                <a:ext cx="1041182" cy="351828"/>
+              </a:xfrm>
+              <a:prstGeom prst="rect">
+                <a:avLst/>
+              </a:prstGeom>
+              <a:blipFill>
+                <a:blip r:embed="rId8"/>
+                <a:stretch>
+                  <a:fillRect/>
+                </a:stretch>
+              </a:blipFill>
+            </p:spPr>
+            <p:txBody>
+              <a:bodyPr/>
+              <a:lstStyle/>
+              <a:p>
+                <a:r>
+                  <a:rPr lang="ko-KR" altLang="en-US">
+                    <a:noFill/>
+                  </a:rPr>
+                  <a:t> </a:t>
+                </a:r>
+              </a:p>
+            </p:txBody>
+          </p:sp>
+        </mc:Fallback>
+      </mc:AlternateContent>
+      <p:sp>
+        <p:nvSpPr>
+          <p:cNvPr id="82" name="Arc 81">
+            <a:extLst>
+              <a:ext uri="{FF2B5EF4-FFF2-40B4-BE49-F238E27FC236}">
+                <a16:creationId xmlns:a16="http://schemas.microsoft.com/office/drawing/2014/main" id="{47EB4FD9-036A-70E7-B62B-241CE79060DE}"/>
+              </a:ext>
+            </a:extLst>
+          </p:cNvPr>
+          <p:cNvSpPr/>
+          <p:nvPr/>
+        </p:nvSpPr>
+        <p:spPr>
+          <a:xfrm>
+            <a:off x="6046437" y="4002227"/>
+            <a:ext cx="1052945" cy="707390"/>
+          </a:xfrm>
+          <a:prstGeom prst="arc">
+            <a:avLst>
+              <a:gd name="adj1" fmla="val 11886020"/>
+              <a:gd name="adj2" fmla="val 20737714"/>
+            </a:avLst>
+          </a:prstGeom>
+          <a:ln>
+            <a:headEnd type="none" w="med" len="med"/>
+            <a:tailEnd type="arrow" w="med" len="med"/>
+          </a:ln>
+        </p:spPr>
+        <p:style>
+          <a:lnRef idx="1">
+            <a:schemeClr val="accent1"/>
+          </a:lnRef>
+          <a:fillRef idx="0">
+            <a:schemeClr val="accent1"/>
+          </a:fillRef>
+          <a:effectRef idx="0">
+            <a:schemeClr val="accent1"/>
+          </a:effectRef>
+          <a:fontRef idx="minor">
+            <a:schemeClr val="tx1"/>
+          </a:fontRef>
+        </p:style>
+        <p:txBody>
+          <a:bodyPr rtlCol="0" anchor="ctr"/>
+          <a:lstStyle/>
+          <a:p>
+            <a:pPr algn="ctr"/>
+            <a:endParaRPr lang="ko-KR" altLang="en-US"/>
+          </a:p>
+        </p:txBody>
+      </p:sp>
+      <p:sp>
+        <p:nvSpPr>
+          <p:cNvPr id="83" name="Arc 82">
+            <a:extLst>
+              <a:ext uri="{FF2B5EF4-FFF2-40B4-BE49-F238E27FC236}">
+                <a16:creationId xmlns:a16="http://schemas.microsoft.com/office/drawing/2014/main" id="{32B746D8-B011-58B7-7B23-AAAFB2184A6C}"/>
+              </a:ext>
+            </a:extLst>
+          </p:cNvPr>
+          <p:cNvSpPr/>
+          <p:nvPr/>
+        </p:nvSpPr>
+        <p:spPr>
+          <a:xfrm>
+            <a:off x="6057290" y="4646117"/>
+            <a:ext cx="1052945" cy="707390"/>
+          </a:xfrm>
+          <a:prstGeom prst="arc">
+            <a:avLst>
+              <a:gd name="adj1" fmla="val 1016396"/>
+              <a:gd name="adj2" fmla="val 9887383"/>
+            </a:avLst>
+          </a:prstGeom>
+          <a:ln>
+            <a:headEnd type="none" w="med" len="med"/>
+            <a:tailEnd type="arrow" w="med" len="med"/>
+          </a:ln>
+        </p:spPr>
+        <p:style>
+          <a:lnRef idx="1">
+            <a:schemeClr val="accent1"/>
+          </a:lnRef>
+          <a:fillRef idx="0">
+            <a:schemeClr val="accent1"/>
+          </a:fillRef>
+          <a:effectRef idx="0">
+            <a:schemeClr val="accent1"/>
+          </a:effectRef>
+          <a:fontRef idx="minor">
+            <a:schemeClr val="tx1"/>
+          </a:fontRef>
+        </p:style>
+        <p:txBody>
+          <a:bodyPr rtlCol="0" anchor="ctr"/>
+          <a:lstStyle/>
+          <a:p>
+            <a:pPr algn="ctr"/>
+            <a:endParaRPr lang="ko-KR" altLang="en-US"/>
+          </a:p>
+        </p:txBody>
+      </p:sp>
+      <mc:AlternateContent xmlns:mc="http://schemas.openxmlformats.org/markup-compatibility/2006">
+        <mc:Choice xmlns:a14="http://schemas.microsoft.com/office/drawing/2010/main" Requires="a14">
+          <p:sp>
+            <p:nvSpPr>
+              <p:cNvPr id="84" name="TextBox 83">
+                <a:extLst>
+                  <a:ext uri="{FF2B5EF4-FFF2-40B4-BE49-F238E27FC236}">
+                    <a16:creationId xmlns:a16="http://schemas.microsoft.com/office/drawing/2014/main" id="{A4B0F098-5EB9-5AE6-CE4E-4A11E8958CC2}"/>
+                  </a:ext>
+                </a:extLst>
+              </p:cNvPr>
+              <p:cNvSpPr txBox="1"/>
+              <p:nvPr/>
+            </p:nvSpPr>
+            <p:spPr>
+              <a:xfrm>
+                <a:off x="6227382" y="3668563"/>
+                <a:ext cx="778418" cy="345672"/>
+              </a:xfrm>
+              <a:prstGeom prst="rect">
+                <a:avLst/>
+              </a:prstGeom>
+              <a:noFill/>
+            </p:spPr>
+            <p:txBody>
+              <a:bodyPr wrap="none" rtlCol="0">
+                <a:spAutoFit/>
+              </a:bodyPr>
+              <a:lstStyle/>
+              <a:p>
+                <a:r>
+                  <a:rPr lang="en-US" altLang="ko-KR" sz="1100" dirty="0"/>
+                  <a:t>arrival</a:t>
+                </a:r>
+                <a14:m>
+                  <m:oMath xmlns:m="http://schemas.openxmlformats.org/officeDocument/2006/math">
+                    <m:d>
+                      <m:dPr>
+                        <m:ctrlPr>
+                          <a:rPr lang="en-US" altLang="ko-KR" sz="1100" i="1" smtClean="0">
+                            <a:latin typeface="Cambria Math" panose="02040503050406030204" pitchFamily="18" charset="0"/>
+                          </a:rPr>
+                        </m:ctrlPr>
+                      </m:dPr>
+                      <m:e>
+                        <m:f>
+                          <m:fPr>
+                            <m:ctrlPr>
+                              <a:rPr lang="en-US" altLang="ko-KR" sz="1100" i="1">
+                                <a:latin typeface="Cambria Math" panose="02040503050406030204" pitchFamily="18" charset="0"/>
+                              </a:rPr>
+                            </m:ctrlPr>
+                          </m:fPr>
+                          <m:num>
+                            <m:r>
+                              <a:rPr lang="ko-KR" altLang="en-US" sz="1100" i="1">
+                                <a:latin typeface="Cambria Math" panose="02040503050406030204" pitchFamily="18" charset="0"/>
+                              </a:rPr>
+                              <m:t>𝜆</m:t>
+                            </m:r>
+                          </m:num>
+                          <m:den>
+                            <m:r>
+                              <a:rPr lang="en-US" altLang="ko-KR" sz="1100" i="1">
+                                <a:latin typeface="Cambria Math" panose="02040503050406030204" pitchFamily="18" charset="0"/>
+                              </a:rPr>
+                              <m:t>𝑛</m:t>
+                            </m:r>
+                          </m:den>
+                        </m:f>
+                      </m:e>
+                    </m:d>
+                  </m:oMath>
+                </a14:m>
+                <a:endParaRPr lang="ko-KR" altLang="en-US" sz="1100" dirty="0"/>
+              </a:p>
+            </p:txBody>
+          </p:sp>
+        </mc:Choice>
+        <mc:Fallback>
+          <p:sp>
+            <p:nvSpPr>
+              <p:cNvPr id="84" name="TextBox 83">
+                <a:extLst>
+                  <a:ext uri="{FF2B5EF4-FFF2-40B4-BE49-F238E27FC236}">
+                    <a16:creationId xmlns:a16="http://schemas.microsoft.com/office/drawing/2014/main" id="{A4B0F098-5EB9-5AE6-CE4E-4A11E8958CC2}"/>
+                  </a:ext>
+                </a:extLst>
+              </p:cNvPr>
+              <p:cNvSpPr txBox="1">
+                <a:spLocks noRot="1" noChangeAspect="1" noMove="1" noResize="1" noEditPoints="1" noAdjustHandles="1" noChangeArrowheads="1" noChangeShapeType="1" noTextEdit="1"/>
+              </p:cNvSpPr>
+              <p:nvPr/>
+            </p:nvSpPr>
+            <p:spPr>
+              <a:xfrm>
+                <a:off x="6227382" y="3668563"/>
+                <a:ext cx="778418" cy="345672"/>
+              </a:xfrm>
+              <a:prstGeom prst="rect">
+                <a:avLst/>
+              </a:prstGeom>
+              <a:blipFill>
+                <a:blip r:embed="rId9"/>
+                <a:stretch>
+                  <a:fillRect/>
+                </a:stretch>
+              </a:blipFill>
+            </p:spPr>
+            <p:txBody>
+              <a:bodyPr/>
+              <a:lstStyle/>
+              <a:p>
+                <a:r>
+                  <a:rPr lang="ko-KR" altLang="en-US">
+                    <a:noFill/>
+                  </a:rPr>
+                  <a:t> </a:t>
+                </a:r>
+              </a:p>
+            </p:txBody>
+          </p:sp>
+        </mc:Fallback>
+      </mc:AlternateContent>
+      <mc:AlternateContent xmlns:mc="http://schemas.openxmlformats.org/markup-compatibility/2006">
+        <mc:Choice xmlns:a14="http://schemas.microsoft.com/office/drawing/2010/main" Requires="a14">
+          <p:sp>
+            <p:nvSpPr>
+              <p:cNvPr id="85" name="TextBox 84">
+                <a:extLst>
+                  <a:ext uri="{FF2B5EF4-FFF2-40B4-BE49-F238E27FC236}">
+                    <a16:creationId xmlns:a16="http://schemas.microsoft.com/office/drawing/2014/main" id="{DA43C1D2-4D27-E054-5D94-511679CCB55B}"/>
+                  </a:ext>
+                </a:extLst>
+              </p:cNvPr>
+              <p:cNvSpPr txBox="1"/>
+              <p:nvPr/>
+            </p:nvSpPr>
+            <p:spPr>
+              <a:xfrm>
+                <a:off x="6096000" y="5369550"/>
+                <a:ext cx="1041182" cy="351828"/>
+              </a:xfrm>
+              <a:prstGeom prst="rect">
+                <a:avLst/>
+              </a:prstGeom>
+              <a:noFill/>
+            </p:spPr>
+            <p:txBody>
+              <a:bodyPr wrap="none" rtlCol="0">
+                <a:spAutoFit/>
+              </a:bodyPr>
+              <a:lstStyle/>
+              <a:p>
+                <a:r>
+                  <a:rPr lang="en-US" altLang="ko-KR" sz="1100" dirty="0"/>
+                  <a:t>departure</a:t>
+                </a:r>
+                <a14:m>
+                  <m:oMath xmlns:m="http://schemas.openxmlformats.org/officeDocument/2006/math">
+                    <m:d>
+                      <m:dPr>
+                        <m:ctrlPr>
+                          <a:rPr lang="en-US" altLang="ko-KR" sz="1100" i="1">
+                            <a:latin typeface="Cambria Math" panose="02040503050406030204" pitchFamily="18" charset="0"/>
+                          </a:rPr>
+                        </m:ctrlPr>
+                      </m:dPr>
+                      <m:e>
+                        <m:f>
+                          <m:fPr>
+                            <m:ctrlPr>
+                              <a:rPr lang="en-US" altLang="ko-KR" sz="1100" i="1">
+                                <a:latin typeface="Cambria Math" panose="02040503050406030204" pitchFamily="18" charset="0"/>
+                              </a:rPr>
+                            </m:ctrlPr>
+                          </m:fPr>
+                          <m:num>
+                            <m:r>
+                              <a:rPr lang="ko-KR" altLang="en-US" sz="1100" i="1" smtClean="0">
+                                <a:latin typeface="Cambria Math" panose="02040503050406030204" pitchFamily="18" charset="0"/>
+                              </a:rPr>
+                              <m:t>𝜇</m:t>
+                            </m:r>
+                          </m:num>
+                          <m:den>
+                            <m:r>
+                              <a:rPr lang="en-US" altLang="ko-KR" sz="1100" i="1">
+                                <a:latin typeface="Cambria Math" panose="02040503050406030204" pitchFamily="18" charset="0"/>
+                              </a:rPr>
+                              <m:t>𝑛</m:t>
+                            </m:r>
+                          </m:den>
+                        </m:f>
+                      </m:e>
+                    </m:d>
+                  </m:oMath>
+                </a14:m>
+                <a:endParaRPr lang="ko-KR" altLang="en-US" sz="1100" dirty="0"/>
+              </a:p>
+            </p:txBody>
+          </p:sp>
+        </mc:Choice>
+        <mc:Fallback>
+          <p:sp>
+            <p:nvSpPr>
+              <p:cNvPr id="85" name="TextBox 84">
+                <a:extLst>
+                  <a:ext uri="{FF2B5EF4-FFF2-40B4-BE49-F238E27FC236}">
+                    <a16:creationId xmlns:a16="http://schemas.microsoft.com/office/drawing/2014/main" id="{DA43C1D2-4D27-E054-5D94-511679CCB55B}"/>
+                  </a:ext>
+                </a:extLst>
+              </p:cNvPr>
+              <p:cNvSpPr txBox="1">
+                <a:spLocks noRot="1" noChangeAspect="1" noMove="1" noResize="1" noEditPoints="1" noAdjustHandles="1" noChangeArrowheads="1" noChangeShapeType="1" noTextEdit="1"/>
+              </p:cNvSpPr>
+              <p:nvPr/>
+            </p:nvSpPr>
+            <p:spPr>
+              <a:xfrm>
+                <a:off x="6096000" y="5369550"/>
+                <a:ext cx="1041182" cy="351828"/>
+              </a:xfrm>
+              <a:prstGeom prst="rect">
+                <a:avLst/>
+              </a:prstGeom>
+              <a:blipFill>
+                <a:blip r:embed="rId10"/>
+                <a:stretch>
+                  <a:fillRect/>
+                </a:stretch>
+              </a:blipFill>
+            </p:spPr>
+            <p:txBody>
+              <a:bodyPr/>
+              <a:lstStyle/>
+              <a:p>
+                <a:r>
+                  <a:rPr lang="ko-KR" altLang="en-US">
+                    <a:noFill/>
+                  </a:rPr>
+                  <a:t> </a:t>
+                </a:r>
+              </a:p>
+            </p:txBody>
+          </p:sp>
+        </mc:Fallback>
+      </mc:AlternateContent>
+      <p:sp>
+        <p:nvSpPr>
+          <p:cNvPr id="86" name="Arc 85">
+            <a:extLst>
+              <a:ext uri="{FF2B5EF4-FFF2-40B4-BE49-F238E27FC236}">
+                <a16:creationId xmlns:a16="http://schemas.microsoft.com/office/drawing/2014/main" id="{C4F66001-26E7-16C7-449D-E52AE5DADCDA}"/>
+              </a:ext>
+            </a:extLst>
+          </p:cNvPr>
+          <p:cNvSpPr/>
+          <p:nvPr/>
+        </p:nvSpPr>
+        <p:spPr>
+          <a:xfrm>
+            <a:off x="7638431" y="4002227"/>
+            <a:ext cx="1052945" cy="707390"/>
+          </a:xfrm>
+          <a:prstGeom prst="arc">
+            <a:avLst>
+              <a:gd name="adj1" fmla="val 11886020"/>
+              <a:gd name="adj2" fmla="val 20737714"/>
+            </a:avLst>
+          </a:prstGeom>
+          <a:ln>
+            <a:headEnd type="none" w="med" len="med"/>
+            <a:tailEnd type="arrow" w="med" len="med"/>
+          </a:ln>
+        </p:spPr>
+        <p:style>
+          <a:lnRef idx="1">
+            <a:schemeClr val="accent1"/>
+          </a:lnRef>
+          <a:fillRef idx="0">
+            <a:schemeClr val="accent1"/>
+          </a:fillRef>
+          <a:effectRef idx="0">
+            <a:schemeClr val="accent1"/>
+          </a:effectRef>
+          <a:fontRef idx="minor">
+            <a:schemeClr val="tx1"/>
+          </a:fontRef>
+        </p:style>
+        <p:txBody>
+          <a:bodyPr rtlCol="0" anchor="ctr"/>
+          <a:lstStyle/>
+          <a:p>
+            <a:pPr algn="ctr"/>
+            <a:endParaRPr lang="ko-KR" altLang="en-US"/>
+          </a:p>
+        </p:txBody>
+      </p:sp>
+      <p:sp>
+        <p:nvSpPr>
+          <p:cNvPr id="87" name="Arc 86">
+            <a:extLst>
+              <a:ext uri="{FF2B5EF4-FFF2-40B4-BE49-F238E27FC236}">
+                <a16:creationId xmlns:a16="http://schemas.microsoft.com/office/drawing/2014/main" id="{17A9ABD3-380D-2ED9-91D3-B280B9EAAAFB}"/>
+              </a:ext>
+            </a:extLst>
+          </p:cNvPr>
+          <p:cNvSpPr/>
+          <p:nvPr/>
+        </p:nvSpPr>
+        <p:spPr>
+          <a:xfrm>
+            <a:off x="7649284" y="4646117"/>
+            <a:ext cx="1052945" cy="707390"/>
+          </a:xfrm>
+          <a:prstGeom prst="arc">
+            <a:avLst>
+              <a:gd name="adj1" fmla="val 1016396"/>
+              <a:gd name="adj2" fmla="val 9887383"/>
+            </a:avLst>
+          </a:prstGeom>
+          <a:ln>
+            <a:headEnd type="none" w="med" len="med"/>
+            <a:tailEnd type="arrow" w="med" len="med"/>
+          </a:ln>
+        </p:spPr>
+        <p:style>
+          <a:lnRef idx="1">
+            <a:schemeClr val="accent1"/>
+          </a:lnRef>
+          <a:fillRef idx="0">
+            <a:schemeClr val="accent1"/>
+          </a:fillRef>
+          <a:effectRef idx="0">
+            <a:schemeClr val="accent1"/>
+          </a:effectRef>
+          <a:fontRef idx="minor">
+            <a:schemeClr val="tx1"/>
+          </a:fontRef>
+        </p:style>
+        <p:txBody>
+          <a:bodyPr rtlCol="0" anchor="ctr"/>
+          <a:lstStyle/>
+          <a:p>
+            <a:pPr algn="ctr"/>
+            <a:endParaRPr lang="ko-KR" altLang="en-US"/>
+          </a:p>
+        </p:txBody>
+      </p:sp>
+      <mc:AlternateContent xmlns:mc="http://schemas.openxmlformats.org/markup-compatibility/2006">
+        <mc:Choice xmlns:a14="http://schemas.microsoft.com/office/drawing/2010/main" Requires="a14">
+          <p:sp>
+            <p:nvSpPr>
+              <p:cNvPr id="88" name="TextBox 87">
+                <a:extLst>
+                  <a:ext uri="{FF2B5EF4-FFF2-40B4-BE49-F238E27FC236}">
+                    <a16:creationId xmlns:a16="http://schemas.microsoft.com/office/drawing/2014/main" id="{496235A0-C0D1-23B6-C0C3-81E9A2FD07BB}"/>
+                  </a:ext>
+                </a:extLst>
+              </p:cNvPr>
+              <p:cNvSpPr txBox="1"/>
+              <p:nvPr/>
+            </p:nvSpPr>
+            <p:spPr>
+              <a:xfrm>
+                <a:off x="7819376" y="3668563"/>
+                <a:ext cx="778418" cy="345672"/>
+              </a:xfrm>
+              <a:prstGeom prst="rect">
+                <a:avLst/>
+              </a:prstGeom>
+              <a:noFill/>
+            </p:spPr>
+            <p:txBody>
+              <a:bodyPr wrap="none" rtlCol="0">
+                <a:spAutoFit/>
+              </a:bodyPr>
+              <a:lstStyle/>
+              <a:p>
+                <a:r>
+                  <a:rPr lang="en-US" altLang="ko-KR" sz="1100" dirty="0"/>
+                  <a:t>arrival</a:t>
+                </a:r>
+                <a14:m>
+                  <m:oMath xmlns:m="http://schemas.openxmlformats.org/officeDocument/2006/math">
+                    <m:d>
+                      <m:dPr>
+                        <m:ctrlPr>
+                          <a:rPr lang="en-US" altLang="ko-KR" sz="1100" i="1" smtClean="0">
+                            <a:latin typeface="Cambria Math" panose="02040503050406030204" pitchFamily="18" charset="0"/>
+                          </a:rPr>
+                        </m:ctrlPr>
+                      </m:dPr>
+                      <m:e>
+                        <m:f>
+                          <m:fPr>
+                            <m:ctrlPr>
+                              <a:rPr lang="en-US" altLang="ko-KR" sz="1100" i="1">
+                                <a:latin typeface="Cambria Math" panose="02040503050406030204" pitchFamily="18" charset="0"/>
+                              </a:rPr>
+                            </m:ctrlPr>
+                          </m:fPr>
+                          <m:num>
+                            <m:r>
+                              <a:rPr lang="ko-KR" altLang="en-US" sz="1100" i="1">
+                                <a:latin typeface="Cambria Math" panose="02040503050406030204" pitchFamily="18" charset="0"/>
+                              </a:rPr>
+                              <m:t>𝜆</m:t>
+                            </m:r>
+                          </m:num>
+                          <m:den>
+                            <m:r>
+                              <a:rPr lang="en-US" altLang="ko-KR" sz="1100" i="1">
+                                <a:latin typeface="Cambria Math" panose="02040503050406030204" pitchFamily="18" charset="0"/>
+                              </a:rPr>
+                              <m:t>𝑛</m:t>
+                            </m:r>
+                          </m:den>
+                        </m:f>
+                      </m:e>
+                    </m:d>
+                  </m:oMath>
+                </a14:m>
+                <a:endParaRPr lang="ko-KR" altLang="en-US" sz="1100" dirty="0"/>
+              </a:p>
+            </p:txBody>
+          </p:sp>
+        </mc:Choice>
+        <mc:Fallback>
+          <p:sp>
+            <p:nvSpPr>
+              <p:cNvPr id="88" name="TextBox 87">
+                <a:extLst>
+                  <a:ext uri="{FF2B5EF4-FFF2-40B4-BE49-F238E27FC236}">
+                    <a16:creationId xmlns:a16="http://schemas.microsoft.com/office/drawing/2014/main" id="{496235A0-C0D1-23B6-C0C3-81E9A2FD07BB}"/>
+                  </a:ext>
+                </a:extLst>
+              </p:cNvPr>
+              <p:cNvSpPr txBox="1">
+                <a:spLocks noRot="1" noChangeAspect="1" noMove="1" noResize="1" noEditPoints="1" noAdjustHandles="1" noChangeArrowheads="1" noChangeShapeType="1" noTextEdit="1"/>
+              </p:cNvSpPr>
+              <p:nvPr/>
+            </p:nvSpPr>
+            <p:spPr>
+              <a:xfrm>
+                <a:off x="7819376" y="3668563"/>
+                <a:ext cx="778418" cy="345672"/>
+              </a:xfrm>
+              <a:prstGeom prst="rect">
+                <a:avLst/>
+              </a:prstGeom>
+              <a:blipFill>
+                <a:blip r:embed="rId11"/>
+                <a:stretch>
+                  <a:fillRect/>
+                </a:stretch>
+              </a:blipFill>
+            </p:spPr>
+            <p:txBody>
+              <a:bodyPr/>
+              <a:lstStyle/>
+              <a:p>
+                <a:r>
+                  <a:rPr lang="ko-KR" altLang="en-US">
+                    <a:noFill/>
+                  </a:rPr>
+                  <a:t> </a:t>
+                </a:r>
+              </a:p>
+            </p:txBody>
+          </p:sp>
+        </mc:Fallback>
+      </mc:AlternateContent>
+      <mc:AlternateContent xmlns:mc="http://schemas.openxmlformats.org/markup-compatibility/2006">
+        <mc:Choice xmlns:a14="http://schemas.microsoft.com/office/drawing/2010/main" Requires="a14">
+          <p:sp>
+            <p:nvSpPr>
+              <p:cNvPr id="89" name="TextBox 88">
+                <a:extLst>
+                  <a:ext uri="{FF2B5EF4-FFF2-40B4-BE49-F238E27FC236}">
+                    <a16:creationId xmlns:a16="http://schemas.microsoft.com/office/drawing/2014/main" id="{9DD6FEBD-7914-2217-EC61-9479397B3B10}"/>
+                  </a:ext>
+                </a:extLst>
+              </p:cNvPr>
+              <p:cNvSpPr txBox="1"/>
+              <p:nvPr/>
+            </p:nvSpPr>
+            <p:spPr>
+              <a:xfrm>
+                <a:off x="7687994" y="5369550"/>
+                <a:ext cx="1041182" cy="351828"/>
+              </a:xfrm>
+              <a:prstGeom prst="rect">
+                <a:avLst/>
+              </a:prstGeom>
+              <a:noFill/>
+            </p:spPr>
+            <p:txBody>
+              <a:bodyPr wrap="none" rtlCol="0">
+                <a:spAutoFit/>
+              </a:bodyPr>
+              <a:lstStyle/>
+              <a:p>
+                <a:r>
+                  <a:rPr lang="en-US" altLang="ko-KR" sz="1100" dirty="0"/>
+                  <a:t>departure</a:t>
+                </a:r>
+                <a14:m>
+                  <m:oMath xmlns:m="http://schemas.openxmlformats.org/officeDocument/2006/math">
+                    <m:d>
+                      <m:dPr>
+                        <m:ctrlPr>
+                          <a:rPr lang="en-US" altLang="ko-KR" sz="1100" i="1">
+                            <a:latin typeface="Cambria Math" panose="02040503050406030204" pitchFamily="18" charset="0"/>
+                          </a:rPr>
+                        </m:ctrlPr>
+                      </m:dPr>
+                      <m:e>
+                        <m:f>
+                          <m:fPr>
+                            <m:ctrlPr>
+                              <a:rPr lang="en-US" altLang="ko-KR" sz="1100" i="1">
+                                <a:latin typeface="Cambria Math" panose="02040503050406030204" pitchFamily="18" charset="0"/>
+                              </a:rPr>
+                            </m:ctrlPr>
+                          </m:fPr>
+                          <m:num>
+                            <m:r>
+                              <a:rPr lang="ko-KR" altLang="en-US" sz="1100" i="1" smtClean="0">
+                                <a:latin typeface="Cambria Math" panose="02040503050406030204" pitchFamily="18" charset="0"/>
+                              </a:rPr>
+                              <m:t>𝜇</m:t>
+                            </m:r>
+                          </m:num>
+                          <m:den>
+                            <m:r>
+                              <a:rPr lang="en-US" altLang="ko-KR" sz="1100" i="1">
+                                <a:latin typeface="Cambria Math" panose="02040503050406030204" pitchFamily="18" charset="0"/>
+                              </a:rPr>
+                              <m:t>𝑛</m:t>
+                            </m:r>
+                          </m:den>
+                        </m:f>
+                      </m:e>
+                    </m:d>
+                  </m:oMath>
+                </a14:m>
+                <a:endParaRPr lang="ko-KR" altLang="en-US" sz="1100" dirty="0"/>
+              </a:p>
+            </p:txBody>
+          </p:sp>
+        </mc:Choice>
+        <mc:Fallback>
+          <p:sp>
+            <p:nvSpPr>
+              <p:cNvPr id="89" name="TextBox 88">
+                <a:extLst>
+                  <a:ext uri="{FF2B5EF4-FFF2-40B4-BE49-F238E27FC236}">
+                    <a16:creationId xmlns:a16="http://schemas.microsoft.com/office/drawing/2014/main" id="{9DD6FEBD-7914-2217-EC61-9479397B3B10}"/>
+                  </a:ext>
+                </a:extLst>
+              </p:cNvPr>
+              <p:cNvSpPr txBox="1">
+                <a:spLocks noRot="1" noChangeAspect="1" noMove="1" noResize="1" noEditPoints="1" noAdjustHandles="1" noChangeArrowheads="1" noChangeShapeType="1" noTextEdit="1"/>
+              </p:cNvSpPr>
+              <p:nvPr/>
+            </p:nvSpPr>
+            <p:spPr>
+              <a:xfrm>
+                <a:off x="7687994" y="5369550"/>
+                <a:ext cx="1041182" cy="351828"/>
+              </a:xfrm>
+              <a:prstGeom prst="rect">
+                <a:avLst/>
+              </a:prstGeom>
+              <a:blipFill>
+                <a:blip r:embed="rId12"/>
+                <a:stretch>
+                  <a:fillRect/>
+                </a:stretch>
+              </a:blipFill>
+            </p:spPr>
+            <p:txBody>
+              <a:bodyPr/>
+              <a:lstStyle/>
+              <a:p>
+                <a:r>
+                  <a:rPr lang="ko-KR" altLang="en-US">
+                    <a:noFill/>
+                  </a:rPr>
+                  <a:t> </a:t>
+                </a:r>
+              </a:p>
+            </p:txBody>
+          </p:sp>
+        </mc:Fallback>
+      </mc:AlternateContent>
+    </p:spTree>
+    <p:extLst>
+      <p:ext uri="{BB962C8B-B14F-4D97-AF65-F5344CB8AC3E}">
+        <p14:creationId xmlns:p14="http://schemas.microsoft.com/office/powerpoint/2010/main" val="3249092760"/>
       </p:ext>
     </p:extLst>
   </p:cSld>

</xml_diff>